<commit_message>
Update to job role slides
</commit_message>
<xml_diff>
--- a/DraftPresentation.pptx
+++ b/DraftPresentation.pptx
@@ -7,8 +7,9 @@
   <p:sldIdLst>
     <p:sldId id="256" r:id="rId2"/>
     <p:sldId id="257" r:id="rId3"/>
-    <p:sldId id="259" r:id="rId4"/>
-    <p:sldId id="258" r:id="rId5"/>
+    <p:sldId id="258" r:id="rId4"/>
+    <p:sldId id="259" r:id="rId5"/>
+    <p:sldId id="260" r:id="rId6"/>
   </p:sldIdLst>
   <p:sldSz cx="12192000" cy="6858000"/>
   <p:notesSz cx="6858000" cy="9144000"/>
@@ -13632,6 +13633,481 @@
           <p:cNvPr id="2" name="Title 1">
             <a:extLst>
               <a:ext uri="{FF2B5EF4-FFF2-40B4-BE49-F238E27FC236}">
+                <a16:creationId xmlns:a16="http://schemas.microsoft.com/office/drawing/2014/main" id="{8774AB4C-A928-4DF2-B474-6E732F16190A}"/>
+              </a:ext>
+            </a:extLst>
+          </p:cNvPr>
+          <p:cNvSpPr>
+            <a:spLocks noGrp="1"/>
+          </p:cNvSpPr>
+          <p:nvPr>
+            <p:ph type="title"/>
+          </p:nvPr>
+        </p:nvSpPr>
+        <p:spPr/>
+        <p:txBody>
+          <a:bodyPr/>
+          <a:lstStyle/>
+          <a:p>
+            <a:r>
+              <a:rPr lang="pl-PL" dirty="0"/>
+              <a:t>Job Satisfaction Survey:</a:t>
+            </a:r>
+            <a:endParaRPr lang="en-US" dirty="0"/>
+          </a:p>
+        </p:txBody>
+      </p:sp>
+      <p:sp>
+        <p:nvSpPr>
+          <p:cNvPr id="3" name="Content Placeholder 2">
+            <a:extLst>
+              <a:ext uri="{FF2B5EF4-FFF2-40B4-BE49-F238E27FC236}">
+                <a16:creationId xmlns:a16="http://schemas.microsoft.com/office/drawing/2014/main" id="{9E0EDB56-CF7F-4034-867E-EEE246646959}"/>
+              </a:ext>
+            </a:extLst>
+          </p:cNvPr>
+          <p:cNvSpPr>
+            <a:spLocks noGrp="1"/>
+          </p:cNvSpPr>
+          <p:nvPr>
+            <p:ph idx="1"/>
+          </p:nvPr>
+        </p:nvSpPr>
+        <p:spPr>
+          <a:xfrm>
+            <a:off x="1154954" y="2311400"/>
+            <a:ext cx="3984139" cy="3416300"/>
+          </a:xfrm>
+        </p:spPr>
+        <p:txBody>
+          <a:bodyPr/>
+          <a:lstStyle/>
+          <a:p>
+            <a:r>
+              <a:rPr lang="en-US" dirty="0"/>
+              <a:t>No major deviations across departments. Let’s take a closer look. </a:t>
+            </a:r>
+          </a:p>
+        </p:txBody>
+      </p:sp>
+      <p:sp>
+        <p:nvSpPr>
+          <p:cNvPr id="6" name="Content Placeholder 2">
+            <a:extLst>
+              <a:ext uri="{FF2B5EF4-FFF2-40B4-BE49-F238E27FC236}">
+                <a16:creationId xmlns:a16="http://schemas.microsoft.com/office/drawing/2014/main" id="{DC21AC21-6541-4EBC-B4C6-34586999E582}"/>
+              </a:ext>
+            </a:extLst>
+          </p:cNvPr>
+          <p:cNvSpPr txBox="1">
+            <a:spLocks/>
+          </p:cNvSpPr>
+          <p:nvPr/>
+        </p:nvSpPr>
+        <p:spPr>
+          <a:xfrm>
+            <a:off x="6751653" y="2311400"/>
+            <a:ext cx="3984139" cy="3416300"/>
+          </a:xfrm>
+          <a:prstGeom prst="rect">
+            <a:avLst/>
+          </a:prstGeom>
+        </p:spPr>
+        <p:txBody>
+          <a:bodyPr vert="horz" lIns="91440" tIns="45720" rIns="91440" bIns="45720" rtlCol="0">
+            <a:normAutofit/>
+          </a:bodyPr>
+          <a:lstStyle>
+            <a:lvl1pPr marL="342900" indent="-342900" algn="l" defTabSz="457200" rtl="0" eaLnBrk="1" latinLnBrk="0" hangingPunct="1">
+              <a:spcBef>
+                <a:spcPts val="1000"/>
+              </a:spcBef>
+              <a:spcAft>
+                <a:spcPts val="0"/>
+              </a:spcAft>
+              <a:buClr>
+                <a:schemeClr val="accent1"/>
+              </a:buClr>
+              <a:buSzPct val="80000"/>
+              <a:buFont typeface="Wingdings 3" charset="2"/>
+              <a:buChar char=""/>
+              <a:defRPr sz="1800" b="0" i="0" kern="1200">
+                <a:solidFill>
+                  <a:schemeClr val="tx1">
+                    <a:lumMod val="75000"/>
+                    <a:lumOff val="25000"/>
+                  </a:schemeClr>
+                </a:solidFill>
+                <a:latin typeface="+mn-lt"/>
+                <a:ea typeface="+mn-ea"/>
+                <a:cs typeface="+mn-cs"/>
+              </a:defRPr>
+            </a:lvl1pPr>
+            <a:lvl2pPr marL="742950" indent="-285750" algn="l" defTabSz="457200" rtl="0" eaLnBrk="1" latinLnBrk="0" hangingPunct="1">
+              <a:spcBef>
+                <a:spcPts val="1000"/>
+              </a:spcBef>
+              <a:spcAft>
+                <a:spcPts val="0"/>
+              </a:spcAft>
+              <a:buClr>
+                <a:schemeClr val="accent1"/>
+              </a:buClr>
+              <a:buSzPct val="80000"/>
+              <a:buFont typeface="Wingdings 3" charset="2"/>
+              <a:buChar char=""/>
+              <a:defRPr sz="1600" b="0" i="0" kern="1200">
+                <a:solidFill>
+                  <a:schemeClr val="tx1">
+                    <a:lumMod val="75000"/>
+                    <a:lumOff val="25000"/>
+                  </a:schemeClr>
+                </a:solidFill>
+                <a:latin typeface="+mn-lt"/>
+                <a:ea typeface="+mn-ea"/>
+                <a:cs typeface="+mn-cs"/>
+              </a:defRPr>
+            </a:lvl2pPr>
+            <a:lvl3pPr marL="1143000" indent="-228600" algn="l" defTabSz="457200" rtl="0" eaLnBrk="1" latinLnBrk="0" hangingPunct="1">
+              <a:spcBef>
+                <a:spcPts val="1000"/>
+              </a:spcBef>
+              <a:spcAft>
+                <a:spcPts val="0"/>
+              </a:spcAft>
+              <a:buClr>
+                <a:schemeClr val="accent1"/>
+              </a:buClr>
+              <a:buSzPct val="80000"/>
+              <a:buFont typeface="Wingdings 3" charset="2"/>
+              <a:buChar char=""/>
+              <a:defRPr sz="1400" b="0" i="0" kern="1200">
+                <a:solidFill>
+                  <a:schemeClr val="tx1">
+                    <a:lumMod val="75000"/>
+                    <a:lumOff val="25000"/>
+                  </a:schemeClr>
+                </a:solidFill>
+                <a:latin typeface="+mn-lt"/>
+                <a:ea typeface="+mn-ea"/>
+                <a:cs typeface="+mn-cs"/>
+              </a:defRPr>
+            </a:lvl3pPr>
+            <a:lvl4pPr marL="1600200" indent="-228600" algn="l" defTabSz="457200" rtl="0" eaLnBrk="1" latinLnBrk="0" hangingPunct="1">
+              <a:spcBef>
+                <a:spcPts val="1000"/>
+              </a:spcBef>
+              <a:spcAft>
+                <a:spcPts val="0"/>
+              </a:spcAft>
+              <a:buClr>
+                <a:schemeClr val="accent1"/>
+              </a:buClr>
+              <a:buSzPct val="80000"/>
+              <a:buFont typeface="Wingdings 3" charset="2"/>
+              <a:buChar char=""/>
+              <a:defRPr sz="1200" b="0" i="0" kern="1200">
+                <a:solidFill>
+                  <a:schemeClr val="tx1">
+                    <a:lumMod val="75000"/>
+                    <a:lumOff val="25000"/>
+                  </a:schemeClr>
+                </a:solidFill>
+                <a:latin typeface="+mn-lt"/>
+                <a:ea typeface="+mn-ea"/>
+                <a:cs typeface="+mn-cs"/>
+              </a:defRPr>
+            </a:lvl4pPr>
+            <a:lvl5pPr marL="2057400" indent="-228600" algn="l" defTabSz="457200" rtl="0" eaLnBrk="1" latinLnBrk="0" hangingPunct="1">
+              <a:spcBef>
+                <a:spcPts val="1000"/>
+              </a:spcBef>
+              <a:spcAft>
+                <a:spcPts val="0"/>
+              </a:spcAft>
+              <a:buClr>
+                <a:schemeClr val="accent1"/>
+              </a:buClr>
+              <a:buSzPct val="80000"/>
+              <a:buFont typeface="Wingdings 3" charset="2"/>
+              <a:buChar char=""/>
+              <a:defRPr sz="1200" b="0" i="0" kern="1200">
+                <a:solidFill>
+                  <a:schemeClr val="tx1">
+                    <a:lumMod val="75000"/>
+                    <a:lumOff val="25000"/>
+                  </a:schemeClr>
+                </a:solidFill>
+                <a:latin typeface="+mn-lt"/>
+                <a:ea typeface="+mn-ea"/>
+                <a:cs typeface="+mn-cs"/>
+              </a:defRPr>
+            </a:lvl5pPr>
+            <a:lvl6pPr marL="2514600" indent="-228600" algn="l" defTabSz="457200" rtl="0" eaLnBrk="1" latinLnBrk="0" hangingPunct="1">
+              <a:spcBef>
+                <a:spcPts val="1000"/>
+              </a:spcBef>
+              <a:spcAft>
+                <a:spcPts val="0"/>
+              </a:spcAft>
+              <a:buClr>
+                <a:schemeClr val="accent1"/>
+              </a:buClr>
+              <a:buSzPct val="80000"/>
+              <a:buFont typeface="Wingdings 3" charset="2"/>
+              <a:buChar char=""/>
+              <a:defRPr sz="1200" b="0" i="0" kern="1200">
+                <a:solidFill>
+                  <a:schemeClr val="tx1">
+                    <a:lumMod val="75000"/>
+                    <a:lumOff val="25000"/>
+                  </a:schemeClr>
+                </a:solidFill>
+                <a:latin typeface="+mn-lt"/>
+                <a:ea typeface="+mn-ea"/>
+                <a:cs typeface="+mn-cs"/>
+              </a:defRPr>
+            </a:lvl6pPr>
+            <a:lvl7pPr marL="2971800" indent="-228600" algn="l" defTabSz="457200" rtl="0" eaLnBrk="1" latinLnBrk="0" hangingPunct="1">
+              <a:spcBef>
+                <a:spcPts val="1000"/>
+              </a:spcBef>
+              <a:spcAft>
+                <a:spcPts val="0"/>
+              </a:spcAft>
+              <a:buClr>
+                <a:schemeClr val="accent1"/>
+              </a:buClr>
+              <a:buSzPct val="80000"/>
+              <a:buFont typeface="Wingdings 3" charset="2"/>
+              <a:buChar char=""/>
+              <a:defRPr sz="1200" b="0" i="0" kern="1200">
+                <a:solidFill>
+                  <a:schemeClr val="tx1">
+                    <a:lumMod val="75000"/>
+                    <a:lumOff val="25000"/>
+                  </a:schemeClr>
+                </a:solidFill>
+                <a:latin typeface="+mn-lt"/>
+                <a:ea typeface="+mn-ea"/>
+                <a:cs typeface="+mn-cs"/>
+              </a:defRPr>
+            </a:lvl7pPr>
+            <a:lvl8pPr marL="3429000" indent="-228600" algn="l" defTabSz="457200" rtl="0" eaLnBrk="1" latinLnBrk="0" hangingPunct="1">
+              <a:spcBef>
+                <a:spcPts val="1000"/>
+              </a:spcBef>
+              <a:spcAft>
+                <a:spcPts val="0"/>
+              </a:spcAft>
+              <a:buClr>
+                <a:schemeClr val="accent1"/>
+              </a:buClr>
+              <a:buSzPct val="80000"/>
+              <a:buFont typeface="Wingdings 3" charset="2"/>
+              <a:buChar char=""/>
+              <a:defRPr sz="1200" b="0" i="0" kern="1200">
+                <a:solidFill>
+                  <a:schemeClr val="tx1">
+                    <a:lumMod val="75000"/>
+                    <a:lumOff val="25000"/>
+                  </a:schemeClr>
+                </a:solidFill>
+                <a:latin typeface="+mn-lt"/>
+                <a:ea typeface="+mn-ea"/>
+                <a:cs typeface="+mn-cs"/>
+              </a:defRPr>
+            </a:lvl8pPr>
+            <a:lvl9pPr marL="3886200" indent="-228600" algn="l" defTabSz="457200" rtl="0" eaLnBrk="1" latinLnBrk="0" hangingPunct="1">
+              <a:spcBef>
+                <a:spcPts val="1000"/>
+              </a:spcBef>
+              <a:spcAft>
+                <a:spcPts val="0"/>
+              </a:spcAft>
+              <a:buClr>
+                <a:schemeClr val="accent1"/>
+              </a:buClr>
+              <a:buSzPct val="80000"/>
+              <a:buFont typeface="Wingdings 3" charset="2"/>
+              <a:buChar char=""/>
+              <a:defRPr sz="1200" b="0" i="0" kern="1200">
+                <a:solidFill>
+                  <a:schemeClr val="tx1">
+                    <a:lumMod val="75000"/>
+                    <a:lumOff val="25000"/>
+                  </a:schemeClr>
+                </a:solidFill>
+                <a:latin typeface="+mn-lt"/>
+                <a:ea typeface="+mn-ea"/>
+                <a:cs typeface="+mn-cs"/>
+              </a:defRPr>
+            </a:lvl9pPr>
+          </a:lstStyle>
+          <a:p>
+            <a:r>
+              <a:rPr lang="en-US" dirty="0"/>
+              <a:t>Human Resources responses are 6.3% lower than others</a:t>
+            </a:r>
+          </a:p>
+        </p:txBody>
+      </p:sp>
+      <p:pic>
+        <p:nvPicPr>
+          <p:cNvPr id="7" name="Picture 6">
+            <a:extLst>
+              <a:ext uri="{FF2B5EF4-FFF2-40B4-BE49-F238E27FC236}">
+                <a16:creationId xmlns:a16="http://schemas.microsoft.com/office/drawing/2014/main" id="{76EE4327-8822-452A-9D3B-89C68BDBFAB9}"/>
+              </a:ext>
+            </a:extLst>
+          </p:cNvPr>
+          <p:cNvPicPr>
+            <a:picLocks noChangeAspect="1"/>
+          </p:cNvPicPr>
+          <p:nvPr/>
+        </p:nvPicPr>
+        <p:blipFill>
+          <a:blip r:embed="rId2"/>
+          <a:stretch>
+            <a:fillRect/>
+          </a:stretch>
+        </p:blipFill>
+        <p:spPr>
+          <a:xfrm>
+            <a:off x="1154954" y="3235693"/>
+            <a:ext cx="3658346" cy="3327202"/>
+          </a:xfrm>
+          <a:prstGeom prst="rect">
+            <a:avLst/>
+          </a:prstGeom>
+          <a:ln>
+            <a:solidFill>
+              <a:schemeClr val="accent5">
+                <a:lumMod val="75000"/>
+              </a:schemeClr>
+            </a:solidFill>
+          </a:ln>
+        </p:spPr>
+      </p:pic>
+      <p:sp>
+        <p:nvSpPr>
+          <p:cNvPr id="8" name="Arrow: Right 7">
+            <a:extLst>
+              <a:ext uri="{FF2B5EF4-FFF2-40B4-BE49-F238E27FC236}">
+                <a16:creationId xmlns:a16="http://schemas.microsoft.com/office/drawing/2014/main" id="{D31A44CE-8BF0-461B-AB0A-D0EF71B259AF}"/>
+              </a:ext>
+            </a:extLst>
+          </p:cNvPr>
+          <p:cNvSpPr/>
+          <p:nvPr/>
+        </p:nvSpPr>
+        <p:spPr>
+          <a:xfrm>
+            <a:off x="5347923" y="3733800"/>
+            <a:ext cx="1185486" cy="952500"/>
+          </a:xfrm>
+          <a:prstGeom prst="rightArrow">
+            <a:avLst/>
+          </a:prstGeom>
+        </p:spPr>
+        <p:style>
+          <a:lnRef idx="2">
+            <a:schemeClr val="accent5">
+              <a:shade val="50000"/>
+            </a:schemeClr>
+          </a:lnRef>
+          <a:fillRef idx="1">
+            <a:schemeClr val="accent5"/>
+          </a:fillRef>
+          <a:effectRef idx="0">
+            <a:schemeClr val="accent5"/>
+          </a:effectRef>
+          <a:fontRef idx="minor">
+            <a:schemeClr val="lt1"/>
+          </a:fontRef>
+        </p:style>
+        <p:txBody>
+          <a:bodyPr rtlCol="0" anchor="ctr"/>
+          <a:lstStyle/>
+          <a:p>
+            <a:pPr algn="ctr"/>
+            <a:endParaRPr lang="en-US"/>
+          </a:p>
+        </p:txBody>
+      </p:sp>
+      <p:pic>
+        <p:nvPicPr>
+          <p:cNvPr id="9" name="Picture 8">
+            <a:extLst>
+              <a:ext uri="{FF2B5EF4-FFF2-40B4-BE49-F238E27FC236}">
+                <a16:creationId xmlns:a16="http://schemas.microsoft.com/office/drawing/2014/main" id="{01C07144-22B0-41D4-894D-3C85FDE04EA6}"/>
+              </a:ext>
+            </a:extLst>
+          </p:cNvPr>
+          <p:cNvPicPr>
+            <a:picLocks noChangeAspect="1"/>
+          </p:cNvPicPr>
+          <p:nvPr/>
+        </p:nvPicPr>
+        <p:blipFill>
+          <a:blip r:embed="rId3"/>
+          <a:stretch>
+            <a:fillRect/>
+          </a:stretch>
+        </p:blipFill>
+        <p:spPr>
+          <a:xfrm>
+            <a:off x="7023614" y="3070476"/>
+            <a:ext cx="4013432" cy="3650147"/>
+          </a:xfrm>
+          <a:prstGeom prst="rect">
+            <a:avLst/>
+          </a:prstGeom>
+          <a:ln>
+            <a:solidFill>
+              <a:schemeClr val="accent5">
+                <a:lumMod val="75000"/>
+              </a:schemeClr>
+            </a:solidFill>
+          </a:ln>
+          <a:effectLst/>
+        </p:spPr>
+      </p:pic>
+    </p:spTree>
+    <p:extLst>
+      <p:ext uri="{BB962C8B-B14F-4D97-AF65-F5344CB8AC3E}">
+        <p14:creationId xmlns:p14="http://schemas.microsoft.com/office/powerpoint/2010/main" val="1307872378"/>
+      </p:ext>
+    </p:extLst>
+  </p:cSld>
+  <p:clrMapOvr>
+    <a:masterClrMapping/>
+  </p:clrMapOvr>
+</p:sld>
+</file>
+
+<file path=ppt/slides/slide4.xml><?xml version="1.0" encoding="utf-8"?>
+<p:sld xmlns:a="http://schemas.openxmlformats.org/drawingml/2006/main" xmlns:r="http://schemas.openxmlformats.org/officeDocument/2006/relationships" xmlns:p="http://schemas.openxmlformats.org/presentationml/2006/main">
+  <p:cSld>
+    <p:spTree>
+      <p:nvGrpSpPr>
+        <p:cNvPr id="1" name=""/>
+        <p:cNvGrpSpPr/>
+        <p:nvPr/>
+      </p:nvGrpSpPr>
+      <p:grpSpPr>
+        <a:xfrm>
+          <a:off x="0" y="0"/>
+          <a:ext cx="0" cy="0"/>
+          <a:chOff x="0" y="0"/>
+          <a:chExt cx="0" cy="0"/>
+        </a:xfrm>
+      </p:grpSpPr>
+      <p:sp>
+        <p:nvSpPr>
+          <p:cNvPr id="2" name="Title 1">
+            <a:extLst>
+              <a:ext uri="{FF2B5EF4-FFF2-40B4-BE49-F238E27FC236}">
                 <a16:creationId xmlns:a16="http://schemas.microsoft.com/office/drawing/2014/main" id="{B6E93104-27B8-4610-BF83-7EF41813F691}"/>
               </a:ext>
             </a:extLst>
@@ -13951,9 +14427,17 @@
 </p:sld>
 </file>
 
-<file path=ppt/slides/slide4.xml><?xml version="1.0" encoding="utf-8"?>
+<file path=ppt/slides/slide5.xml><?xml version="1.0" encoding="utf-8"?>
 <p:sld xmlns:a="http://schemas.openxmlformats.org/drawingml/2006/main" xmlns:r="http://schemas.openxmlformats.org/officeDocument/2006/relationships" xmlns:p="http://schemas.openxmlformats.org/presentationml/2006/main">
   <p:cSld>
+    <p:bg>
+      <p:bgPr>
+        <a:solidFill>
+          <a:schemeClr val="bg1"/>
+        </a:solidFill>
+        <a:effectLst/>
+      </p:bgPr>
+    </p:bg>
     <p:spTree>
       <p:nvGrpSpPr>
         <p:cNvPr id="1" name=""/>
@@ -13970,10 +14454,437 @@
       </p:grpSpPr>
       <p:sp>
         <p:nvSpPr>
+          <p:cNvPr id="10" name="Rectangle 9">
+            <a:extLst>
+              <a:ext uri="{FF2B5EF4-FFF2-40B4-BE49-F238E27FC236}">
+                <a16:creationId xmlns:a16="http://schemas.microsoft.com/office/drawing/2014/main" id="{C43A114B-CAF8-402E-A898-DEE2C2022EBD}"/>
+              </a:ext>
+              <a:ext uri="{C183D7F6-B498-43B3-948B-1728B52AA6E4}">
+                <adec:decorative xmlns:adec="http://schemas.microsoft.com/office/drawing/2017/decorative" val="1"/>
+              </a:ext>
+            </a:extLst>
+          </p:cNvPr>
+          <p:cNvSpPr>
+            <a:spLocks noGrp="1" noRot="1" noChangeAspect="1" noMove="1" noResize="1" noEditPoints="1" noAdjustHandles="1" noChangeArrowheads="1" noChangeShapeType="1" noTextEdit="1"/>
+          </p:cNvSpPr>
+          <p:nvPr>
+            <p:extLst>
+              <p:ext uri="{386F3935-93C4-4BCD-93E2-E3B085C9AB24}">
+                <p16:designElem xmlns:p16="http://schemas.microsoft.com/office/powerpoint/2015/main" val="1"/>
+              </p:ext>
+            </p:extLst>
+          </p:nvPr>
+        </p:nvSpPr>
+        <p:spPr>
+          <a:xfrm>
+            <a:off x="0" y="0"/>
+            <a:ext cx="12192000" cy="6858000"/>
+          </a:xfrm>
+          <a:prstGeom prst="rect">
+            <a:avLst/>
+          </a:prstGeom>
+          <a:blipFill>
+            <a:blip r:embed="rId2">
+              <a:duotone>
+                <a:schemeClr val="dk2">
+                  <a:shade val="69000"/>
+                  <a:hueMod val="108000"/>
+                  <a:satMod val="164000"/>
+                  <a:lumMod val="74000"/>
+                </a:schemeClr>
+                <a:schemeClr val="dk2">
+                  <a:tint val="96000"/>
+                  <a:hueMod val="88000"/>
+                  <a:satMod val="140000"/>
+                  <a:lumMod val="132000"/>
+                </a:schemeClr>
+              </a:duotone>
+            </a:blip>
+            <a:stretch>
+              <a:fillRect/>
+            </a:stretch>
+          </a:blipFill>
+          <a:ln>
+            <a:noFill/>
+          </a:ln>
+        </p:spPr>
+        <p:style>
+          <a:lnRef idx="2">
+            <a:schemeClr val="accent1">
+              <a:shade val="50000"/>
+            </a:schemeClr>
+          </a:lnRef>
+          <a:fillRef idx="1">
+            <a:schemeClr val="accent1"/>
+          </a:fillRef>
+          <a:effectRef idx="0">
+            <a:schemeClr val="accent1"/>
+          </a:effectRef>
+          <a:fontRef idx="minor">
+            <a:schemeClr val="lt1"/>
+          </a:fontRef>
+        </p:style>
+      </p:sp>
+      <p:sp>
+        <p:nvSpPr>
+          <p:cNvPr id="12" name="Oval 11">
+            <a:extLst>
+              <a:ext uri="{FF2B5EF4-FFF2-40B4-BE49-F238E27FC236}">
+                <a16:creationId xmlns:a16="http://schemas.microsoft.com/office/drawing/2014/main" id="{64E68BB1-DCF6-49AB-8FF1-7E68DCBCD111}"/>
+              </a:ext>
+              <a:ext uri="{C183D7F6-B498-43B3-948B-1728B52AA6E4}">
+                <adec:decorative xmlns:adec="http://schemas.microsoft.com/office/drawing/2017/decorative" val="1"/>
+              </a:ext>
+            </a:extLst>
+          </p:cNvPr>
+          <p:cNvSpPr>
+            <a:spLocks noGrp="1" noRot="1" noChangeAspect="1" noMove="1" noResize="1" noEditPoints="1" noAdjustHandles="1" noChangeArrowheads="1" noChangeShapeType="1" noTextEdit="1"/>
+          </p:cNvSpPr>
+          <p:nvPr>
+            <p:extLst>
+              <p:ext uri="{386F3935-93C4-4BCD-93E2-E3B085C9AB24}">
+                <p16:designElem xmlns:p16="http://schemas.microsoft.com/office/powerpoint/2015/main" val="1"/>
+              </p:ext>
+            </p:extLst>
+          </p:nvPr>
+        </p:nvSpPr>
+        <p:spPr>
+          <a:xfrm>
+            <a:off x="8761412" y="1828800"/>
+            <a:ext cx="2819400" cy="2819400"/>
+          </a:xfrm>
+          <a:prstGeom prst="ellipse">
+            <a:avLst/>
+          </a:prstGeom>
+          <a:gradFill flip="none" rotWithShape="1">
+            <a:gsLst>
+              <a:gs pos="0">
+                <a:schemeClr val="accent5">
+                  <a:alpha val="7000"/>
+                </a:schemeClr>
+              </a:gs>
+              <a:gs pos="69000">
+                <a:schemeClr val="accent5">
+                  <a:alpha val="0"/>
+                </a:schemeClr>
+              </a:gs>
+              <a:gs pos="36000">
+                <a:schemeClr val="accent5">
+                  <a:alpha val="6000"/>
+                </a:schemeClr>
+              </a:gs>
+            </a:gsLst>
+            <a:path path="circle">
+              <a:fillToRect l="50000" t="50000" r="50000" b="50000"/>
+            </a:path>
+            <a:tileRect/>
+          </a:gradFill>
+          <a:ln>
+            <a:noFill/>
+          </a:ln>
+          <a:effectLst/>
+        </p:spPr>
+        <p:style>
+          <a:lnRef idx="1">
+            <a:schemeClr val="accent1"/>
+          </a:lnRef>
+          <a:fillRef idx="3">
+            <a:schemeClr val="accent1"/>
+          </a:fillRef>
+          <a:effectRef idx="2">
+            <a:schemeClr val="accent1"/>
+          </a:effectRef>
+          <a:fontRef idx="minor">
+            <a:schemeClr val="lt1"/>
+          </a:fontRef>
+        </p:style>
+      </p:sp>
+      <p:sp>
+        <p:nvSpPr>
+          <p:cNvPr id="14" name="Oval 13">
+            <a:extLst>
+              <a:ext uri="{FF2B5EF4-FFF2-40B4-BE49-F238E27FC236}">
+                <a16:creationId xmlns:a16="http://schemas.microsoft.com/office/drawing/2014/main" id="{DA9B8539-604B-420E-BA1B-0A2E64CD7C72}"/>
+              </a:ext>
+              <a:ext uri="{C183D7F6-B498-43B3-948B-1728B52AA6E4}">
+                <adec:decorative xmlns:adec="http://schemas.microsoft.com/office/drawing/2017/decorative" val="1"/>
+              </a:ext>
+            </a:extLst>
+          </p:cNvPr>
+          <p:cNvSpPr>
+            <a:spLocks noGrp="1" noRot="1" noChangeAspect="1" noMove="1" noResize="1" noEditPoints="1" noAdjustHandles="1" noChangeArrowheads="1" noChangeShapeType="1" noTextEdit="1"/>
+          </p:cNvSpPr>
+          <p:nvPr>
+            <p:extLst>
+              <p:ext uri="{386F3935-93C4-4BCD-93E2-E3B085C9AB24}">
+                <p16:designElem xmlns:p16="http://schemas.microsoft.com/office/powerpoint/2015/main" val="1"/>
+              </p:ext>
+            </p:extLst>
+          </p:nvPr>
+        </p:nvSpPr>
+        <p:spPr>
+          <a:xfrm>
+            <a:off x="8761412" y="5870955"/>
+            <a:ext cx="990600" cy="990600"/>
+          </a:xfrm>
+          <a:prstGeom prst="ellipse">
+            <a:avLst/>
+          </a:prstGeom>
+          <a:gradFill flip="none" rotWithShape="1">
+            <a:gsLst>
+              <a:gs pos="0">
+                <a:schemeClr val="accent5">
+                  <a:alpha val="14000"/>
+                </a:schemeClr>
+              </a:gs>
+              <a:gs pos="66000">
+                <a:schemeClr val="accent5">
+                  <a:alpha val="0"/>
+                </a:schemeClr>
+              </a:gs>
+              <a:gs pos="36000">
+                <a:schemeClr val="accent5">
+                  <a:alpha val="7000"/>
+                </a:schemeClr>
+              </a:gs>
+            </a:gsLst>
+            <a:path path="circle">
+              <a:fillToRect l="50000" t="50000" r="50000" b="50000"/>
+            </a:path>
+            <a:tileRect/>
+          </a:gradFill>
+          <a:ln>
+            <a:noFill/>
+          </a:ln>
+          <a:effectLst/>
+        </p:spPr>
+        <p:style>
+          <a:lnRef idx="1">
+            <a:schemeClr val="accent1"/>
+          </a:lnRef>
+          <a:fillRef idx="3">
+            <a:schemeClr val="accent1"/>
+          </a:fillRef>
+          <a:effectRef idx="2">
+            <a:schemeClr val="accent1"/>
+          </a:effectRef>
+          <a:fontRef idx="minor">
+            <a:schemeClr val="lt1"/>
+          </a:fontRef>
+        </p:style>
+      </p:sp>
+      <p:sp>
+        <p:nvSpPr>
+          <p:cNvPr id="16" name="Oval 15">
+            <a:extLst>
+              <a:ext uri="{FF2B5EF4-FFF2-40B4-BE49-F238E27FC236}">
+                <a16:creationId xmlns:a16="http://schemas.microsoft.com/office/drawing/2014/main" id="{7236CAA2-54C3-4136-B0CC-6837B14D8143}"/>
+              </a:ext>
+              <a:ext uri="{C183D7F6-B498-43B3-948B-1728B52AA6E4}">
+                <adec:decorative xmlns:adec="http://schemas.microsoft.com/office/drawing/2017/decorative" val="1"/>
+              </a:ext>
+            </a:extLst>
+          </p:cNvPr>
+          <p:cNvSpPr>
+            <a:spLocks noGrp="1" noRot="1" noChangeAspect="1" noMove="1" noResize="1" noEditPoints="1" noAdjustHandles="1" noChangeArrowheads="1" noChangeShapeType="1" noTextEdit="1"/>
+          </p:cNvSpPr>
+          <p:nvPr>
+            <p:extLst>
+              <p:ext uri="{386F3935-93C4-4BCD-93E2-E3B085C9AB24}">
+                <p16:designElem xmlns:p16="http://schemas.microsoft.com/office/powerpoint/2015/main" val="1"/>
+              </p:ext>
+            </p:extLst>
+          </p:nvPr>
+        </p:nvSpPr>
+        <p:spPr>
+          <a:xfrm>
+            <a:off x="-1588" y="2667000"/>
+            <a:ext cx="4191000" cy="4191000"/>
+          </a:xfrm>
+          <a:prstGeom prst="ellipse">
+            <a:avLst/>
+          </a:prstGeom>
+          <a:gradFill flip="none" rotWithShape="1">
+            <a:gsLst>
+              <a:gs pos="0">
+                <a:schemeClr val="accent5">
+                  <a:alpha val="11000"/>
+                </a:schemeClr>
+              </a:gs>
+              <a:gs pos="75000">
+                <a:schemeClr val="accent5">
+                  <a:alpha val="0"/>
+                </a:schemeClr>
+              </a:gs>
+              <a:gs pos="36000">
+                <a:schemeClr val="accent5">
+                  <a:alpha val="10000"/>
+                </a:schemeClr>
+              </a:gs>
+            </a:gsLst>
+            <a:path path="circle">
+              <a:fillToRect l="50000" t="50000" r="50000" b="50000"/>
+            </a:path>
+            <a:tileRect/>
+          </a:gradFill>
+          <a:ln>
+            <a:noFill/>
+          </a:ln>
+          <a:effectLst/>
+        </p:spPr>
+        <p:style>
+          <a:lnRef idx="1">
+            <a:schemeClr val="accent1"/>
+          </a:lnRef>
+          <a:fillRef idx="3">
+            <a:schemeClr val="accent1"/>
+          </a:fillRef>
+          <a:effectRef idx="2">
+            <a:schemeClr val="accent1"/>
+          </a:effectRef>
+          <a:fontRef idx="minor">
+            <a:schemeClr val="lt1"/>
+          </a:fontRef>
+        </p:style>
+      </p:sp>
+      <p:sp>
+        <p:nvSpPr>
+          <p:cNvPr id="18" name="Freeform 5">
+            <a:extLst>
+              <a:ext uri="{FF2B5EF4-FFF2-40B4-BE49-F238E27FC236}">
+                <a16:creationId xmlns:a16="http://schemas.microsoft.com/office/drawing/2014/main" id="{40F86E67-9E86-453F-92BC-648189829C2F}"/>
+              </a:ext>
+              <a:ext uri="{C183D7F6-B498-43B3-948B-1728B52AA6E4}">
+                <adec:decorative xmlns:adec="http://schemas.microsoft.com/office/drawing/2017/decorative" val="1"/>
+              </a:ext>
+            </a:extLst>
+          </p:cNvPr>
+          <p:cNvSpPr>
+            <a:spLocks noGrp="1" noRot="1" noChangeAspect="1" noMove="1" noResize="1" noEditPoints="1" noAdjustHandles="1" noChangeArrowheads="1" noChangeShapeType="1" noTextEdit="1"/>
+          </p:cNvSpPr>
+          <p:nvPr>
+            <p:extLst>
+              <p:ext uri="{386F3935-93C4-4BCD-93E2-E3B085C9AB24}">
+                <p16:designElem xmlns:p16="http://schemas.microsoft.com/office/powerpoint/2015/main" val="1"/>
+              </p:ext>
+            </p:extLst>
+          </p:nvPr>
+        </p:nvSpPr>
+        <p:spPr bwMode="gray">
+          <a:xfrm>
+            <a:off x="-1588" y="1587"/>
+            <a:ext cx="12192000" cy="6856413"/>
+          </a:xfrm>
+          <a:custGeom>
+            <a:avLst/>
+            <a:gdLst/>
+            <a:ahLst/>
+            <a:cxnLst/>
+            <a:rect l="0" t="0" r="r" b="b"/>
+            <a:pathLst>
+              <a:path w="15356" h="8638">
+                <a:moveTo>
+                  <a:pt x="0" y="0"/>
+                </a:moveTo>
+                <a:lnTo>
+                  <a:pt x="0" y="8638"/>
+                </a:lnTo>
+                <a:lnTo>
+                  <a:pt x="15356" y="8638"/>
+                </a:lnTo>
+                <a:lnTo>
+                  <a:pt x="15356" y="0"/>
+                </a:lnTo>
+                <a:lnTo>
+                  <a:pt x="0" y="0"/>
+                </a:lnTo>
+                <a:close/>
+                <a:moveTo>
+                  <a:pt x="14748" y="8038"/>
+                </a:moveTo>
+                <a:lnTo>
+                  <a:pt x="600" y="8038"/>
+                </a:lnTo>
+                <a:lnTo>
+                  <a:pt x="600" y="592"/>
+                </a:lnTo>
+                <a:lnTo>
+                  <a:pt x="14748" y="592"/>
+                </a:lnTo>
+                <a:lnTo>
+                  <a:pt x="14748" y="8038"/>
+                </a:lnTo>
+                <a:close/>
+              </a:path>
+            </a:pathLst>
+          </a:custGeom>
+          <a:solidFill>
+            <a:schemeClr val="bg1"/>
+          </a:solidFill>
+          <a:ln>
+            <a:noFill/>
+          </a:ln>
+        </p:spPr>
+      </p:sp>
+      <p:sp>
+        <p:nvSpPr>
+          <p:cNvPr id="20" name="Rectangle 19">
+            <a:extLst>
+              <a:ext uri="{FF2B5EF4-FFF2-40B4-BE49-F238E27FC236}">
+                <a16:creationId xmlns:a16="http://schemas.microsoft.com/office/drawing/2014/main" id="{F73C5439-21D4-46F3-9CF4-FF1CE786FF15}"/>
+              </a:ext>
+              <a:ext uri="{C183D7F6-B498-43B3-948B-1728B52AA6E4}">
+                <adec:decorative xmlns:adec="http://schemas.microsoft.com/office/drawing/2017/decorative" val="1"/>
+              </a:ext>
+            </a:extLst>
+          </p:cNvPr>
+          <p:cNvSpPr>
+            <a:spLocks noGrp="1" noRot="1" noChangeAspect="1" noMove="1" noResize="1" noEditPoints="1" noAdjustHandles="1" noChangeArrowheads="1" noChangeShapeType="1" noTextEdit="1"/>
+          </p:cNvSpPr>
+          <p:nvPr>
+            <p:extLst>
+              <p:ext uri="{386F3935-93C4-4BCD-93E2-E3B085C9AB24}">
+                <p16:designElem xmlns:p16="http://schemas.microsoft.com/office/powerpoint/2015/main" val="1"/>
+              </p:ext>
+            </p:extLst>
+          </p:nvPr>
+        </p:nvSpPr>
+        <p:spPr>
+          <a:xfrm>
+            <a:off x="10437812" y="0"/>
+            <a:ext cx="685800" cy="1143000"/>
+          </a:xfrm>
+          <a:prstGeom prst="rect">
+            <a:avLst/>
+          </a:prstGeom>
+          <a:solidFill>
+            <a:schemeClr val="accent1"/>
+          </a:solidFill>
+          <a:ln>
+            <a:noFill/>
+          </a:ln>
+        </p:spPr>
+        <p:style>
+          <a:lnRef idx="1">
+            <a:schemeClr val="accent1"/>
+          </a:lnRef>
+          <a:fillRef idx="3">
+            <a:schemeClr val="accent1"/>
+          </a:fillRef>
+          <a:effectRef idx="2">
+            <a:schemeClr val="accent1"/>
+          </a:effectRef>
+          <a:fontRef idx="minor">
+            <a:schemeClr val="lt1"/>
+          </a:fontRef>
+        </p:style>
+      </p:sp>
+      <p:sp>
+        <p:nvSpPr>
           <p:cNvPr id="2" name="Title 1">
             <a:extLst>
               <a:ext uri="{FF2B5EF4-FFF2-40B4-BE49-F238E27FC236}">
-                <a16:creationId xmlns:a16="http://schemas.microsoft.com/office/drawing/2014/main" id="{8774AB4C-A928-4DF2-B474-6E732F16190A}"/>
+                <a16:creationId xmlns:a16="http://schemas.microsoft.com/office/drawing/2014/main" id="{BED2D834-FD10-4481-9C51-8D28CE58719A}"/>
               </a:ext>
             </a:extLst>
           </p:cNvPr>
@@ -13984,410 +14895,40 @@
             <p:ph type="title"/>
           </p:nvPr>
         </p:nvSpPr>
-        <p:spPr/>
-        <p:txBody>
-          <a:bodyPr/>
-          <a:lstStyle/>
-          <a:p>
-            <a:r>
-              <a:rPr lang="pl-PL" dirty="0"/>
-              <a:t>Job Satisfaction Survey:</a:t>
-            </a:r>
-            <a:endParaRPr lang="en-US" dirty="0"/>
-          </a:p>
-        </p:txBody>
-      </p:sp>
-      <p:sp>
-        <p:nvSpPr>
-          <p:cNvPr id="3" name="Content Placeholder 2">
-            <a:extLst>
-              <a:ext uri="{FF2B5EF4-FFF2-40B4-BE49-F238E27FC236}">
-                <a16:creationId xmlns:a16="http://schemas.microsoft.com/office/drawing/2014/main" id="{9E0EDB56-CF7F-4034-867E-EEE246646959}"/>
-              </a:ext>
-            </a:extLst>
-          </p:cNvPr>
-          <p:cNvSpPr>
-            <a:spLocks noGrp="1"/>
-          </p:cNvSpPr>
-          <p:nvPr>
-            <p:ph idx="1"/>
-          </p:nvPr>
-        </p:nvSpPr>
         <p:spPr>
           <a:xfrm>
-            <a:off x="1154954" y="2311400"/>
-            <a:ext cx="3984139" cy="3416300"/>
+            <a:off x="6744929" y="639098"/>
+            <a:ext cx="4798142" cy="3755922"/>
           </a:xfrm>
         </p:spPr>
         <p:txBody>
-          <a:bodyPr/>
-          <a:lstStyle/>
-          <a:p>
-            <a:r>
-              <a:rPr lang="en-US" dirty="0"/>
-              <a:t>No major deviations across departments. Let’s take a closer look. </a:t>
-            </a:r>
-          </a:p>
-        </p:txBody>
-      </p:sp>
-      <p:sp>
-        <p:nvSpPr>
-          <p:cNvPr id="6" name="Content Placeholder 2">
-            <a:extLst>
-              <a:ext uri="{FF2B5EF4-FFF2-40B4-BE49-F238E27FC236}">
-                <a16:creationId xmlns:a16="http://schemas.microsoft.com/office/drawing/2014/main" id="{DC21AC21-6541-4EBC-B4C6-34586999E582}"/>
-              </a:ext>
-            </a:extLst>
-          </p:cNvPr>
-          <p:cNvSpPr txBox="1">
-            <a:spLocks/>
-          </p:cNvSpPr>
-          <p:nvPr/>
-        </p:nvSpPr>
-        <p:spPr>
-          <a:xfrm>
-            <a:off x="6751653" y="2311400"/>
-            <a:ext cx="3984139" cy="3416300"/>
-          </a:xfrm>
-          <a:prstGeom prst="rect">
-            <a:avLst/>
-          </a:prstGeom>
-        </p:spPr>
-        <p:txBody>
-          <a:bodyPr vert="horz" lIns="91440" tIns="45720" rIns="91440" bIns="45720" rtlCol="0">
+          <a:bodyPr vert="horz" lIns="91440" tIns="45720" rIns="91440" bIns="45720" rtlCol="0" anchor="b">
             <a:normAutofit/>
           </a:bodyPr>
-          <a:lstStyle>
-            <a:lvl1pPr marL="342900" indent="-342900" algn="l" defTabSz="457200" rtl="0" eaLnBrk="1" latinLnBrk="0" hangingPunct="1">
-              <a:spcBef>
-                <a:spcPts val="1000"/>
-              </a:spcBef>
-              <a:spcAft>
-                <a:spcPts val="0"/>
-              </a:spcAft>
-              <a:buClr>
-                <a:schemeClr val="accent1"/>
-              </a:buClr>
-              <a:buSzPct val="80000"/>
-              <a:buFont typeface="Wingdings 3" charset="2"/>
-              <a:buChar char=""/>
-              <a:defRPr sz="1800" b="0" i="0" kern="1200">
-                <a:solidFill>
-                  <a:schemeClr val="tx1">
-                    <a:lumMod val="75000"/>
-                    <a:lumOff val="25000"/>
-                  </a:schemeClr>
-                </a:solidFill>
-                <a:latin typeface="+mn-lt"/>
-                <a:ea typeface="+mn-ea"/>
-                <a:cs typeface="+mn-cs"/>
-              </a:defRPr>
-            </a:lvl1pPr>
-            <a:lvl2pPr marL="742950" indent="-285750" algn="l" defTabSz="457200" rtl="0" eaLnBrk="1" latinLnBrk="0" hangingPunct="1">
-              <a:spcBef>
-                <a:spcPts val="1000"/>
-              </a:spcBef>
-              <a:spcAft>
-                <a:spcPts val="0"/>
-              </a:spcAft>
-              <a:buClr>
-                <a:schemeClr val="accent1"/>
-              </a:buClr>
-              <a:buSzPct val="80000"/>
-              <a:buFont typeface="Wingdings 3" charset="2"/>
-              <a:buChar char=""/>
-              <a:defRPr sz="1600" b="0" i="0" kern="1200">
-                <a:solidFill>
-                  <a:schemeClr val="tx1">
-                    <a:lumMod val="75000"/>
-                    <a:lumOff val="25000"/>
-                  </a:schemeClr>
-                </a:solidFill>
-                <a:latin typeface="+mn-lt"/>
-                <a:ea typeface="+mn-ea"/>
-                <a:cs typeface="+mn-cs"/>
-              </a:defRPr>
-            </a:lvl2pPr>
-            <a:lvl3pPr marL="1143000" indent="-228600" algn="l" defTabSz="457200" rtl="0" eaLnBrk="1" latinLnBrk="0" hangingPunct="1">
-              <a:spcBef>
-                <a:spcPts val="1000"/>
-              </a:spcBef>
-              <a:spcAft>
-                <a:spcPts val="0"/>
-              </a:spcAft>
-              <a:buClr>
-                <a:schemeClr val="accent1"/>
-              </a:buClr>
-              <a:buSzPct val="80000"/>
-              <a:buFont typeface="Wingdings 3" charset="2"/>
-              <a:buChar char=""/>
-              <a:defRPr sz="1400" b="0" i="0" kern="1200">
-                <a:solidFill>
-                  <a:schemeClr val="tx1">
-                    <a:lumMod val="75000"/>
-                    <a:lumOff val="25000"/>
-                  </a:schemeClr>
-                </a:solidFill>
-                <a:latin typeface="+mn-lt"/>
-                <a:ea typeface="+mn-ea"/>
-                <a:cs typeface="+mn-cs"/>
-              </a:defRPr>
-            </a:lvl3pPr>
-            <a:lvl4pPr marL="1600200" indent="-228600" algn="l" defTabSz="457200" rtl="0" eaLnBrk="1" latinLnBrk="0" hangingPunct="1">
-              <a:spcBef>
-                <a:spcPts val="1000"/>
-              </a:spcBef>
-              <a:spcAft>
-                <a:spcPts val="0"/>
-              </a:spcAft>
-              <a:buClr>
-                <a:schemeClr val="accent1"/>
-              </a:buClr>
-              <a:buSzPct val="80000"/>
-              <a:buFont typeface="Wingdings 3" charset="2"/>
-              <a:buChar char=""/>
-              <a:defRPr sz="1200" b="0" i="0" kern="1200">
-                <a:solidFill>
-                  <a:schemeClr val="tx1">
-                    <a:lumMod val="75000"/>
-                    <a:lumOff val="25000"/>
-                  </a:schemeClr>
-                </a:solidFill>
-                <a:latin typeface="+mn-lt"/>
-                <a:ea typeface="+mn-ea"/>
-                <a:cs typeface="+mn-cs"/>
-              </a:defRPr>
-            </a:lvl4pPr>
-            <a:lvl5pPr marL="2057400" indent="-228600" algn="l" defTabSz="457200" rtl="0" eaLnBrk="1" latinLnBrk="0" hangingPunct="1">
-              <a:spcBef>
-                <a:spcPts val="1000"/>
-              </a:spcBef>
-              <a:spcAft>
-                <a:spcPts val="0"/>
-              </a:spcAft>
-              <a:buClr>
-                <a:schemeClr val="accent1"/>
-              </a:buClr>
-              <a:buSzPct val="80000"/>
-              <a:buFont typeface="Wingdings 3" charset="2"/>
-              <a:buChar char=""/>
-              <a:defRPr sz="1200" b="0" i="0" kern="1200">
-                <a:solidFill>
-                  <a:schemeClr val="tx1">
-                    <a:lumMod val="75000"/>
-                    <a:lumOff val="25000"/>
-                  </a:schemeClr>
-                </a:solidFill>
-                <a:latin typeface="+mn-lt"/>
-                <a:ea typeface="+mn-ea"/>
-                <a:cs typeface="+mn-cs"/>
-              </a:defRPr>
-            </a:lvl5pPr>
-            <a:lvl6pPr marL="2514600" indent="-228600" algn="l" defTabSz="457200" rtl="0" eaLnBrk="1" latinLnBrk="0" hangingPunct="1">
-              <a:spcBef>
-                <a:spcPts val="1000"/>
-              </a:spcBef>
-              <a:spcAft>
-                <a:spcPts val="0"/>
-              </a:spcAft>
-              <a:buClr>
-                <a:schemeClr val="accent1"/>
-              </a:buClr>
-              <a:buSzPct val="80000"/>
-              <a:buFont typeface="Wingdings 3" charset="2"/>
-              <a:buChar char=""/>
-              <a:defRPr sz="1200" b="0" i="0" kern="1200">
-                <a:solidFill>
-                  <a:schemeClr val="tx1">
-                    <a:lumMod val="75000"/>
-                    <a:lumOff val="25000"/>
-                  </a:schemeClr>
-                </a:solidFill>
-                <a:latin typeface="+mn-lt"/>
-                <a:ea typeface="+mn-ea"/>
-                <a:cs typeface="+mn-cs"/>
-              </a:defRPr>
-            </a:lvl6pPr>
-            <a:lvl7pPr marL="2971800" indent="-228600" algn="l" defTabSz="457200" rtl="0" eaLnBrk="1" latinLnBrk="0" hangingPunct="1">
-              <a:spcBef>
-                <a:spcPts val="1000"/>
-              </a:spcBef>
-              <a:spcAft>
-                <a:spcPts val="0"/>
-              </a:spcAft>
-              <a:buClr>
-                <a:schemeClr val="accent1"/>
-              </a:buClr>
-              <a:buSzPct val="80000"/>
-              <a:buFont typeface="Wingdings 3" charset="2"/>
-              <a:buChar char=""/>
-              <a:defRPr sz="1200" b="0" i="0" kern="1200">
-                <a:solidFill>
-                  <a:schemeClr val="tx1">
-                    <a:lumMod val="75000"/>
-                    <a:lumOff val="25000"/>
-                  </a:schemeClr>
-                </a:solidFill>
-                <a:latin typeface="+mn-lt"/>
-                <a:ea typeface="+mn-ea"/>
-                <a:cs typeface="+mn-cs"/>
-              </a:defRPr>
-            </a:lvl7pPr>
-            <a:lvl8pPr marL="3429000" indent="-228600" algn="l" defTabSz="457200" rtl="0" eaLnBrk="1" latinLnBrk="0" hangingPunct="1">
-              <a:spcBef>
-                <a:spcPts val="1000"/>
-              </a:spcBef>
-              <a:spcAft>
-                <a:spcPts val="0"/>
-              </a:spcAft>
-              <a:buClr>
-                <a:schemeClr val="accent1"/>
-              </a:buClr>
-              <a:buSzPct val="80000"/>
-              <a:buFont typeface="Wingdings 3" charset="2"/>
-              <a:buChar char=""/>
-              <a:defRPr sz="1200" b="0" i="0" kern="1200">
-                <a:solidFill>
-                  <a:schemeClr val="tx1">
-                    <a:lumMod val="75000"/>
-                    <a:lumOff val="25000"/>
-                  </a:schemeClr>
-                </a:solidFill>
-                <a:latin typeface="+mn-lt"/>
-                <a:ea typeface="+mn-ea"/>
-                <a:cs typeface="+mn-cs"/>
-              </a:defRPr>
-            </a:lvl8pPr>
-            <a:lvl9pPr marL="3886200" indent="-228600" algn="l" defTabSz="457200" rtl="0" eaLnBrk="1" latinLnBrk="0" hangingPunct="1">
-              <a:spcBef>
-                <a:spcPts val="1000"/>
-              </a:spcBef>
-              <a:spcAft>
-                <a:spcPts val="0"/>
-              </a:spcAft>
-              <a:buClr>
-                <a:schemeClr val="accent1"/>
-              </a:buClr>
-              <a:buSzPct val="80000"/>
-              <a:buFont typeface="Wingdings 3" charset="2"/>
-              <a:buChar char=""/>
-              <a:defRPr sz="1200" b="0" i="0" kern="1200">
-                <a:solidFill>
-                  <a:schemeClr val="tx1">
-                    <a:lumMod val="75000"/>
-                    <a:lumOff val="25000"/>
-                  </a:schemeClr>
-                </a:solidFill>
-                <a:latin typeface="+mn-lt"/>
-                <a:ea typeface="+mn-ea"/>
-                <a:cs typeface="+mn-cs"/>
-              </a:defRPr>
-            </a:lvl9pPr>
-          </a:lstStyle>
+          <a:lstStyle/>
           <a:p>
             <a:r>
-              <a:rPr lang="en-US" dirty="0"/>
-              <a:t>Human Resources responses are 6.3% lower than others</a:t>
+              <a:rPr lang="en-US" sz="5400"/>
+              <a:t>Attrition Rates by Job Role</a:t>
             </a:r>
           </a:p>
         </p:txBody>
       </p:sp>
       <p:pic>
         <p:nvPicPr>
-          <p:cNvPr id="7" name="Picture 6">
+          <p:cNvPr id="7" name="Content Placeholder 3" descr="A screenshot of a cell phone&#10;&#10;Description automatically generated">
             <a:extLst>
               <a:ext uri="{FF2B5EF4-FFF2-40B4-BE49-F238E27FC236}">
-                <a16:creationId xmlns:a16="http://schemas.microsoft.com/office/drawing/2014/main" id="{76EE4327-8822-452A-9D3B-89C68BDBFAB9}"/>
+                <a16:creationId xmlns:a16="http://schemas.microsoft.com/office/drawing/2014/main" id="{E0DA710A-B1A6-47E8-91F3-14183C9C4827}"/>
               </a:ext>
             </a:extLst>
           </p:cNvPr>
           <p:cNvPicPr>
-            <a:picLocks noChangeAspect="1"/>
+            <a:picLocks noGrp="1" noChangeAspect="1"/>
           </p:cNvPicPr>
-          <p:nvPr/>
-        </p:nvPicPr>
-        <p:blipFill>
-          <a:blip r:embed="rId2"/>
-          <a:stretch>
-            <a:fillRect/>
-          </a:stretch>
-        </p:blipFill>
-        <p:spPr>
-          <a:xfrm>
-            <a:off x="1154954" y="3235693"/>
-            <a:ext cx="3658346" cy="3327202"/>
-          </a:xfrm>
-          <a:prstGeom prst="rect">
-            <a:avLst/>
-          </a:prstGeom>
-          <a:ln>
-            <a:solidFill>
-              <a:schemeClr val="accent5">
-                <a:lumMod val="75000"/>
-              </a:schemeClr>
-            </a:solidFill>
-          </a:ln>
-        </p:spPr>
-      </p:pic>
-      <p:sp>
-        <p:nvSpPr>
-          <p:cNvPr id="8" name="Arrow: Right 7">
-            <a:extLst>
-              <a:ext uri="{FF2B5EF4-FFF2-40B4-BE49-F238E27FC236}">
-                <a16:creationId xmlns:a16="http://schemas.microsoft.com/office/drawing/2014/main" id="{D31A44CE-8BF0-461B-AB0A-D0EF71B259AF}"/>
-              </a:ext>
-            </a:extLst>
-          </p:cNvPr>
-          <p:cNvSpPr/>
-          <p:nvPr/>
-        </p:nvSpPr>
-        <p:spPr>
-          <a:xfrm>
-            <a:off x="5347923" y="3733800"/>
-            <a:ext cx="1185486" cy="952500"/>
-          </a:xfrm>
-          <a:prstGeom prst="rightArrow">
-            <a:avLst/>
-          </a:prstGeom>
-        </p:spPr>
-        <p:style>
-          <a:lnRef idx="2">
-            <a:schemeClr val="accent5">
-              <a:shade val="50000"/>
-            </a:schemeClr>
-          </a:lnRef>
-          <a:fillRef idx="1">
-            <a:schemeClr val="accent5"/>
-          </a:fillRef>
-          <a:effectRef idx="0">
-            <a:schemeClr val="accent5"/>
-          </a:effectRef>
-          <a:fontRef idx="minor">
-            <a:schemeClr val="lt1"/>
-          </a:fontRef>
-        </p:style>
-        <p:txBody>
-          <a:bodyPr rtlCol="0" anchor="ctr"/>
-          <a:lstStyle/>
-          <a:p>
-            <a:pPr algn="ctr"/>
-            <a:endParaRPr lang="en-US"/>
-          </a:p>
-        </p:txBody>
-      </p:sp>
-      <p:pic>
-        <p:nvPicPr>
-          <p:cNvPr id="9" name="Picture 8">
-            <a:extLst>
-              <a:ext uri="{FF2B5EF4-FFF2-40B4-BE49-F238E27FC236}">
-                <a16:creationId xmlns:a16="http://schemas.microsoft.com/office/drawing/2014/main" id="{01C07144-22B0-41D4-894D-3C85FDE04EA6}"/>
-              </a:ext>
-            </a:extLst>
-          </p:cNvPr>
-          <p:cNvPicPr>
-            <a:picLocks noChangeAspect="1"/>
-          </p:cNvPicPr>
-          <p:nvPr/>
+          <p:nvPr>
+            <p:ph idx="1"/>
+          </p:nvPr>
         </p:nvPicPr>
         <p:blipFill>
           <a:blip r:embed="rId3"/>
@@ -14397,26 +14938,27 @@
         </p:blipFill>
         <p:spPr>
           <a:xfrm>
-            <a:off x="7023614" y="3070476"/>
-            <a:ext cx="4013432" cy="3650147"/>
+            <a:off x="1109764" y="1159994"/>
+            <a:ext cx="4986236" cy="4534895"/>
           </a:xfrm>
-          <a:prstGeom prst="rect">
-            <a:avLst/>
+          <a:prstGeom prst="roundRect">
+            <a:avLst>
+              <a:gd name="adj" fmla="val 1858"/>
+            </a:avLst>
           </a:prstGeom>
-          <a:ln>
-            <a:solidFill>
-              <a:schemeClr val="accent5">
-                <a:lumMod val="75000"/>
-              </a:schemeClr>
-            </a:solidFill>
-          </a:ln>
-          <a:effectLst/>
+          <a:effectLst>
+            <a:outerShdw blurRad="50800" dist="50800" dir="5400000" algn="tl" rotWithShape="0">
+              <a:srgbClr val="000000">
+                <a:alpha val="43000"/>
+              </a:srgbClr>
+            </a:outerShdw>
+          </a:effectLst>
         </p:spPr>
       </p:pic>
     </p:spTree>
     <p:extLst>
       <p:ext uri="{BB962C8B-B14F-4D97-AF65-F5344CB8AC3E}">
-        <p14:creationId xmlns:p14="http://schemas.microsoft.com/office/powerpoint/2010/main" val="1307872378"/>
+        <p14:creationId xmlns:p14="http://schemas.microsoft.com/office/powerpoint/2010/main" val="3756527913"/>
       </p:ext>
     </p:extLst>
   </p:cSld>

</xml_diff>

<commit_message>
Added model information to presentation.
</commit_message>
<xml_diff>
--- a/DraftPresentation.pptx
+++ b/DraftPresentation.pptx
@@ -4,6 +4,9 @@
   <p:sldMasterIdLst>
     <p:sldMasterId id="2147483648" r:id="rId1"/>
   </p:sldMasterIdLst>
+  <p:notesMasterIdLst>
+    <p:notesMasterId r:id="rId14"/>
+  </p:notesMasterIdLst>
   <p:sldIdLst>
     <p:sldId id="256" r:id="rId2"/>
     <p:sldId id="263" r:id="rId3"/>
@@ -15,6 +18,8 @@
     <p:sldId id="259" r:id="rId9"/>
     <p:sldId id="262" r:id="rId10"/>
     <p:sldId id="260" r:id="rId11"/>
+    <p:sldId id="266" r:id="rId12"/>
+    <p:sldId id="267" r:id="rId13"/>
   </p:sldIdLst>
   <p:sldSz cx="12192000" cy="6858000"/>
   <p:notesSz cx="6858000" cy="9144000"/>
@@ -162,6 +167,355 @@
     </pc:docChg>
   </pc:docChgLst>
 </pc:chgInfo>
+</file>
+
+<file path=ppt/notesMasters/notesMaster1.xml><?xml version="1.0" encoding="utf-8"?>
+<p:notesMaster xmlns:a="http://schemas.openxmlformats.org/drawingml/2006/main" xmlns:r="http://schemas.openxmlformats.org/officeDocument/2006/relationships" xmlns:p="http://schemas.openxmlformats.org/presentationml/2006/main">
+  <p:cSld>
+    <p:bg>
+      <p:bgRef idx="1001">
+        <a:schemeClr val="bg1"/>
+      </p:bgRef>
+    </p:bg>
+    <p:spTree>
+      <p:nvGrpSpPr>
+        <p:cNvPr id="1" name=""/>
+        <p:cNvGrpSpPr/>
+        <p:nvPr/>
+      </p:nvGrpSpPr>
+      <p:grpSpPr>
+        <a:xfrm>
+          <a:off x="0" y="0"/>
+          <a:ext cx="0" cy="0"/>
+          <a:chOff x="0" y="0"/>
+          <a:chExt cx="0" cy="0"/>
+        </a:xfrm>
+      </p:grpSpPr>
+      <p:sp>
+        <p:nvSpPr>
+          <p:cNvPr id="2" name="Header Placeholder 1"/>
+          <p:cNvSpPr>
+            <a:spLocks noGrp="1"/>
+          </p:cNvSpPr>
+          <p:nvPr>
+            <p:ph type="hdr" sz="quarter"/>
+          </p:nvPr>
+        </p:nvSpPr>
+        <p:spPr>
+          <a:xfrm>
+            <a:off x="0" y="0"/>
+            <a:ext cx="2971800" cy="458788"/>
+          </a:xfrm>
+          <a:prstGeom prst="rect">
+            <a:avLst/>
+          </a:prstGeom>
+        </p:spPr>
+        <p:txBody>
+          <a:bodyPr vert="horz" lIns="91440" tIns="45720" rIns="91440" bIns="45720" rtlCol="0"/>
+          <a:lstStyle>
+            <a:lvl1pPr algn="l">
+              <a:defRPr sz="1200"/>
+            </a:lvl1pPr>
+          </a:lstStyle>
+          <a:p>
+            <a:endParaRPr lang="en-US"/>
+          </a:p>
+        </p:txBody>
+      </p:sp>
+      <p:sp>
+        <p:nvSpPr>
+          <p:cNvPr id="3" name="Date Placeholder 2"/>
+          <p:cNvSpPr>
+            <a:spLocks noGrp="1"/>
+          </p:cNvSpPr>
+          <p:nvPr>
+            <p:ph type="dt" idx="1"/>
+          </p:nvPr>
+        </p:nvSpPr>
+        <p:spPr>
+          <a:xfrm>
+            <a:off x="3884613" y="0"/>
+            <a:ext cx="2971800" cy="458788"/>
+          </a:xfrm>
+          <a:prstGeom prst="rect">
+            <a:avLst/>
+          </a:prstGeom>
+        </p:spPr>
+        <p:txBody>
+          <a:bodyPr vert="horz" lIns="91440" tIns="45720" rIns="91440" bIns="45720" rtlCol="0"/>
+          <a:lstStyle>
+            <a:lvl1pPr algn="r">
+              <a:defRPr sz="1200"/>
+            </a:lvl1pPr>
+          </a:lstStyle>
+          <a:p>
+            <a:fld id="{0A89938E-F505-410C-A904-2587BF127AA3}" type="datetimeFigureOut">
+              <a:rPr lang="en-US" smtClean="0"/>
+              <a:t>2/24/2019</a:t>
+            </a:fld>
+            <a:endParaRPr lang="en-US"/>
+          </a:p>
+        </p:txBody>
+      </p:sp>
+      <p:sp>
+        <p:nvSpPr>
+          <p:cNvPr id="4" name="Slide Image Placeholder 3"/>
+          <p:cNvSpPr>
+            <a:spLocks noGrp="1" noRot="1" noChangeAspect="1"/>
+          </p:cNvSpPr>
+          <p:nvPr>
+            <p:ph type="sldImg" idx="2"/>
+          </p:nvPr>
+        </p:nvSpPr>
+        <p:spPr>
+          <a:xfrm>
+            <a:off x="685800" y="1143000"/>
+            <a:ext cx="5486400" cy="3086100"/>
+          </a:xfrm>
+          <a:prstGeom prst="rect">
+            <a:avLst/>
+          </a:prstGeom>
+          <a:noFill/>
+          <a:ln w="12700">
+            <a:solidFill>
+              <a:prstClr val="black"/>
+            </a:solidFill>
+          </a:ln>
+        </p:spPr>
+        <p:txBody>
+          <a:bodyPr vert="horz" lIns="91440" tIns="45720" rIns="91440" bIns="45720" rtlCol="0" anchor="ctr"/>
+          <a:lstStyle/>
+          <a:p>
+            <a:endParaRPr lang="en-US"/>
+          </a:p>
+        </p:txBody>
+      </p:sp>
+      <p:sp>
+        <p:nvSpPr>
+          <p:cNvPr id="5" name="Notes Placeholder 4"/>
+          <p:cNvSpPr>
+            <a:spLocks noGrp="1"/>
+          </p:cNvSpPr>
+          <p:nvPr>
+            <p:ph type="body" sz="quarter" idx="3"/>
+          </p:nvPr>
+        </p:nvSpPr>
+        <p:spPr>
+          <a:xfrm>
+            <a:off x="685800" y="4400550"/>
+            <a:ext cx="5486400" cy="3600450"/>
+          </a:xfrm>
+          <a:prstGeom prst="rect">
+            <a:avLst/>
+          </a:prstGeom>
+        </p:spPr>
+        <p:txBody>
+          <a:bodyPr vert="horz" lIns="91440" tIns="45720" rIns="91440" bIns="45720" rtlCol="0"/>
+          <a:lstStyle/>
+          <a:p>
+            <a:pPr lvl="0"/>
+            <a:r>
+              <a:rPr lang="en-US"/>
+              <a:t>Edit Master text styles</a:t>
+            </a:r>
+          </a:p>
+          <a:p>
+            <a:pPr lvl="1"/>
+            <a:r>
+              <a:rPr lang="en-US"/>
+              <a:t>Second level</a:t>
+            </a:r>
+          </a:p>
+          <a:p>
+            <a:pPr lvl="2"/>
+            <a:r>
+              <a:rPr lang="en-US"/>
+              <a:t>Third level</a:t>
+            </a:r>
+          </a:p>
+          <a:p>
+            <a:pPr lvl="3"/>
+            <a:r>
+              <a:rPr lang="en-US"/>
+              <a:t>Fourth level</a:t>
+            </a:r>
+          </a:p>
+          <a:p>
+            <a:pPr lvl="4"/>
+            <a:r>
+              <a:rPr lang="en-US"/>
+              <a:t>Fifth level</a:t>
+            </a:r>
+          </a:p>
+        </p:txBody>
+      </p:sp>
+      <p:sp>
+        <p:nvSpPr>
+          <p:cNvPr id="6" name="Footer Placeholder 5"/>
+          <p:cNvSpPr>
+            <a:spLocks noGrp="1"/>
+          </p:cNvSpPr>
+          <p:nvPr>
+            <p:ph type="ftr" sz="quarter" idx="4"/>
+          </p:nvPr>
+        </p:nvSpPr>
+        <p:spPr>
+          <a:xfrm>
+            <a:off x="0" y="8685213"/>
+            <a:ext cx="2971800" cy="458787"/>
+          </a:xfrm>
+          <a:prstGeom prst="rect">
+            <a:avLst/>
+          </a:prstGeom>
+        </p:spPr>
+        <p:txBody>
+          <a:bodyPr vert="horz" lIns="91440" tIns="45720" rIns="91440" bIns="45720" rtlCol="0" anchor="b"/>
+          <a:lstStyle>
+            <a:lvl1pPr algn="l">
+              <a:defRPr sz="1200"/>
+            </a:lvl1pPr>
+          </a:lstStyle>
+          <a:p>
+            <a:endParaRPr lang="en-US"/>
+          </a:p>
+        </p:txBody>
+      </p:sp>
+      <p:sp>
+        <p:nvSpPr>
+          <p:cNvPr id="7" name="Slide Number Placeholder 6"/>
+          <p:cNvSpPr>
+            <a:spLocks noGrp="1"/>
+          </p:cNvSpPr>
+          <p:nvPr>
+            <p:ph type="sldNum" sz="quarter" idx="5"/>
+          </p:nvPr>
+        </p:nvSpPr>
+        <p:spPr>
+          <a:xfrm>
+            <a:off x="3884613" y="8685213"/>
+            <a:ext cx="2971800" cy="458787"/>
+          </a:xfrm>
+          <a:prstGeom prst="rect">
+            <a:avLst/>
+          </a:prstGeom>
+        </p:spPr>
+        <p:txBody>
+          <a:bodyPr vert="horz" lIns="91440" tIns="45720" rIns="91440" bIns="45720" rtlCol="0" anchor="b"/>
+          <a:lstStyle>
+            <a:lvl1pPr algn="r">
+              <a:defRPr sz="1200"/>
+            </a:lvl1pPr>
+          </a:lstStyle>
+          <a:p>
+            <a:fld id="{736B042B-8A71-461E-B8F6-95EDC825E89A}" type="slidenum">
+              <a:rPr lang="en-US" smtClean="0"/>
+              <a:t>‹#›</a:t>
+            </a:fld>
+            <a:endParaRPr lang="en-US"/>
+          </a:p>
+        </p:txBody>
+      </p:sp>
+    </p:spTree>
+    <p:extLst>
+      <p:ext uri="{BB962C8B-B14F-4D97-AF65-F5344CB8AC3E}">
+        <p14:creationId xmlns:p14="http://schemas.microsoft.com/office/powerpoint/2010/main" val="2188612675"/>
+      </p:ext>
+    </p:extLst>
+  </p:cSld>
+  <p:clrMap bg1="lt1" tx1="dk1" bg2="lt2" tx2="dk2" accent1="accent1" accent2="accent2" accent3="accent3" accent4="accent4" accent5="accent5" accent6="accent6" hlink="hlink" folHlink="folHlink"/>
+  <p:notesStyle>
+    <a:lvl1pPr marL="0" algn="l" defTabSz="914400" rtl="0" eaLnBrk="1" latinLnBrk="0" hangingPunct="1">
+      <a:defRPr sz="1200" kern="1200">
+        <a:solidFill>
+          <a:schemeClr val="tx1"/>
+        </a:solidFill>
+        <a:latin typeface="+mn-lt"/>
+        <a:ea typeface="+mn-ea"/>
+        <a:cs typeface="+mn-cs"/>
+      </a:defRPr>
+    </a:lvl1pPr>
+    <a:lvl2pPr marL="457200" algn="l" defTabSz="914400" rtl="0" eaLnBrk="1" latinLnBrk="0" hangingPunct="1">
+      <a:defRPr sz="1200" kern="1200">
+        <a:solidFill>
+          <a:schemeClr val="tx1"/>
+        </a:solidFill>
+        <a:latin typeface="+mn-lt"/>
+        <a:ea typeface="+mn-ea"/>
+        <a:cs typeface="+mn-cs"/>
+      </a:defRPr>
+    </a:lvl2pPr>
+    <a:lvl3pPr marL="914400" algn="l" defTabSz="914400" rtl="0" eaLnBrk="1" latinLnBrk="0" hangingPunct="1">
+      <a:defRPr sz="1200" kern="1200">
+        <a:solidFill>
+          <a:schemeClr val="tx1"/>
+        </a:solidFill>
+        <a:latin typeface="+mn-lt"/>
+        <a:ea typeface="+mn-ea"/>
+        <a:cs typeface="+mn-cs"/>
+      </a:defRPr>
+    </a:lvl3pPr>
+    <a:lvl4pPr marL="1371600" algn="l" defTabSz="914400" rtl="0" eaLnBrk="1" latinLnBrk="0" hangingPunct="1">
+      <a:defRPr sz="1200" kern="1200">
+        <a:solidFill>
+          <a:schemeClr val="tx1"/>
+        </a:solidFill>
+        <a:latin typeface="+mn-lt"/>
+        <a:ea typeface="+mn-ea"/>
+        <a:cs typeface="+mn-cs"/>
+      </a:defRPr>
+    </a:lvl4pPr>
+    <a:lvl5pPr marL="1828800" algn="l" defTabSz="914400" rtl="0" eaLnBrk="1" latinLnBrk="0" hangingPunct="1">
+      <a:defRPr sz="1200" kern="1200">
+        <a:solidFill>
+          <a:schemeClr val="tx1"/>
+        </a:solidFill>
+        <a:latin typeface="+mn-lt"/>
+        <a:ea typeface="+mn-ea"/>
+        <a:cs typeface="+mn-cs"/>
+      </a:defRPr>
+    </a:lvl5pPr>
+    <a:lvl6pPr marL="2286000" algn="l" defTabSz="914400" rtl="0" eaLnBrk="1" latinLnBrk="0" hangingPunct="1">
+      <a:defRPr sz="1200" kern="1200">
+        <a:solidFill>
+          <a:schemeClr val="tx1"/>
+        </a:solidFill>
+        <a:latin typeface="+mn-lt"/>
+        <a:ea typeface="+mn-ea"/>
+        <a:cs typeface="+mn-cs"/>
+      </a:defRPr>
+    </a:lvl6pPr>
+    <a:lvl7pPr marL="2743200" algn="l" defTabSz="914400" rtl="0" eaLnBrk="1" latinLnBrk="0" hangingPunct="1">
+      <a:defRPr sz="1200" kern="1200">
+        <a:solidFill>
+          <a:schemeClr val="tx1"/>
+        </a:solidFill>
+        <a:latin typeface="+mn-lt"/>
+        <a:ea typeface="+mn-ea"/>
+        <a:cs typeface="+mn-cs"/>
+      </a:defRPr>
+    </a:lvl7pPr>
+    <a:lvl8pPr marL="3200400" algn="l" defTabSz="914400" rtl="0" eaLnBrk="1" latinLnBrk="0" hangingPunct="1">
+      <a:defRPr sz="1200" kern="1200">
+        <a:solidFill>
+          <a:schemeClr val="tx1"/>
+        </a:solidFill>
+        <a:latin typeface="+mn-lt"/>
+        <a:ea typeface="+mn-ea"/>
+        <a:cs typeface="+mn-cs"/>
+      </a:defRPr>
+    </a:lvl8pPr>
+    <a:lvl9pPr marL="3657600" algn="l" defTabSz="914400" rtl="0" eaLnBrk="1" latinLnBrk="0" hangingPunct="1">
+      <a:defRPr sz="1200" kern="1200">
+        <a:solidFill>
+          <a:schemeClr val="tx1"/>
+        </a:solidFill>
+        <a:latin typeface="+mn-lt"/>
+        <a:ea typeface="+mn-ea"/>
+        <a:cs typeface="+mn-cs"/>
+      </a:defRPr>
+    </a:lvl9pPr>
+  </p:notesStyle>
+</p:notesMaster>
 </file>
 
 <file path=ppt/slideLayouts/slideLayout1.xml><?xml version="1.0" encoding="utf-8"?>
@@ -670,10 +1024,9 @@
             </a:lvl1pPr>
           </a:lstStyle>
           <a:p>
-            <a:fld id="{E9462EF3-3C4F-43EE-ACEE-D4B806740EA3}" type="datetimeFigureOut">
-              <a:rPr lang="en-US" dirty="0"/>
-              <a:pPr/>
-              <a:t>2/23/2019</a:t>
+            <a:fld id="{93C1DD29-BCA9-4BD4-874E-2BFB0EB54CBC}" type="datetime1">
+              <a:rPr lang="en-US" smtClean="0"/>
+              <a:t>2/24/2019</a:t>
             </a:fld>
             <a:endParaRPr lang="en-US" dirty="0"/>
           </a:p>
@@ -1653,9 +2006,9 @@
           <a:bodyPr/>
           <a:lstStyle/>
           <a:p>
-            <a:fld id="{36343B39-165A-4B68-AA5C-581F5336313C}" type="datetimeFigureOut">
-              <a:rPr lang="en-US" dirty="0"/>
-              <a:t>2/23/2019</a:t>
+            <a:fld id="{7D8C4A03-AD86-46BF-AF07-341B65C8EF34}" type="datetime1">
+              <a:rPr lang="en-US" smtClean="0"/>
+              <a:t>2/24/2019</a:t>
             </a:fld>
             <a:endParaRPr lang="en-US" dirty="0"/>
           </a:p>
@@ -2523,9 +2876,9 @@
           <a:bodyPr/>
           <a:lstStyle/>
           <a:p>
-            <a:fld id="{942C8C57-33F9-4259-AC4F-0E3F5BEC9B94}" type="datetimeFigureOut">
-              <a:rPr lang="en-US" dirty="0"/>
-              <a:t>2/23/2019</a:t>
+            <a:fld id="{CDD0B0D0-4C31-4767-B6C8-C05AEB029E5E}" type="datetime1">
+              <a:rPr lang="en-US" smtClean="0"/>
+              <a:t>2/24/2019</a:t>
             </a:fld>
             <a:endParaRPr lang="en-US" dirty="0"/>
           </a:p>
@@ -3544,9 +3897,9 @@
           <a:bodyPr/>
           <a:lstStyle/>
           <a:p>
-            <a:fld id="{8748772B-8FA2-401F-A0A1-A59855EDBC3E}" type="datetimeFigureOut">
-              <a:rPr lang="en-US" dirty="0"/>
-              <a:t>2/23/2019</a:t>
+            <a:fld id="{0CB5AADC-4AB6-43C2-AFC5-C2BF3EC4CD51}" type="datetime1">
+              <a:rPr lang="en-US" smtClean="0"/>
+              <a:t>2/24/2019</a:t>
             </a:fld>
             <a:endParaRPr lang="en-US" dirty="0"/>
           </a:p>
@@ -4464,9 +4817,9 @@
           <a:bodyPr/>
           <a:lstStyle/>
           <a:p>
-            <a:fld id="{D3DD5BDE-5A90-4611-82E9-0FC5746D30C5}" type="datetimeFigureOut">
-              <a:rPr lang="en-US" dirty="0"/>
-              <a:t>2/23/2019</a:t>
+            <a:fld id="{F8BAB27F-FFB1-4669-993A-EAD4AEE8E7B1}" type="datetime1">
+              <a:rPr lang="en-US" smtClean="0"/>
+              <a:t>2/24/2019</a:t>
             </a:fld>
             <a:endParaRPr lang="en-US" dirty="0"/>
           </a:p>
@@ -5120,9 +5473,9 @@
           <a:bodyPr/>
           <a:lstStyle/>
           <a:p>
-            <a:fld id="{1ADDA17D-0BEA-4E76-A7FC-F7C188BC48D1}" type="datetimeFigureOut">
-              <a:rPr lang="en-US" dirty="0"/>
-              <a:t>2/23/2019</a:t>
+            <a:fld id="{69C02705-5D8A-44D4-80C0-1A7D4207E89D}" type="datetime1">
+              <a:rPr lang="en-US" smtClean="0"/>
+              <a:t>2/24/2019</a:t>
             </a:fld>
             <a:endParaRPr lang="en-US" dirty="0"/>
           </a:p>
@@ -5977,9 +6330,9 @@
           <a:bodyPr/>
           <a:lstStyle/>
           <a:p>
-            <a:fld id="{6909AC7D-18CA-4236-82B9-D75EB1D66EAE}" type="datetimeFigureOut">
-              <a:rPr lang="en-US" dirty="0"/>
-              <a:t>2/23/2019</a:t>
+            <a:fld id="{6451A9A1-7E63-4886-8FD9-5FE07F56FC3D}" type="datetime1">
+              <a:rPr lang="en-US" smtClean="0"/>
+              <a:t>2/24/2019</a:t>
             </a:fld>
             <a:endParaRPr lang="en-US" dirty="0"/>
           </a:p>
@@ -6160,9 +6513,9 @@
           <a:bodyPr/>
           <a:lstStyle/>
           <a:p>
-            <a:fld id="{5568300E-C023-45CD-A0BE-EDB7A8C6EA8B}" type="datetimeFigureOut">
-              <a:rPr lang="en-US" dirty="0"/>
-              <a:t>2/23/2019</a:t>
+            <a:fld id="{BC67367B-96B2-42E5-AF83-F6AE54A56307}" type="datetime1">
+              <a:rPr lang="en-US" smtClean="0"/>
+              <a:t>2/24/2019</a:t>
             </a:fld>
             <a:endParaRPr lang="en-US" dirty="0"/>
           </a:p>
@@ -7017,9 +7370,9 @@
           <a:bodyPr/>
           <a:lstStyle/>
           <a:p>
-            <a:fld id="{3B620EAD-E369-4933-8469-ED7764B56A1B}" type="datetimeFigureOut">
-              <a:rPr lang="en-US" dirty="0"/>
-              <a:t>2/23/2019</a:t>
+            <a:fld id="{378C577E-D17B-427A-858E-EB2AABCFFA35}" type="datetime1">
+              <a:rPr lang="en-US" smtClean="0"/>
+              <a:t>2/24/2019</a:t>
             </a:fld>
             <a:endParaRPr lang="en-US" dirty="0"/>
           </a:p>
@@ -7236,9 +7589,9 @@
           <a:bodyPr/>
           <a:lstStyle/>
           <a:p>
-            <a:fld id="{076C0EF2-9919-473B-8215-8616BAF10692}" type="datetimeFigureOut">
-              <a:rPr lang="en-US" dirty="0"/>
-              <a:t>2/23/2019</a:t>
+            <a:fld id="{EFA24DE6-E57A-42AB-BC4D-F21BD068AF01}" type="datetime1">
+              <a:rPr lang="en-US" smtClean="0"/>
+              <a:t>2/24/2019</a:t>
             </a:fld>
             <a:endParaRPr lang="en-US" dirty="0"/>
           </a:p>
@@ -8161,9 +8514,9 @@
           <a:bodyPr/>
           <a:lstStyle/>
           <a:p>
-            <a:fld id="{A09472EB-AC54-4713-BFC2-BEB621108C63}" type="datetimeFigureOut">
-              <a:rPr lang="en-US" dirty="0"/>
-              <a:t>2/23/2019</a:t>
+            <a:fld id="{E192520C-5071-4ADE-814C-C587828C6E96}" type="datetime1">
+              <a:rPr lang="en-US" smtClean="0"/>
+              <a:t>2/24/2019</a:t>
             </a:fld>
             <a:endParaRPr lang="en-US" dirty="0"/>
           </a:p>
@@ -8445,9 +8798,9 @@
           <a:bodyPr/>
           <a:lstStyle/>
           <a:p>
-            <a:fld id="{99455A0C-791E-4545-B787-F98AD45CD761}" type="datetimeFigureOut">
-              <a:rPr lang="en-US" dirty="0"/>
-              <a:t>2/23/2019</a:t>
+            <a:fld id="{B2696D86-FC59-4D7B-8DC1-965F794CD926}" type="datetime1">
+              <a:rPr lang="en-US" smtClean="0"/>
+              <a:t>2/24/2019</a:t>
             </a:fld>
             <a:endParaRPr lang="en-US" dirty="0"/>
           </a:p>
@@ -8835,9 +9188,9 @@
           <a:bodyPr/>
           <a:lstStyle/>
           <a:p>
-            <a:fld id="{42536B77-F4F4-4427-AC4F-9A623798AD82}" type="datetimeFigureOut">
-              <a:rPr lang="en-US" dirty="0"/>
-              <a:t>2/23/2019</a:t>
+            <a:fld id="{10B37338-9B7C-42DE-82D4-0A6E61519CEB}" type="datetime1">
+              <a:rPr lang="en-US" smtClean="0"/>
+              <a:t>2/24/2019</a:t>
             </a:fld>
             <a:endParaRPr lang="en-US" dirty="0"/>
           </a:p>
@@ -8961,9 +9314,9 @@
           <a:bodyPr/>
           <a:lstStyle/>
           <a:p>
-            <a:fld id="{D8BE790C-34EB-4565-8437-CACF4CDB7822}" type="datetimeFigureOut">
-              <a:rPr lang="en-US" dirty="0"/>
-              <a:t>2/23/2019</a:t>
+            <a:fld id="{8A5DD31C-B819-4AE2-B012-E627CE841828}" type="datetime1">
+              <a:rPr lang="en-US" smtClean="0"/>
+              <a:t>2/24/2019</a:t>
             </a:fld>
             <a:endParaRPr lang="en-US" dirty="0"/>
           </a:p>
@@ -9056,9 +9409,9 @@
           <a:bodyPr/>
           <a:lstStyle/>
           <a:p>
-            <a:fld id="{F84A4C11-22B8-4A4E-8126-B3AF6B948A8E}" type="datetimeFigureOut">
-              <a:rPr lang="en-US" dirty="0"/>
-              <a:t>2/23/2019</a:t>
+            <a:fld id="{DFE9658B-1BCB-4C4C-B7B0-A626BA3CC689}" type="datetime1">
+              <a:rPr lang="en-US" smtClean="0"/>
+              <a:t>2/24/2019</a:t>
             </a:fld>
             <a:endParaRPr lang="en-US" dirty="0"/>
           </a:p>
@@ -9905,38 +10258,37 @@
           <a:p>
             <a:pPr lvl="0"/>
             <a:r>
-              <a:rPr lang="en-US"/>
+              <a:rPr lang="en-US" dirty="0"/>
               <a:t>Edit Master text styles</a:t>
             </a:r>
           </a:p>
           <a:p>
             <a:pPr lvl="1"/>
             <a:r>
-              <a:rPr lang="en-US"/>
+              <a:rPr lang="en-US" dirty="0"/>
               <a:t>Second level</a:t>
             </a:r>
           </a:p>
           <a:p>
             <a:pPr lvl="2"/>
             <a:r>
-              <a:rPr lang="en-US"/>
+              <a:rPr lang="en-US" dirty="0"/>
               <a:t>Third level</a:t>
             </a:r>
           </a:p>
           <a:p>
             <a:pPr lvl="3"/>
             <a:r>
-              <a:rPr lang="en-US"/>
+              <a:rPr lang="en-US" dirty="0"/>
               <a:t>Fourth level</a:t>
             </a:r>
           </a:p>
           <a:p>
             <a:pPr lvl="4"/>
             <a:r>
-              <a:rPr lang="en-US"/>
+              <a:rPr lang="en-US" dirty="0"/>
               <a:t>Fifth level</a:t>
             </a:r>
-            <a:endParaRPr lang="en-US" dirty="0"/>
           </a:p>
         </p:txBody>
       </p:sp>
@@ -10027,9 +10379,9 @@
           <a:bodyPr/>
           <a:lstStyle/>
           <a:p>
-            <a:fld id="{16ED06B6-C816-4861-964D-15A98395707D}" type="datetimeFigureOut">
-              <a:rPr lang="en-US" dirty="0"/>
-              <a:t>2/23/2019</a:t>
+            <a:fld id="{A199D328-A86A-4398-BC07-FC27DA5031F5}" type="datetime1">
+              <a:rPr lang="en-US" smtClean="0"/>
+              <a:t>2/24/2019</a:t>
             </a:fld>
             <a:endParaRPr lang="en-US" dirty="0"/>
           </a:p>
@@ -11022,9 +11374,9 @@
           <a:bodyPr/>
           <a:lstStyle/>
           <a:p>
-            <a:fld id="{00B1A8AB-EA7C-4B1B-9D73-E2551851FABE}" type="datetimeFigureOut">
-              <a:rPr lang="en-US" dirty="0"/>
-              <a:t>2/23/2019</a:t>
+            <a:fld id="{DEA6C3BE-1C12-4F35-888E-8FCA2792BD33}" type="datetime1">
+              <a:rPr lang="en-US" smtClean="0"/>
+              <a:t>2/24/2019</a:t>
             </a:fld>
             <a:endParaRPr lang="en-US" dirty="0"/>
           </a:p>
@@ -11906,9 +12258,9 @@
             </a:lvl1pPr>
           </a:lstStyle>
           <a:p>
-            <a:fld id="{90786BE5-D2A3-4BF0-8B30-D7403E61B3DC}" type="datetimeFigureOut">
-              <a:rPr lang="en-US" dirty="0"/>
-              <a:t>2/23/2019</a:t>
+            <a:fld id="{A617ADFC-23F8-46A5-9CCE-566D7233319A}" type="datetime1">
+              <a:rPr lang="en-US" smtClean="0"/>
+              <a:t>2/24/2019</a:t>
             </a:fld>
             <a:endParaRPr lang="en-US" dirty="0"/>
           </a:p>
@@ -12051,7 +12403,7 @@
     <p:sldLayoutId id="2147483658" r:id="rId16"/>
     <p:sldLayoutId id="2147483659" r:id="rId17"/>
   </p:sldLayoutIdLst>
-  <p:hf sldNum="0" hdr="0" ftr="0" dt="0"/>
+  <p:hf hdr="0" ftr="0" dt="0"/>
   <p:txStyles>
     <p:titleStyle>
       <a:lvl1pPr algn="l" defTabSz="457200" rtl="0" eaLnBrk="1" latinLnBrk="0" hangingPunct="1">
@@ -12526,6 +12878,36 @@
           </a:p>
         </p:txBody>
       </p:sp>
+      <p:sp>
+        <p:nvSpPr>
+          <p:cNvPr id="4" name="Slide Number Placeholder 3">
+            <a:extLst>
+              <a:ext uri="{FF2B5EF4-FFF2-40B4-BE49-F238E27FC236}">
+                <a16:creationId xmlns:a16="http://schemas.microsoft.com/office/drawing/2014/main" id="{056B4E82-548F-44BE-B1C4-9F1C269B6BE8}"/>
+              </a:ext>
+            </a:extLst>
+          </p:cNvPr>
+          <p:cNvSpPr>
+            <a:spLocks noGrp="1"/>
+          </p:cNvSpPr>
+          <p:nvPr>
+            <p:ph type="sldNum" sz="quarter" idx="12"/>
+          </p:nvPr>
+        </p:nvSpPr>
+        <p:spPr/>
+        <p:txBody>
+          <a:bodyPr/>
+          <a:lstStyle/>
+          <a:p>
+            <a:fld id="{D57F1E4F-1CFF-5643-939E-217C01CDF565}" type="slidenum">
+              <a:rPr lang="en-US" smtClean="0"/>
+              <a:pPr/>
+              <a:t>1</a:t>
+            </a:fld>
+            <a:endParaRPr lang="en-US" dirty="0"/>
+          </a:p>
+        </p:txBody>
+      </p:sp>
     </p:spTree>
     <p:extLst>
       <p:ext uri="{BB962C8B-B14F-4D97-AF65-F5344CB8AC3E}">
@@ -13067,10 +13449,599 @@
           </a:effectLst>
         </p:spPr>
       </p:pic>
+      <p:sp>
+        <p:nvSpPr>
+          <p:cNvPr id="3" name="Slide Number Placeholder 2">
+            <a:extLst>
+              <a:ext uri="{FF2B5EF4-FFF2-40B4-BE49-F238E27FC236}">
+                <a16:creationId xmlns:a16="http://schemas.microsoft.com/office/drawing/2014/main" id="{77F615AC-F1C2-41E2-A2B7-AB504AB7A4FB}"/>
+              </a:ext>
+            </a:extLst>
+          </p:cNvPr>
+          <p:cNvSpPr>
+            <a:spLocks noGrp="1"/>
+          </p:cNvSpPr>
+          <p:nvPr>
+            <p:ph type="sldNum" sz="quarter" idx="12"/>
+          </p:nvPr>
+        </p:nvSpPr>
+        <p:spPr/>
+        <p:txBody>
+          <a:bodyPr/>
+          <a:lstStyle/>
+          <a:p>
+            <a:fld id="{D57F1E4F-1CFF-5643-939E-217C01CDF565}" type="slidenum">
+              <a:rPr lang="en-US" smtClean="0"/>
+              <a:pPr/>
+              <a:t>10</a:t>
+            </a:fld>
+            <a:endParaRPr lang="en-US" dirty="0"/>
+          </a:p>
+        </p:txBody>
+      </p:sp>
     </p:spTree>
     <p:extLst>
       <p:ext uri="{BB962C8B-B14F-4D97-AF65-F5344CB8AC3E}">
         <p14:creationId xmlns:p14="http://schemas.microsoft.com/office/powerpoint/2010/main" val="3756527913"/>
+      </p:ext>
+    </p:extLst>
+  </p:cSld>
+  <p:clrMapOvr>
+    <a:masterClrMapping/>
+  </p:clrMapOvr>
+</p:sld>
+</file>
+
+<file path=ppt/slides/slide11.xml><?xml version="1.0" encoding="utf-8"?>
+<p:sld xmlns:a="http://schemas.openxmlformats.org/drawingml/2006/main" xmlns:r="http://schemas.openxmlformats.org/officeDocument/2006/relationships" xmlns:p="http://schemas.openxmlformats.org/presentationml/2006/main">
+  <p:cSld>
+    <p:spTree>
+      <p:nvGrpSpPr>
+        <p:cNvPr id="1" name=""/>
+        <p:cNvGrpSpPr/>
+        <p:nvPr/>
+      </p:nvGrpSpPr>
+      <p:grpSpPr>
+        <a:xfrm>
+          <a:off x="0" y="0"/>
+          <a:ext cx="0" cy="0"/>
+          <a:chOff x="0" y="0"/>
+          <a:chExt cx="0" cy="0"/>
+        </a:xfrm>
+      </p:grpSpPr>
+      <p:sp>
+        <p:nvSpPr>
+          <p:cNvPr id="4" name="Title 3">
+            <a:extLst>
+              <a:ext uri="{FF2B5EF4-FFF2-40B4-BE49-F238E27FC236}">
+                <a16:creationId xmlns:a16="http://schemas.microsoft.com/office/drawing/2014/main" id="{2E5E705B-789E-4BB5-B28A-54DF61E10FF8}"/>
+              </a:ext>
+            </a:extLst>
+          </p:cNvPr>
+          <p:cNvSpPr>
+            <a:spLocks noGrp="1"/>
+          </p:cNvSpPr>
+          <p:nvPr>
+            <p:ph type="title"/>
+          </p:nvPr>
+        </p:nvSpPr>
+        <p:spPr/>
+        <p:txBody>
+          <a:bodyPr/>
+          <a:lstStyle/>
+          <a:p>
+            <a:r>
+              <a:rPr lang="en-US" dirty="0"/>
+              <a:t>Building a Prediction Model for attrition</a:t>
+            </a:r>
+          </a:p>
+        </p:txBody>
+      </p:sp>
+      <p:pic>
+        <p:nvPicPr>
+          <p:cNvPr id="7" name="Content Placeholder 6">
+            <a:extLst>
+              <a:ext uri="{FF2B5EF4-FFF2-40B4-BE49-F238E27FC236}">
+                <a16:creationId xmlns:a16="http://schemas.microsoft.com/office/drawing/2014/main" id="{982C0BC9-60AD-4737-908F-A9B452B56699}"/>
+              </a:ext>
+            </a:extLst>
+          </p:cNvPr>
+          <p:cNvPicPr>
+            <a:picLocks noGrp="1" noChangeAspect="1"/>
+          </p:cNvPicPr>
+          <p:nvPr>
+            <p:ph idx="1"/>
+          </p:nvPr>
+        </p:nvPicPr>
+        <p:blipFill>
+          <a:blip r:embed="rId2"/>
+          <a:stretch>
+            <a:fillRect/>
+          </a:stretch>
+        </p:blipFill>
+        <p:spPr>
+          <a:xfrm>
+            <a:off x="5188274" y="1004552"/>
+            <a:ext cx="2350827" cy="5113655"/>
+          </a:xfrm>
+          <a:prstGeom prst="rect">
+            <a:avLst/>
+          </a:prstGeom>
+        </p:spPr>
+      </p:pic>
+      <p:sp>
+        <p:nvSpPr>
+          <p:cNvPr id="6" name="Text Placeholder 5">
+            <a:extLst>
+              <a:ext uri="{FF2B5EF4-FFF2-40B4-BE49-F238E27FC236}">
+                <a16:creationId xmlns:a16="http://schemas.microsoft.com/office/drawing/2014/main" id="{75BAD940-14B5-4255-9DD1-AE4937E8C57B}"/>
+              </a:ext>
+            </a:extLst>
+          </p:cNvPr>
+          <p:cNvSpPr>
+            <a:spLocks noGrp="1"/>
+          </p:cNvSpPr>
+          <p:nvPr>
+            <p:ph type="body" sz="half" idx="2"/>
+          </p:nvPr>
+        </p:nvSpPr>
+        <p:spPr/>
+        <p:txBody>
+          <a:bodyPr/>
+          <a:lstStyle/>
+          <a:p>
+            <a:r>
+              <a:rPr lang="en-US" dirty="0"/>
+              <a:t>Using logistic regression, we can build a model to help predict whether employees are at risk of attrition. </a:t>
+            </a:r>
+          </a:p>
+        </p:txBody>
+      </p:sp>
+      <p:sp>
+        <p:nvSpPr>
+          <p:cNvPr id="8" name="TextBox 7">
+            <a:extLst>
+              <a:ext uri="{FF2B5EF4-FFF2-40B4-BE49-F238E27FC236}">
+                <a16:creationId xmlns:a16="http://schemas.microsoft.com/office/drawing/2014/main" id="{20677C8F-9F7E-473C-8ABC-C7D6E01327DE}"/>
+              </a:ext>
+            </a:extLst>
+          </p:cNvPr>
+          <p:cNvSpPr txBox="1"/>
+          <p:nvPr/>
+        </p:nvSpPr>
+        <p:spPr>
+          <a:xfrm>
+            <a:off x="7818540" y="1191499"/>
+            <a:ext cx="4305987" cy="4739759"/>
+          </a:xfrm>
+          <a:prstGeom prst="rect">
+            <a:avLst/>
+          </a:prstGeom>
+          <a:noFill/>
+        </p:spPr>
+        <p:txBody>
+          <a:bodyPr wrap="none" rtlCol="0">
+            <a:spAutoFit/>
+          </a:bodyPr>
+          <a:lstStyle/>
+          <a:p>
+            <a:r>
+              <a:rPr lang="en-US" b="1" u="sng" dirty="0"/>
+              <a:t>Top 10 Contributors to Attrition Risk</a:t>
+            </a:r>
+          </a:p>
+          <a:p>
+            <a:endParaRPr lang="en-US" b="1" u="sng" dirty="0"/>
+          </a:p>
+          <a:p>
+            <a:pPr marL="285750" indent="-285750">
+              <a:buFont typeface="Arial" panose="020B0604020202020204" pitchFamily="34" charset="0"/>
+              <a:buChar char="•"/>
+            </a:pPr>
+            <a:r>
+              <a:rPr lang="en-US" sz="1400" dirty="0"/>
+              <a:t>Overtime</a:t>
+            </a:r>
+          </a:p>
+          <a:p>
+            <a:pPr marL="285750" indent="-285750">
+              <a:buFont typeface="Arial" panose="020B0604020202020204" pitchFamily="34" charset="0"/>
+              <a:buChar char="•"/>
+            </a:pPr>
+            <a:endParaRPr lang="en-US" sz="1400" dirty="0"/>
+          </a:p>
+          <a:p>
+            <a:pPr marL="285750" indent="-285750">
+              <a:buFont typeface="Arial" panose="020B0604020202020204" pitchFamily="34" charset="0"/>
+              <a:buChar char="•"/>
+            </a:pPr>
+            <a:r>
+              <a:rPr lang="en-US" sz="1400" dirty="0"/>
+              <a:t>Environment Satisfaction</a:t>
+            </a:r>
+          </a:p>
+          <a:p>
+            <a:pPr marL="285750" indent="-285750">
+              <a:buFont typeface="Arial" panose="020B0604020202020204" pitchFamily="34" charset="0"/>
+              <a:buChar char="•"/>
+            </a:pPr>
+            <a:endParaRPr lang="en-US" sz="1400" dirty="0"/>
+          </a:p>
+          <a:p>
+            <a:pPr marL="285750" indent="-285750">
+              <a:buFont typeface="Arial" panose="020B0604020202020204" pitchFamily="34" charset="0"/>
+              <a:buChar char="•"/>
+            </a:pPr>
+            <a:r>
+              <a:rPr lang="en-US" sz="1400" dirty="0"/>
+              <a:t>Number of Companies Worked For</a:t>
+            </a:r>
+          </a:p>
+          <a:p>
+            <a:pPr marL="285750" indent="-285750">
+              <a:buFont typeface="Arial" panose="020B0604020202020204" pitchFamily="34" charset="0"/>
+              <a:buChar char="•"/>
+            </a:pPr>
+            <a:endParaRPr lang="en-US" sz="1400" dirty="0"/>
+          </a:p>
+          <a:p>
+            <a:pPr marL="285750" indent="-285750">
+              <a:buFont typeface="Arial" panose="020B0604020202020204" pitchFamily="34" charset="0"/>
+              <a:buChar char="•"/>
+            </a:pPr>
+            <a:r>
+              <a:rPr lang="en-US" sz="1400" dirty="0"/>
+              <a:t>Age</a:t>
+            </a:r>
+          </a:p>
+          <a:p>
+            <a:pPr marL="285750" indent="-285750">
+              <a:buFont typeface="Arial" panose="020B0604020202020204" pitchFamily="34" charset="0"/>
+              <a:buChar char="•"/>
+            </a:pPr>
+            <a:endParaRPr lang="en-US" sz="1400" dirty="0"/>
+          </a:p>
+          <a:p>
+            <a:pPr marL="285750" indent="-285750">
+              <a:buFont typeface="Arial" panose="020B0604020202020204" pitchFamily="34" charset="0"/>
+              <a:buChar char="•"/>
+            </a:pPr>
+            <a:r>
+              <a:rPr lang="en-US" sz="1400" dirty="0"/>
+              <a:t>Job Involvement</a:t>
+            </a:r>
+          </a:p>
+          <a:p>
+            <a:pPr marL="285750" indent="-285750">
+              <a:buFont typeface="Arial" panose="020B0604020202020204" pitchFamily="34" charset="0"/>
+              <a:buChar char="•"/>
+            </a:pPr>
+            <a:endParaRPr lang="en-US" sz="1400" dirty="0"/>
+          </a:p>
+          <a:p>
+            <a:pPr marL="285750" indent="-285750">
+              <a:buFont typeface="Arial" panose="020B0604020202020204" pitchFamily="34" charset="0"/>
+              <a:buChar char="•"/>
+            </a:pPr>
+            <a:r>
+              <a:rPr lang="en-US" sz="1400" dirty="0"/>
+              <a:t>Job Role – Specifically Sales Representatives</a:t>
+            </a:r>
+          </a:p>
+          <a:p>
+            <a:pPr marL="285750" indent="-285750">
+              <a:buFont typeface="Arial" panose="020B0604020202020204" pitchFamily="34" charset="0"/>
+              <a:buChar char="•"/>
+            </a:pPr>
+            <a:endParaRPr lang="en-US" sz="1400" dirty="0"/>
+          </a:p>
+          <a:p>
+            <a:pPr marL="285750" indent="-285750">
+              <a:buFont typeface="Arial" panose="020B0604020202020204" pitchFamily="34" charset="0"/>
+              <a:buChar char="•"/>
+            </a:pPr>
+            <a:r>
+              <a:rPr lang="en-US" sz="1400" dirty="0"/>
+              <a:t>Business Travel – Frequent Travelers</a:t>
+            </a:r>
+          </a:p>
+          <a:p>
+            <a:pPr marL="285750" indent="-285750">
+              <a:buFont typeface="Arial" panose="020B0604020202020204" pitchFamily="34" charset="0"/>
+              <a:buChar char="•"/>
+            </a:pPr>
+            <a:endParaRPr lang="en-US" sz="1400" dirty="0"/>
+          </a:p>
+          <a:p>
+            <a:pPr marL="285750" indent="-285750">
+              <a:buFont typeface="Arial" panose="020B0604020202020204" pitchFamily="34" charset="0"/>
+              <a:buChar char="•"/>
+            </a:pPr>
+            <a:r>
+              <a:rPr lang="en-US" sz="1400" dirty="0"/>
+              <a:t>Distance from Home</a:t>
+            </a:r>
+          </a:p>
+          <a:p>
+            <a:pPr marL="285750" indent="-285750">
+              <a:buFont typeface="Arial" panose="020B0604020202020204" pitchFamily="34" charset="0"/>
+              <a:buChar char="•"/>
+            </a:pPr>
+            <a:endParaRPr lang="en-US" sz="1400" dirty="0"/>
+          </a:p>
+          <a:p>
+            <a:pPr marL="285750" indent="-285750">
+              <a:buFont typeface="Arial" panose="020B0604020202020204" pitchFamily="34" charset="0"/>
+              <a:buChar char="•"/>
+            </a:pPr>
+            <a:r>
+              <a:rPr lang="en-US" sz="1400" dirty="0"/>
+              <a:t>Job Role – Specifically Lab Technicians</a:t>
+            </a:r>
+          </a:p>
+          <a:p>
+            <a:pPr marL="285750" indent="-285750">
+              <a:buFont typeface="Arial" panose="020B0604020202020204" pitchFamily="34" charset="0"/>
+              <a:buChar char="•"/>
+            </a:pPr>
+            <a:endParaRPr lang="en-US" sz="1400" dirty="0"/>
+          </a:p>
+          <a:p>
+            <a:pPr marL="285750" indent="-285750">
+              <a:buFont typeface="Arial" panose="020B0604020202020204" pitchFamily="34" charset="0"/>
+              <a:buChar char="•"/>
+            </a:pPr>
+            <a:r>
+              <a:rPr lang="en-US" sz="1400" dirty="0"/>
+              <a:t>Years Since Last Promotion</a:t>
+            </a:r>
+          </a:p>
+        </p:txBody>
+      </p:sp>
+      <p:sp>
+        <p:nvSpPr>
+          <p:cNvPr id="10" name="Slide Number Placeholder 9">
+            <a:extLst>
+              <a:ext uri="{FF2B5EF4-FFF2-40B4-BE49-F238E27FC236}">
+                <a16:creationId xmlns:a16="http://schemas.microsoft.com/office/drawing/2014/main" id="{0B779877-9934-4C48-88B6-B84641E1E13F}"/>
+              </a:ext>
+            </a:extLst>
+          </p:cNvPr>
+          <p:cNvSpPr>
+            <a:spLocks noGrp="1"/>
+          </p:cNvSpPr>
+          <p:nvPr>
+            <p:ph type="sldNum" sz="quarter" idx="12"/>
+          </p:nvPr>
+        </p:nvSpPr>
+        <p:spPr/>
+        <p:txBody>
+          <a:bodyPr/>
+          <a:lstStyle/>
+          <a:p>
+            <a:fld id="{D57F1E4F-1CFF-5643-939E-217C01CDF565}" type="slidenum">
+              <a:rPr lang="en-US" smtClean="0"/>
+              <a:pPr/>
+              <a:t>11</a:t>
+            </a:fld>
+            <a:endParaRPr lang="en-US" dirty="0"/>
+          </a:p>
+        </p:txBody>
+      </p:sp>
+    </p:spTree>
+    <p:extLst>
+      <p:ext uri="{BB962C8B-B14F-4D97-AF65-F5344CB8AC3E}">
+        <p14:creationId xmlns:p14="http://schemas.microsoft.com/office/powerpoint/2010/main" val="204995131"/>
+      </p:ext>
+    </p:extLst>
+  </p:cSld>
+  <p:clrMapOvr>
+    <a:masterClrMapping/>
+  </p:clrMapOvr>
+</p:sld>
+</file>
+
+<file path=ppt/slides/slide12.xml><?xml version="1.0" encoding="utf-8"?>
+<p:sld xmlns:a="http://schemas.openxmlformats.org/drawingml/2006/main" xmlns:r="http://schemas.openxmlformats.org/officeDocument/2006/relationships" xmlns:p="http://schemas.openxmlformats.org/presentationml/2006/main">
+  <p:cSld>
+    <p:spTree>
+      <p:nvGrpSpPr>
+        <p:cNvPr id="1" name=""/>
+        <p:cNvGrpSpPr/>
+        <p:nvPr/>
+      </p:nvGrpSpPr>
+      <p:grpSpPr>
+        <a:xfrm>
+          <a:off x="0" y="0"/>
+          <a:ext cx="0" cy="0"/>
+          <a:chOff x="0" y="0"/>
+          <a:chExt cx="0" cy="0"/>
+        </a:xfrm>
+      </p:grpSpPr>
+      <p:sp>
+        <p:nvSpPr>
+          <p:cNvPr id="2" name="Title 1">
+            <a:extLst>
+              <a:ext uri="{FF2B5EF4-FFF2-40B4-BE49-F238E27FC236}">
+                <a16:creationId xmlns:a16="http://schemas.microsoft.com/office/drawing/2014/main" id="{CE2DCDC5-A71F-445E-96E0-A6659B352463}"/>
+              </a:ext>
+            </a:extLst>
+          </p:cNvPr>
+          <p:cNvSpPr>
+            <a:spLocks noGrp="1"/>
+          </p:cNvSpPr>
+          <p:nvPr>
+            <p:ph type="title"/>
+          </p:nvPr>
+        </p:nvSpPr>
+        <p:spPr/>
+        <p:txBody>
+          <a:bodyPr/>
+          <a:lstStyle/>
+          <a:p>
+            <a:r>
+              <a:rPr lang="en-US" dirty="0"/>
+              <a:t>Model Performance</a:t>
+            </a:r>
+          </a:p>
+        </p:txBody>
+      </p:sp>
+      <p:sp>
+        <p:nvSpPr>
+          <p:cNvPr id="3" name="Content Placeholder 2">
+            <a:extLst>
+              <a:ext uri="{FF2B5EF4-FFF2-40B4-BE49-F238E27FC236}">
+                <a16:creationId xmlns:a16="http://schemas.microsoft.com/office/drawing/2014/main" id="{BFAA199F-C95B-4F11-92CA-C194D9D46A38}"/>
+              </a:ext>
+            </a:extLst>
+          </p:cNvPr>
+          <p:cNvSpPr>
+            <a:spLocks noGrp="1"/>
+          </p:cNvSpPr>
+          <p:nvPr>
+            <p:ph idx="1"/>
+          </p:nvPr>
+        </p:nvSpPr>
+        <p:spPr>
+          <a:xfrm>
+            <a:off x="5770216" y="1298448"/>
+            <a:ext cx="5195997" cy="4572000"/>
+          </a:xfrm>
+        </p:spPr>
+        <p:txBody>
+          <a:bodyPr/>
+          <a:lstStyle/>
+          <a:p>
+            <a:r>
+              <a:rPr lang="en-US" b="1" dirty="0"/>
+              <a:t>Precision: </a:t>
+            </a:r>
+            <a:r>
+              <a:rPr lang="en-US" dirty="0"/>
+              <a:t>Metric accounting for false positives. </a:t>
+            </a:r>
+          </a:p>
+          <a:p>
+            <a:r>
+              <a:rPr lang="en-US" b="1" dirty="0"/>
+              <a:t>Recall: </a:t>
+            </a:r>
+            <a:r>
+              <a:rPr lang="en-US" dirty="0"/>
+              <a:t>Metric accounting for false negatives. </a:t>
+            </a:r>
+          </a:p>
+          <a:p>
+            <a:r>
+              <a:rPr lang="en-US" b="1" dirty="0"/>
+              <a:t>Accuracy: </a:t>
+            </a:r>
+            <a:r>
+              <a:rPr lang="en-US" dirty="0"/>
+              <a:t>“How many times does the model get it right?” </a:t>
+            </a:r>
+          </a:p>
+          <a:p>
+            <a:endParaRPr lang="en-US" dirty="0"/>
+          </a:p>
+          <a:p>
+            <a:pPr marL="0" indent="0">
+              <a:buNone/>
+            </a:pPr>
+            <a:r>
+              <a:rPr lang="en-US" dirty="0"/>
+              <a:t>Note: This model is a prototype and is not a certain predictor of attrition. However, it may be used to identify contributing factors and target retention efforts to specific categories of employees or make policy modifications. </a:t>
+            </a:r>
+          </a:p>
+        </p:txBody>
+      </p:sp>
+      <p:sp>
+        <p:nvSpPr>
+          <p:cNvPr id="4" name="Text Placeholder 3">
+            <a:extLst>
+              <a:ext uri="{FF2B5EF4-FFF2-40B4-BE49-F238E27FC236}">
+                <a16:creationId xmlns:a16="http://schemas.microsoft.com/office/drawing/2014/main" id="{0954EF1D-7F79-4556-8E70-1D9D795296F6}"/>
+              </a:ext>
+            </a:extLst>
+          </p:cNvPr>
+          <p:cNvSpPr>
+            <a:spLocks noGrp="1"/>
+          </p:cNvSpPr>
+          <p:nvPr>
+            <p:ph type="body" sz="half" idx="2"/>
+          </p:nvPr>
+        </p:nvSpPr>
+        <p:spPr/>
+        <p:txBody>
+          <a:bodyPr/>
+          <a:lstStyle/>
+          <a:p>
+            <a:r>
+              <a:rPr lang="en-US" dirty="0"/>
+              <a:t>Precision: 0.91</a:t>
+            </a:r>
+          </a:p>
+          <a:p>
+            <a:endParaRPr lang="en-US" dirty="0"/>
+          </a:p>
+          <a:p>
+            <a:r>
+              <a:rPr lang="en-US" dirty="0"/>
+              <a:t>Recall: 0.95</a:t>
+            </a:r>
+          </a:p>
+          <a:p>
+            <a:endParaRPr lang="en-US" dirty="0"/>
+          </a:p>
+          <a:p>
+            <a:r>
+              <a:rPr lang="en-US" b="1" dirty="0"/>
+              <a:t>Accuracy: 0.87 </a:t>
+            </a:r>
+            <a:r>
+              <a:rPr lang="en-US" b="1" dirty="0">
+                <a:sym typeface="Wingdings" panose="05000000000000000000" pitchFamily="2" charset="2"/>
+              </a:rPr>
+              <a:t> 87%</a:t>
+            </a:r>
+            <a:endParaRPr lang="en-US" b="1" dirty="0"/>
+          </a:p>
+        </p:txBody>
+      </p:sp>
+      <p:sp>
+        <p:nvSpPr>
+          <p:cNvPr id="5" name="Slide Number Placeholder 4">
+            <a:extLst>
+              <a:ext uri="{FF2B5EF4-FFF2-40B4-BE49-F238E27FC236}">
+                <a16:creationId xmlns:a16="http://schemas.microsoft.com/office/drawing/2014/main" id="{BB6D025A-5F15-4F61-9F73-A20E0B39BDEE}"/>
+              </a:ext>
+            </a:extLst>
+          </p:cNvPr>
+          <p:cNvSpPr>
+            <a:spLocks noGrp="1"/>
+          </p:cNvSpPr>
+          <p:nvPr>
+            <p:ph type="sldNum" sz="quarter" idx="12"/>
+          </p:nvPr>
+        </p:nvSpPr>
+        <p:spPr/>
+        <p:txBody>
+          <a:bodyPr/>
+          <a:lstStyle/>
+          <a:p>
+            <a:fld id="{D57F1E4F-1CFF-5643-939E-217C01CDF565}" type="slidenum">
+              <a:rPr lang="en-US" smtClean="0"/>
+              <a:pPr/>
+              <a:t>12</a:t>
+            </a:fld>
+            <a:endParaRPr lang="en-US" dirty="0"/>
+          </a:p>
+        </p:txBody>
+      </p:sp>
+    </p:spTree>
+    <p:extLst>
+      <p:ext uri="{BB962C8B-B14F-4D97-AF65-F5344CB8AC3E}">
+        <p14:creationId xmlns:p14="http://schemas.microsoft.com/office/powerpoint/2010/main" val="1234567773"/>
       </p:ext>
     </p:extLst>
   </p:cSld>
@@ -13279,6 +14250,36 @@
           </a:prstGeom>
         </p:spPr>
       </p:pic>
+      <p:sp>
+        <p:nvSpPr>
+          <p:cNvPr id="4" name="Slide Number Placeholder 3">
+            <a:extLst>
+              <a:ext uri="{FF2B5EF4-FFF2-40B4-BE49-F238E27FC236}">
+                <a16:creationId xmlns:a16="http://schemas.microsoft.com/office/drawing/2014/main" id="{4B9A7771-4397-4A24-962D-AC6455CD1C23}"/>
+              </a:ext>
+            </a:extLst>
+          </p:cNvPr>
+          <p:cNvSpPr>
+            <a:spLocks noGrp="1"/>
+          </p:cNvSpPr>
+          <p:nvPr>
+            <p:ph type="sldNum" sz="quarter" idx="12"/>
+          </p:nvPr>
+        </p:nvSpPr>
+        <p:spPr/>
+        <p:txBody>
+          <a:bodyPr/>
+          <a:lstStyle/>
+          <a:p>
+            <a:fld id="{D57F1E4F-1CFF-5643-939E-217C01CDF565}" type="slidenum">
+              <a:rPr lang="en-US" smtClean="0"/>
+              <a:pPr/>
+              <a:t>2</a:t>
+            </a:fld>
+            <a:endParaRPr lang="en-US" dirty="0"/>
+          </a:p>
+        </p:txBody>
+      </p:sp>
     </p:spTree>
     <p:extLst>
       <p:ext uri="{BB962C8B-B14F-4D97-AF65-F5344CB8AC3E}">
@@ -13403,6 +14404,36 @@
           </a:prstGeom>
         </p:spPr>
       </p:pic>
+      <p:sp>
+        <p:nvSpPr>
+          <p:cNvPr id="4" name="Slide Number Placeholder 3">
+            <a:extLst>
+              <a:ext uri="{FF2B5EF4-FFF2-40B4-BE49-F238E27FC236}">
+                <a16:creationId xmlns:a16="http://schemas.microsoft.com/office/drawing/2014/main" id="{12462E1D-1298-4C59-8370-BF969D1230B5}"/>
+              </a:ext>
+            </a:extLst>
+          </p:cNvPr>
+          <p:cNvSpPr>
+            <a:spLocks noGrp="1"/>
+          </p:cNvSpPr>
+          <p:nvPr>
+            <p:ph type="sldNum" sz="quarter" idx="12"/>
+          </p:nvPr>
+        </p:nvSpPr>
+        <p:spPr/>
+        <p:txBody>
+          <a:bodyPr/>
+          <a:lstStyle/>
+          <a:p>
+            <a:fld id="{D57F1E4F-1CFF-5643-939E-217C01CDF565}" type="slidenum">
+              <a:rPr lang="en-US" smtClean="0"/>
+              <a:pPr/>
+              <a:t>3</a:t>
+            </a:fld>
+            <a:endParaRPr lang="en-US" dirty="0"/>
+          </a:p>
+        </p:txBody>
+      </p:sp>
     </p:spTree>
     <p:extLst>
       <p:ext uri="{BB962C8B-B14F-4D97-AF65-F5344CB8AC3E}">
@@ -13527,6 +14558,36 @@
           </a:prstGeom>
         </p:spPr>
       </p:pic>
+      <p:sp>
+        <p:nvSpPr>
+          <p:cNvPr id="3" name="Slide Number Placeholder 2">
+            <a:extLst>
+              <a:ext uri="{FF2B5EF4-FFF2-40B4-BE49-F238E27FC236}">
+                <a16:creationId xmlns:a16="http://schemas.microsoft.com/office/drawing/2014/main" id="{D25F1F91-85B7-424C-A5FB-CF7A181C6831}"/>
+              </a:ext>
+            </a:extLst>
+          </p:cNvPr>
+          <p:cNvSpPr>
+            <a:spLocks noGrp="1"/>
+          </p:cNvSpPr>
+          <p:nvPr>
+            <p:ph type="sldNum" sz="quarter" idx="12"/>
+          </p:nvPr>
+        </p:nvSpPr>
+        <p:spPr/>
+        <p:txBody>
+          <a:bodyPr/>
+          <a:lstStyle/>
+          <a:p>
+            <a:fld id="{D57F1E4F-1CFF-5643-939E-217C01CDF565}" type="slidenum">
+              <a:rPr lang="en-US" smtClean="0"/>
+              <a:pPr/>
+              <a:t>4</a:t>
+            </a:fld>
+            <a:endParaRPr lang="en-US" dirty="0"/>
+          </a:p>
+        </p:txBody>
+      </p:sp>
     </p:spTree>
     <p:extLst>
       <p:ext uri="{BB962C8B-B14F-4D97-AF65-F5344CB8AC3E}">
@@ -13618,6 +14679,36 @@
             </a:r>
           </a:p>
           <a:p>
+            <a:endParaRPr lang="en-US" dirty="0"/>
+          </a:p>
+        </p:txBody>
+      </p:sp>
+      <p:sp>
+        <p:nvSpPr>
+          <p:cNvPr id="4" name="Slide Number Placeholder 3">
+            <a:extLst>
+              <a:ext uri="{FF2B5EF4-FFF2-40B4-BE49-F238E27FC236}">
+                <a16:creationId xmlns:a16="http://schemas.microsoft.com/office/drawing/2014/main" id="{E1C12026-8EA1-4766-B88F-D6A2842C6B1E}"/>
+              </a:ext>
+            </a:extLst>
+          </p:cNvPr>
+          <p:cNvSpPr>
+            <a:spLocks noGrp="1"/>
+          </p:cNvSpPr>
+          <p:nvPr>
+            <p:ph type="sldNum" sz="quarter" idx="12"/>
+          </p:nvPr>
+        </p:nvSpPr>
+        <p:spPr/>
+        <p:txBody>
+          <a:bodyPr/>
+          <a:lstStyle/>
+          <a:p>
+            <a:fld id="{D57F1E4F-1CFF-5643-939E-217C01CDF565}" type="slidenum">
+              <a:rPr lang="en-US" smtClean="0"/>
+              <a:pPr/>
+              <a:t>5</a:t>
+            </a:fld>
             <a:endParaRPr lang="en-US" dirty="0"/>
           </a:p>
         </p:txBody>
@@ -14742,6 +15833,36 @@
           </a:p>
         </p:txBody>
       </p:sp>
+      <p:sp>
+        <p:nvSpPr>
+          <p:cNvPr id="7" name="Slide Number Placeholder 6">
+            <a:extLst>
+              <a:ext uri="{FF2B5EF4-FFF2-40B4-BE49-F238E27FC236}">
+                <a16:creationId xmlns:a16="http://schemas.microsoft.com/office/drawing/2014/main" id="{AD23ECA8-0A8B-4204-89CD-BBD4CC562BEC}"/>
+              </a:ext>
+            </a:extLst>
+          </p:cNvPr>
+          <p:cNvSpPr>
+            <a:spLocks noGrp="1"/>
+          </p:cNvSpPr>
+          <p:nvPr>
+            <p:ph type="sldNum" sz="quarter" idx="12"/>
+          </p:nvPr>
+        </p:nvSpPr>
+        <p:spPr/>
+        <p:txBody>
+          <a:bodyPr/>
+          <a:lstStyle/>
+          <a:p>
+            <a:fld id="{D57F1E4F-1CFF-5643-939E-217C01CDF565}" type="slidenum">
+              <a:rPr lang="en-US" smtClean="0"/>
+              <a:pPr/>
+              <a:t>6</a:t>
+            </a:fld>
+            <a:endParaRPr lang="en-US" dirty="0"/>
+          </a:p>
+        </p:txBody>
+      </p:sp>
     </p:spTree>
     <p:extLst>
       <p:ext uri="{BB962C8B-B14F-4D97-AF65-F5344CB8AC3E}">
@@ -15217,6 +16338,36 @@
           <a:effectLst/>
         </p:spPr>
       </p:pic>
+      <p:sp>
+        <p:nvSpPr>
+          <p:cNvPr id="4" name="Slide Number Placeholder 3">
+            <a:extLst>
+              <a:ext uri="{FF2B5EF4-FFF2-40B4-BE49-F238E27FC236}">
+                <a16:creationId xmlns:a16="http://schemas.microsoft.com/office/drawing/2014/main" id="{22253CAB-9F1C-4CAE-A6F2-C6C038C2B313}"/>
+              </a:ext>
+            </a:extLst>
+          </p:cNvPr>
+          <p:cNvSpPr>
+            <a:spLocks noGrp="1"/>
+          </p:cNvSpPr>
+          <p:nvPr>
+            <p:ph type="sldNum" sz="quarter" idx="12"/>
+          </p:nvPr>
+        </p:nvSpPr>
+        <p:spPr/>
+        <p:txBody>
+          <a:bodyPr/>
+          <a:lstStyle/>
+          <a:p>
+            <a:fld id="{D57F1E4F-1CFF-5643-939E-217C01CDF565}" type="slidenum">
+              <a:rPr lang="en-US" smtClean="0"/>
+              <a:pPr/>
+              <a:t>7</a:t>
+            </a:fld>
+            <a:endParaRPr lang="en-US" dirty="0"/>
+          </a:p>
+        </p:txBody>
+      </p:sp>
     </p:spTree>
     <p:extLst>
       <p:ext uri="{BB962C8B-B14F-4D97-AF65-F5344CB8AC3E}">
@@ -15558,6 +16709,36 @@
           </a:p>
         </p:txBody>
       </p:sp>
+      <p:sp>
+        <p:nvSpPr>
+          <p:cNvPr id="3" name="Slide Number Placeholder 2">
+            <a:extLst>
+              <a:ext uri="{FF2B5EF4-FFF2-40B4-BE49-F238E27FC236}">
+                <a16:creationId xmlns:a16="http://schemas.microsoft.com/office/drawing/2014/main" id="{F6F91D69-1CA8-42C2-BB20-14CBD07D9F98}"/>
+              </a:ext>
+            </a:extLst>
+          </p:cNvPr>
+          <p:cNvSpPr>
+            <a:spLocks noGrp="1"/>
+          </p:cNvSpPr>
+          <p:nvPr>
+            <p:ph type="sldNum" sz="quarter" idx="12"/>
+          </p:nvPr>
+        </p:nvSpPr>
+        <p:spPr/>
+        <p:txBody>
+          <a:bodyPr/>
+          <a:lstStyle/>
+          <a:p>
+            <a:fld id="{D57F1E4F-1CFF-5643-939E-217C01CDF565}" type="slidenum">
+              <a:rPr lang="en-US" smtClean="0"/>
+              <a:pPr/>
+              <a:t>8</a:t>
+            </a:fld>
+            <a:endParaRPr lang="en-US" dirty="0"/>
+          </a:p>
+        </p:txBody>
+      </p:sp>
     </p:spTree>
     <p:extLst>
       <p:ext uri="{BB962C8B-B14F-4D97-AF65-F5344CB8AC3E}">
@@ -15751,6 +16932,36 @@
               <a:rPr lang="en-US" dirty="0"/>
               <a:t>Job Role (for specific roles) </a:t>
             </a:r>
+          </a:p>
+        </p:txBody>
+      </p:sp>
+      <p:sp>
+        <p:nvSpPr>
+          <p:cNvPr id="2" name="Slide Number Placeholder 1">
+            <a:extLst>
+              <a:ext uri="{FF2B5EF4-FFF2-40B4-BE49-F238E27FC236}">
+                <a16:creationId xmlns:a16="http://schemas.microsoft.com/office/drawing/2014/main" id="{0247864A-00D5-4526-B91E-58C24A2160BC}"/>
+              </a:ext>
+            </a:extLst>
+          </p:cNvPr>
+          <p:cNvSpPr>
+            <a:spLocks noGrp="1"/>
+          </p:cNvSpPr>
+          <p:nvPr>
+            <p:ph type="sldNum" sz="quarter" idx="12"/>
+          </p:nvPr>
+        </p:nvSpPr>
+        <p:spPr/>
+        <p:txBody>
+          <a:bodyPr/>
+          <a:lstStyle/>
+          <a:p>
+            <a:fld id="{D57F1E4F-1CFF-5643-939E-217C01CDF565}" type="slidenum">
+              <a:rPr lang="en-US" smtClean="0"/>
+              <a:pPr/>
+              <a:t>9</a:t>
+            </a:fld>
+            <a:endParaRPr lang="en-US" dirty="0"/>
           </a:p>
         </p:txBody>
       </p:sp>
@@ -16031,4 +17242,299 @@
     </a:ext>
   </a:extLst>
 </a:theme>
+</file>
+
+<file path=ppt/theme/theme2.xml><?xml version="1.0" encoding="utf-8"?>
+<a:theme xmlns:a="http://schemas.openxmlformats.org/drawingml/2006/main" name="Office Theme">
+  <a:themeElements>
+    <a:clrScheme name="Office">
+      <a:dk1>
+        <a:sysClr val="windowText" lastClr="000000"/>
+      </a:dk1>
+      <a:lt1>
+        <a:sysClr val="window" lastClr="FFFFFF"/>
+      </a:lt1>
+      <a:dk2>
+        <a:srgbClr val="44546A"/>
+      </a:dk2>
+      <a:lt2>
+        <a:srgbClr val="E7E6E6"/>
+      </a:lt2>
+      <a:accent1>
+        <a:srgbClr val="4472C4"/>
+      </a:accent1>
+      <a:accent2>
+        <a:srgbClr val="ED7D31"/>
+      </a:accent2>
+      <a:accent3>
+        <a:srgbClr val="A5A5A5"/>
+      </a:accent3>
+      <a:accent4>
+        <a:srgbClr val="FFC000"/>
+      </a:accent4>
+      <a:accent5>
+        <a:srgbClr val="5B9BD5"/>
+      </a:accent5>
+      <a:accent6>
+        <a:srgbClr val="70AD47"/>
+      </a:accent6>
+      <a:hlink>
+        <a:srgbClr val="0563C1"/>
+      </a:hlink>
+      <a:folHlink>
+        <a:srgbClr val="954F72"/>
+      </a:folHlink>
+    </a:clrScheme>
+    <a:fontScheme name="Office">
+      <a:majorFont>
+        <a:latin typeface="Calibri Light" panose="020F0302020204030204"/>
+        <a:ea typeface=""/>
+        <a:cs typeface=""/>
+        <a:font script="Jpan" typeface="游ゴシック Light"/>
+        <a:font script="Hang" typeface="맑은 고딕"/>
+        <a:font script="Hans" typeface="等线 Light"/>
+        <a:font script="Hant" typeface="新細明體"/>
+        <a:font script="Arab" typeface="Times New Roman"/>
+        <a:font script="Hebr" typeface="Times New Roman"/>
+        <a:font script="Thai" typeface="Angsana New"/>
+        <a:font script="Ethi" typeface="Nyala"/>
+        <a:font script="Beng" typeface="Vrinda"/>
+        <a:font script="Gujr" typeface="Shruti"/>
+        <a:font script="Khmr" typeface="MoolBoran"/>
+        <a:font script="Knda" typeface="Tunga"/>
+        <a:font script="Guru" typeface="Raavi"/>
+        <a:font script="Cans" typeface="Euphemia"/>
+        <a:font script="Cher" typeface="Plantagenet Cherokee"/>
+        <a:font script="Yiii" typeface="Microsoft Yi Baiti"/>
+        <a:font script="Tibt" typeface="Microsoft Himalaya"/>
+        <a:font script="Thaa" typeface="MV Boli"/>
+        <a:font script="Deva" typeface="Mangal"/>
+        <a:font script="Telu" typeface="Gautami"/>
+        <a:font script="Taml" typeface="Latha"/>
+        <a:font script="Syrc" typeface="Estrangelo Edessa"/>
+        <a:font script="Orya" typeface="Kalinga"/>
+        <a:font script="Mlym" typeface="Kartika"/>
+        <a:font script="Laoo" typeface="DokChampa"/>
+        <a:font script="Sinh" typeface="Iskoola Pota"/>
+        <a:font script="Mong" typeface="Mongolian Baiti"/>
+        <a:font script="Viet" typeface="Times New Roman"/>
+        <a:font script="Uigh" typeface="Microsoft Uighur"/>
+        <a:font script="Geor" typeface="Sylfaen"/>
+        <a:font script="Armn" typeface="Arial"/>
+        <a:font script="Bugi" typeface="Leelawadee UI"/>
+        <a:font script="Bopo" typeface="Microsoft JhengHei"/>
+        <a:font script="Java" typeface="Javanese Text"/>
+        <a:font script="Lisu" typeface="Segoe UI"/>
+        <a:font script="Mymr" typeface="Myanmar Text"/>
+        <a:font script="Nkoo" typeface="Ebrima"/>
+        <a:font script="Olck" typeface="Nirmala UI"/>
+        <a:font script="Osma" typeface="Ebrima"/>
+        <a:font script="Phag" typeface="Phagspa"/>
+        <a:font script="Syrn" typeface="Estrangelo Edessa"/>
+        <a:font script="Syrj" typeface="Estrangelo Edessa"/>
+        <a:font script="Syre" typeface="Estrangelo Edessa"/>
+        <a:font script="Sora" typeface="Nirmala UI"/>
+        <a:font script="Tale" typeface="Microsoft Tai Le"/>
+        <a:font script="Talu" typeface="Microsoft New Tai Lue"/>
+        <a:font script="Tfng" typeface="Ebrima"/>
+      </a:majorFont>
+      <a:minorFont>
+        <a:latin typeface="Calibri" panose="020F0502020204030204"/>
+        <a:ea typeface=""/>
+        <a:cs typeface=""/>
+        <a:font script="Jpan" typeface="游ゴシック"/>
+        <a:font script="Hang" typeface="맑은 고딕"/>
+        <a:font script="Hans" typeface="等线"/>
+        <a:font script="Hant" typeface="新細明體"/>
+        <a:font script="Arab" typeface="Arial"/>
+        <a:font script="Hebr" typeface="Arial"/>
+        <a:font script="Thai" typeface="Cordia New"/>
+        <a:font script="Ethi" typeface="Nyala"/>
+        <a:font script="Beng" typeface="Vrinda"/>
+        <a:font script="Gujr" typeface="Shruti"/>
+        <a:font script="Khmr" typeface="DaunPenh"/>
+        <a:font script="Knda" typeface="Tunga"/>
+        <a:font script="Guru" typeface="Raavi"/>
+        <a:font script="Cans" typeface="Euphemia"/>
+        <a:font script="Cher" typeface="Plantagenet Cherokee"/>
+        <a:font script="Yiii" typeface="Microsoft Yi Baiti"/>
+        <a:font script="Tibt" typeface="Microsoft Himalaya"/>
+        <a:font script="Thaa" typeface="MV Boli"/>
+        <a:font script="Deva" typeface="Mangal"/>
+        <a:font script="Telu" typeface="Gautami"/>
+        <a:font script="Taml" typeface="Latha"/>
+        <a:font script="Syrc" typeface="Estrangelo Edessa"/>
+        <a:font script="Orya" typeface="Kalinga"/>
+        <a:font script="Mlym" typeface="Kartika"/>
+        <a:font script="Laoo" typeface="DokChampa"/>
+        <a:font script="Sinh" typeface="Iskoola Pota"/>
+        <a:font script="Mong" typeface="Mongolian Baiti"/>
+        <a:font script="Viet" typeface="Arial"/>
+        <a:font script="Uigh" typeface="Microsoft Uighur"/>
+        <a:font script="Geor" typeface="Sylfaen"/>
+        <a:font script="Armn" typeface="Arial"/>
+        <a:font script="Bugi" typeface="Leelawadee UI"/>
+        <a:font script="Bopo" typeface="Microsoft JhengHei"/>
+        <a:font script="Java" typeface="Javanese Text"/>
+        <a:font script="Lisu" typeface="Segoe UI"/>
+        <a:font script="Mymr" typeface="Myanmar Text"/>
+        <a:font script="Nkoo" typeface="Ebrima"/>
+        <a:font script="Olck" typeface="Nirmala UI"/>
+        <a:font script="Osma" typeface="Ebrima"/>
+        <a:font script="Phag" typeface="Phagspa"/>
+        <a:font script="Syrn" typeface="Estrangelo Edessa"/>
+        <a:font script="Syrj" typeface="Estrangelo Edessa"/>
+        <a:font script="Syre" typeface="Estrangelo Edessa"/>
+        <a:font script="Sora" typeface="Nirmala UI"/>
+        <a:font script="Tale" typeface="Microsoft Tai Le"/>
+        <a:font script="Talu" typeface="Microsoft New Tai Lue"/>
+        <a:font script="Tfng" typeface="Ebrima"/>
+      </a:minorFont>
+    </a:fontScheme>
+    <a:fmtScheme name="Office">
+      <a:fillStyleLst>
+        <a:solidFill>
+          <a:schemeClr val="phClr"/>
+        </a:solidFill>
+        <a:gradFill rotWithShape="1">
+          <a:gsLst>
+            <a:gs pos="0">
+              <a:schemeClr val="phClr">
+                <a:lumMod val="110000"/>
+                <a:satMod val="105000"/>
+                <a:tint val="67000"/>
+              </a:schemeClr>
+            </a:gs>
+            <a:gs pos="50000">
+              <a:schemeClr val="phClr">
+                <a:lumMod val="105000"/>
+                <a:satMod val="103000"/>
+                <a:tint val="73000"/>
+              </a:schemeClr>
+            </a:gs>
+            <a:gs pos="100000">
+              <a:schemeClr val="phClr">
+                <a:lumMod val="105000"/>
+                <a:satMod val="109000"/>
+                <a:tint val="81000"/>
+              </a:schemeClr>
+            </a:gs>
+          </a:gsLst>
+          <a:lin ang="5400000" scaled="0"/>
+        </a:gradFill>
+        <a:gradFill rotWithShape="1">
+          <a:gsLst>
+            <a:gs pos="0">
+              <a:schemeClr val="phClr">
+                <a:satMod val="103000"/>
+                <a:lumMod val="102000"/>
+                <a:tint val="94000"/>
+              </a:schemeClr>
+            </a:gs>
+            <a:gs pos="50000">
+              <a:schemeClr val="phClr">
+                <a:satMod val="110000"/>
+                <a:lumMod val="100000"/>
+                <a:shade val="100000"/>
+              </a:schemeClr>
+            </a:gs>
+            <a:gs pos="100000">
+              <a:schemeClr val="phClr">
+                <a:lumMod val="99000"/>
+                <a:satMod val="120000"/>
+                <a:shade val="78000"/>
+              </a:schemeClr>
+            </a:gs>
+          </a:gsLst>
+          <a:lin ang="5400000" scaled="0"/>
+        </a:gradFill>
+      </a:fillStyleLst>
+      <a:lnStyleLst>
+        <a:ln w="6350" cap="flat" cmpd="sng" algn="ctr">
+          <a:solidFill>
+            <a:schemeClr val="phClr"/>
+          </a:solidFill>
+          <a:prstDash val="solid"/>
+          <a:miter lim="800000"/>
+        </a:ln>
+        <a:ln w="12700" cap="flat" cmpd="sng" algn="ctr">
+          <a:solidFill>
+            <a:schemeClr val="phClr"/>
+          </a:solidFill>
+          <a:prstDash val="solid"/>
+          <a:miter lim="800000"/>
+        </a:ln>
+        <a:ln w="19050" cap="flat" cmpd="sng" algn="ctr">
+          <a:solidFill>
+            <a:schemeClr val="phClr"/>
+          </a:solidFill>
+          <a:prstDash val="solid"/>
+          <a:miter lim="800000"/>
+        </a:ln>
+      </a:lnStyleLst>
+      <a:effectStyleLst>
+        <a:effectStyle>
+          <a:effectLst/>
+        </a:effectStyle>
+        <a:effectStyle>
+          <a:effectLst/>
+        </a:effectStyle>
+        <a:effectStyle>
+          <a:effectLst>
+            <a:outerShdw blurRad="57150" dist="19050" dir="5400000" algn="ctr" rotWithShape="0">
+              <a:srgbClr val="000000">
+                <a:alpha val="63000"/>
+              </a:srgbClr>
+            </a:outerShdw>
+          </a:effectLst>
+        </a:effectStyle>
+      </a:effectStyleLst>
+      <a:bgFillStyleLst>
+        <a:solidFill>
+          <a:schemeClr val="phClr"/>
+        </a:solidFill>
+        <a:solidFill>
+          <a:schemeClr val="phClr">
+            <a:tint val="95000"/>
+            <a:satMod val="170000"/>
+          </a:schemeClr>
+        </a:solidFill>
+        <a:gradFill rotWithShape="1">
+          <a:gsLst>
+            <a:gs pos="0">
+              <a:schemeClr val="phClr">
+                <a:tint val="93000"/>
+                <a:satMod val="150000"/>
+                <a:shade val="98000"/>
+                <a:lumMod val="102000"/>
+              </a:schemeClr>
+            </a:gs>
+            <a:gs pos="50000">
+              <a:schemeClr val="phClr">
+                <a:tint val="98000"/>
+                <a:satMod val="130000"/>
+                <a:shade val="90000"/>
+                <a:lumMod val="103000"/>
+              </a:schemeClr>
+            </a:gs>
+            <a:gs pos="100000">
+              <a:schemeClr val="phClr">
+                <a:shade val="63000"/>
+                <a:satMod val="120000"/>
+              </a:schemeClr>
+            </a:gs>
+          </a:gsLst>
+          <a:lin ang="5400000" scaled="0"/>
+        </a:gradFill>
+      </a:bgFillStyleLst>
+    </a:fmtScheme>
+  </a:themeElements>
+  <a:objectDefaults/>
+  <a:extraClrSchemeLst/>
+  <a:extLst>
+    <a:ext uri="{05A4C25C-085E-4340-85A3-A5531E510DB2}">
+      <thm15:themeFamily xmlns:thm15="http://schemas.microsoft.com/office/thememl/2012/main" name="Office Theme" id="{62F939B6-93AF-4DB8-9C6B-D6C7DFDC589F}" vid="{4A3C46E8-61CC-4603-A589-7422A47A8E4A}"/>
+    </a:ext>
+  </a:extLst>
+</a:theme>
 </file>
</xml_diff>

<commit_message>
incorporating Aditya's changes to slides
</commit_message>
<xml_diff>
--- a/DraftPresentation.pptx
+++ b/DraftPresentation.pptx
@@ -5,7 +5,7 @@
     <p:sldMasterId id="2147483648" r:id="rId1"/>
   </p:sldMasterIdLst>
   <p:notesMasterIdLst>
-    <p:notesMasterId r:id="rId14"/>
+    <p:notesMasterId r:id="rId16"/>
   </p:notesMasterIdLst>
   <p:sldIdLst>
     <p:sldId id="256" r:id="rId2"/>
@@ -17,9 +17,11 @@
     <p:sldId id="258" r:id="rId8"/>
     <p:sldId id="259" r:id="rId9"/>
     <p:sldId id="262" r:id="rId10"/>
-    <p:sldId id="260" r:id="rId11"/>
-    <p:sldId id="266" r:id="rId12"/>
-    <p:sldId id="267" r:id="rId13"/>
+    <p:sldId id="268" r:id="rId11"/>
+    <p:sldId id="269" r:id="rId12"/>
+    <p:sldId id="260" r:id="rId13"/>
+    <p:sldId id="266" r:id="rId14"/>
+    <p:sldId id="267" r:id="rId15"/>
   </p:sldIdLst>
   <p:sldSz cx="12192000" cy="6858000"/>
   <p:notesSz cx="6858000" cy="9144000"/>
@@ -12924,6 +12926,258 @@
 <file path=ppt/slides/slide10.xml><?xml version="1.0" encoding="utf-8"?>
 <p:sld xmlns:a="http://schemas.openxmlformats.org/drawingml/2006/main" xmlns:r="http://schemas.openxmlformats.org/officeDocument/2006/relationships" xmlns:p="http://schemas.openxmlformats.org/presentationml/2006/main">
   <p:cSld>
+    <p:spTree>
+      <p:nvGrpSpPr>
+        <p:cNvPr id="1" name=""/>
+        <p:cNvGrpSpPr/>
+        <p:nvPr/>
+      </p:nvGrpSpPr>
+      <p:grpSpPr>
+        <a:xfrm>
+          <a:off x="0" y="0"/>
+          <a:ext cx="0" cy="0"/>
+          <a:chOff x="0" y="0"/>
+          <a:chExt cx="0" cy="0"/>
+        </a:xfrm>
+      </p:grpSpPr>
+      <p:sp>
+        <p:nvSpPr>
+          <p:cNvPr id="2" name="Title 1">
+            <a:extLst>
+              <a:ext uri="{FF2B5EF4-FFF2-40B4-BE49-F238E27FC236}">
+                <a16:creationId xmlns:a16="http://schemas.microsoft.com/office/drawing/2014/main" id="{07BA1A0C-5EFC-42E0-A0FF-941E3518C30D}"/>
+              </a:ext>
+            </a:extLst>
+          </p:cNvPr>
+          <p:cNvSpPr>
+            <a:spLocks noGrp="1"/>
+          </p:cNvSpPr>
+          <p:nvPr>
+            <p:ph type="title"/>
+          </p:nvPr>
+        </p:nvSpPr>
+        <p:spPr/>
+        <p:txBody>
+          <a:bodyPr/>
+          <a:lstStyle/>
+          <a:p>
+            <a:r>
+              <a:rPr lang="en-US" dirty="0"/>
+              <a:t>QOL Factors (</a:t>
+            </a:r>
+            <a:r>
+              <a:rPr lang="en-US" sz="1800" dirty="0"/>
+              <a:t>Business trave</a:t>
+            </a:r>
+            <a:r>
+              <a:rPr lang="en-US" dirty="0"/>
+              <a:t>l)</a:t>
+            </a:r>
+          </a:p>
+        </p:txBody>
+      </p:sp>
+      <p:pic>
+        <p:nvPicPr>
+          <p:cNvPr id="5" name="Picture 4">
+            <a:extLst>
+              <a:ext uri="{FF2B5EF4-FFF2-40B4-BE49-F238E27FC236}">
+                <a16:creationId xmlns:a16="http://schemas.microsoft.com/office/drawing/2014/main" id="{078FD37E-3A0E-41D9-BA33-2477A3976FC7}"/>
+              </a:ext>
+            </a:extLst>
+          </p:cNvPr>
+          <p:cNvPicPr>
+            <a:picLocks noChangeAspect="1"/>
+          </p:cNvPicPr>
+          <p:nvPr/>
+        </p:nvPicPr>
+        <p:blipFill>
+          <a:blip r:embed="rId2"/>
+          <a:stretch>
+            <a:fillRect/>
+          </a:stretch>
+        </p:blipFill>
+        <p:spPr>
+          <a:xfrm>
+            <a:off x="0" y="2223951"/>
+            <a:ext cx="5395127" cy="2681264"/>
+          </a:xfrm>
+          <a:prstGeom prst="rect">
+            <a:avLst/>
+          </a:prstGeom>
+        </p:spPr>
+      </p:pic>
+      <p:pic>
+        <p:nvPicPr>
+          <p:cNvPr id="6" name="Picture 5">
+            <a:extLst>
+              <a:ext uri="{FF2B5EF4-FFF2-40B4-BE49-F238E27FC236}">
+                <a16:creationId xmlns:a16="http://schemas.microsoft.com/office/drawing/2014/main" id="{9484AB16-5759-4B24-A16E-9695E1A02F5E}"/>
+              </a:ext>
+            </a:extLst>
+          </p:cNvPr>
+          <p:cNvPicPr>
+            <a:picLocks noChangeAspect="1"/>
+          </p:cNvPicPr>
+          <p:nvPr/>
+        </p:nvPicPr>
+        <p:blipFill>
+          <a:blip r:embed="rId3"/>
+          <a:stretch>
+            <a:fillRect/>
+          </a:stretch>
+        </p:blipFill>
+        <p:spPr>
+          <a:xfrm>
+            <a:off x="5760768" y="2297381"/>
+            <a:ext cx="5026052" cy="2730690"/>
+          </a:xfrm>
+          <a:prstGeom prst="rect">
+            <a:avLst/>
+          </a:prstGeom>
+        </p:spPr>
+      </p:pic>
+    </p:spTree>
+    <p:extLst>
+      <p:ext uri="{BB962C8B-B14F-4D97-AF65-F5344CB8AC3E}">
+        <p14:creationId xmlns:p14="http://schemas.microsoft.com/office/powerpoint/2010/main" val="2551388406"/>
+      </p:ext>
+    </p:extLst>
+  </p:cSld>
+  <p:clrMapOvr>
+    <a:masterClrMapping/>
+  </p:clrMapOvr>
+</p:sld>
+</file>
+
+<file path=ppt/slides/slide11.xml><?xml version="1.0" encoding="utf-8"?>
+<p:sld xmlns:a="http://schemas.openxmlformats.org/drawingml/2006/main" xmlns:r="http://schemas.openxmlformats.org/officeDocument/2006/relationships" xmlns:p="http://schemas.openxmlformats.org/presentationml/2006/main">
+  <p:cSld>
+    <p:spTree>
+      <p:nvGrpSpPr>
+        <p:cNvPr id="1" name=""/>
+        <p:cNvGrpSpPr/>
+        <p:nvPr/>
+      </p:nvGrpSpPr>
+      <p:grpSpPr>
+        <a:xfrm>
+          <a:off x="0" y="0"/>
+          <a:ext cx="0" cy="0"/>
+          <a:chOff x="0" y="0"/>
+          <a:chExt cx="0" cy="0"/>
+        </a:xfrm>
+      </p:grpSpPr>
+      <p:sp>
+        <p:nvSpPr>
+          <p:cNvPr id="2" name="Title 1">
+            <a:extLst>
+              <a:ext uri="{FF2B5EF4-FFF2-40B4-BE49-F238E27FC236}">
+                <a16:creationId xmlns:a16="http://schemas.microsoft.com/office/drawing/2014/main" id="{6260E46F-6952-4DA2-92B5-DAC214064231}"/>
+              </a:ext>
+            </a:extLst>
+          </p:cNvPr>
+          <p:cNvSpPr>
+            <a:spLocks noGrp="1"/>
+          </p:cNvSpPr>
+          <p:nvPr>
+            <p:ph type="title"/>
+          </p:nvPr>
+        </p:nvSpPr>
+        <p:spPr/>
+        <p:txBody>
+          <a:bodyPr/>
+          <a:lstStyle/>
+          <a:p>
+            <a:r>
+              <a:rPr lang="en-US" dirty="0"/>
+              <a:t>QOL Factors (</a:t>
+            </a:r>
+            <a:r>
+              <a:rPr lang="en-US" sz="1800" dirty="0"/>
+              <a:t>Overtime</a:t>
+            </a:r>
+            <a:r>
+              <a:rPr lang="en-US" dirty="0"/>
+              <a:t>)</a:t>
+            </a:r>
+          </a:p>
+        </p:txBody>
+      </p:sp>
+      <p:pic>
+        <p:nvPicPr>
+          <p:cNvPr id="5" name="Picture 4">
+            <a:extLst>
+              <a:ext uri="{FF2B5EF4-FFF2-40B4-BE49-F238E27FC236}">
+                <a16:creationId xmlns:a16="http://schemas.microsoft.com/office/drawing/2014/main" id="{9D583699-96B7-48A3-BC33-DE5ACF55B5FC}"/>
+              </a:ext>
+            </a:extLst>
+          </p:cNvPr>
+          <p:cNvPicPr>
+            <a:picLocks noChangeAspect="1"/>
+          </p:cNvPicPr>
+          <p:nvPr/>
+        </p:nvPicPr>
+        <p:blipFill>
+          <a:blip r:embed="rId2"/>
+          <a:stretch>
+            <a:fillRect/>
+          </a:stretch>
+        </p:blipFill>
+        <p:spPr>
+          <a:xfrm>
+            <a:off x="149711" y="2412434"/>
+            <a:ext cx="5715000" cy="3267075"/>
+          </a:xfrm>
+          <a:prstGeom prst="rect">
+            <a:avLst/>
+          </a:prstGeom>
+        </p:spPr>
+      </p:pic>
+      <p:pic>
+        <p:nvPicPr>
+          <p:cNvPr id="6" name="Picture 5">
+            <a:extLst>
+              <a:ext uri="{FF2B5EF4-FFF2-40B4-BE49-F238E27FC236}">
+                <a16:creationId xmlns:a16="http://schemas.microsoft.com/office/drawing/2014/main" id="{F734ED59-656E-4647-B2AA-C897ACE30C19}"/>
+              </a:ext>
+            </a:extLst>
+          </p:cNvPr>
+          <p:cNvPicPr>
+            <a:picLocks noChangeAspect="1"/>
+          </p:cNvPicPr>
+          <p:nvPr/>
+        </p:nvPicPr>
+        <p:blipFill>
+          <a:blip r:embed="rId3"/>
+          <a:stretch>
+            <a:fillRect/>
+          </a:stretch>
+        </p:blipFill>
+        <p:spPr>
+          <a:xfrm>
+            <a:off x="6262849" y="2412434"/>
+            <a:ext cx="5400675" cy="3152775"/>
+          </a:xfrm>
+          <a:prstGeom prst="rect">
+            <a:avLst/>
+          </a:prstGeom>
+        </p:spPr>
+      </p:pic>
+    </p:spTree>
+    <p:extLst>
+      <p:ext uri="{BB962C8B-B14F-4D97-AF65-F5344CB8AC3E}">
+        <p14:creationId xmlns:p14="http://schemas.microsoft.com/office/powerpoint/2010/main" val="2616292469"/>
+      </p:ext>
+    </p:extLst>
+  </p:cSld>
+  <p:clrMapOvr>
+    <a:masterClrMapping/>
+  </p:clrMapOvr>
+</p:sld>
+</file>
+
+<file path=ppt/slides/slide12.xml><?xml version="1.0" encoding="utf-8"?>
+<p:sld xmlns:a="http://schemas.openxmlformats.org/drawingml/2006/main" xmlns:r="http://schemas.openxmlformats.org/officeDocument/2006/relationships" xmlns:p="http://schemas.openxmlformats.org/presentationml/2006/main">
+  <p:cSld>
     <p:bg>
       <p:bgPr>
         <a:solidFill>
@@ -13473,7 +13727,7 @@
             <a:fld id="{D57F1E4F-1CFF-5643-939E-217C01CDF565}" type="slidenum">
               <a:rPr lang="en-US" smtClean="0"/>
               <a:pPr/>
-              <a:t>10</a:t>
+              <a:t>12</a:t>
             </a:fld>
             <a:endParaRPr lang="en-US" dirty="0"/>
           </a:p>
@@ -13492,7 +13746,7 @@
 </p:sld>
 </file>
 
-<file path=ppt/slides/slide11.xml><?xml version="1.0" encoding="utf-8"?>
+<file path=ppt/slides/slide13.xml><?xml version="1.0" encoding="utf-8"?>
 <p:sld xmlns:a="http://schemas.openxmlformats.org/drawingml/2006/main" xmlns:r="http://schemas.openxmlformats.org/officeDocument/2006/relationships" xmlns:p="http://schemas.openxmlformats.org/presentationml/2006/main">
   <p:cSld>
     <p:spTree>
@@ -13822,7 +14076,7 @@
             <a:fld id="{D57F1E4F-1CFF-5643-939E-217C01CDF565}" type="slidenum">
               <a:rPr lang="en-US" smtClean="0"/>
               <a:pPr/>
-              <a:t>11</a:t>
+              <a:t>13</a:t>
             </a:fld>
             <a:endParaRPr lang="en-US" dirty="0"/>
           </a:p>
@@ -13841,7 +14095,7 @@
 </p:sld>
 </file>
 
-<file path=ppt/slides/slide12.xml><?xml version="1.0" encoding="utf-8"?>
+<file path=ppt/slides/slide14.xml><?xml version="1.0" encoding="utf-8"?>
 <p:sld xmlns:a="http://schemas.openxmlformats.org/drawingml/2006/main" xmlns:r="http://schemas.openxmlformats.org/officeDocument/2006/relationships" xmlns:p="http://schemas.openxmlformats.org/presentationml/2006/main">
   <p:cSld>
     <p:spTree>
@@ -14032,7 +14286,7 @@
             <a:fld id="{D57F1E4F-1CFF-5643-939E-217C01CDF565}" type="slidenum">
               <a:rPr lang="en-US" smtClean="0"/>
               <a:pPr/>
-              <a:t>12</a:t>
+              <a:t>14</a:t>
             </a:fld>
             <a:endParaRPr lang="en-US" dirty="0"/>
           </a:p>

</xml_diff>

<commit_message>
Presentation after phone call with placeholders
</commit_message>
<xml_diff>
--- a/DraftPresentation.pptx
+++ b/DraftPresentation.pptx
@@ -5,7 +5,7 @@
     <p:sldMasterId id="2147483648" r:id="rId1"/>
   </p:sldMasterIdLst>
   <p:notesMasterIdLst>
-    <p:notesMasterId r:id="rId17"/>
+    <p:notesMasterId r:id="rId19"/>
   </p:notesMasterIdLst>
   <p:sldIdLst>
     <p:sldId id="256" r:id="rId2"/>
@@ -14,15 +14,17 @@
     <p:sldId id="265" r:id="rId5"/>
     <p:sldId id="261" r:id="rId6"/>
     <p:sldId id="257" r:id="rId7"/>
-    <p:sldId id="258" r:id="rId8"/>
+    <p:sldId id="262" r:id="rId8"/>
     <p:sldId id="259" r:id="rId9"/>
-    <p:sldId id="262" r:id="rId10"/>
-    <p:sldId id="268" r:id="rId11"/>
-    <p:sldId id="269" r:id="rId12"/>
-    <p:sldId id="270" r:id="rId13"/>
-    <p:sldId id="260" r:id="rId14"/>
-    <p:sldId id="266" r:id="rId15"/>
-    <p:sldId id="267" r:id="rId16"/>
+    <p:sldId id="258" r:id="rId10"/>
+    <p:sldId id="271" r:id="rId11"/>
+    <p:sldId id="272" r:id="rId12"/>
+    <p:sldId id="268" r:id="rId13"/>
+    <p:sldId id="270" r:id="rId14"/>
+    <p:sldId id="260" r:id="rId15"/>
+    <p:sldId id="266" r:id="rId16"/>
+    <p:sldId id="267" r:id="rId17"/>
+    <p:sldId id="273" r:id="rId18"/>
   </p:sldIdLst>
   <p:sldSz cx="12192000" cy="6858000"/>
   <p:notesSz cx="6858000" cy="9144000"/>
@@ -12927,6 +12929,14 @@
 <file path=ppt/slides/slide10.xml><?xml version="1.0" encoding="utf-8"?>
 <p:sld xmlns:a="http://schemas.openxmlformats.org/drawingml/2006/main" xmlns:r="http://schemas.openxmlformats.org/officeDocument/2006/relationships" xmlns:p="http://schemas.openxmlformats.org/presentationml/2006/main">
   <p:cSld>
+    <p:bg>
+      <p:bgPr>
+        <a:solidFill>
+          <a:schemeClr val="bg1"/>
+        </a:solidFill>
+        <a:effectLst/>
+      </p:bgPr>
+    </p:bg>
     <p:spTree>
       <p:nvGrpSpPr>
         <p:cNvPr id="1" name=""/>
@@ -12943,6 +12953,1163 @@
       </p:grpSpPr>
       <p:sp>
         <p:nvSpPr>
+          <p:cNvPr id="11" name="Rectangle 10">
+            <a:extLst>
+              <a:ext uri="{FF2B5EF4-FFF2-40B4-BE49-F238E27FC236}">
+                <a16:creationId xmlns:a16="http://schemas.microsoft.com/office/drawing/2014/main" id="{F605735B-B754-4988-AB85-DAAA79C28D4B}"/>
+              </a:ext>
+              <a:ext uri="{C183D7F6-B498-43B3-948B-1728B52AA6E4}">
+                <adec:decorative xmlns:adec="http://schemas.microsoft.com/office/drawing/2017/decorative" val="1"/>
+              </a:ext>
+            </a:extLst>
+          </p:cNvPr>
+          <p:cNvSpPr>
+            <a:spLocks noGrp="1" noRot="1" noChangeAspect="1" noMove="1" noResize="1" noEditPoints="1" noAdjustHandles="1" noChangeArrowheads="1" noChangeShapeType="1" noTextEdit="1"/>
+          </p:cNvSpPr>
+          <p:nvPr>
+            <p:extLst>
+              <p:ext uri="{386F3935-93C4-4BCD-93E2-E3B085C9AB24}">
+                <p16:designElem xmlns:p16="http://schemas.microsoft.com/office/powerpoint/2015/main" val="1"/>
+              </p:ext>
+            </p:extLst>
+          </p:nvPr>
+        </p:nvSpPr>
+        <p:spPr>
+          <a:xfrm>
+            <a:off x="0" y="0"/>
+            <a:ext cx="12192000" cy="6858000"/>
+          </a:xfrm>
+          <a:prstGeom prst="rect">
+            <a:avLst/>
+          </a:prstGeom>
+          <a:blipFill>
+            <a:blip r:embed="rId2">
+              <a:duotone>
+                <a:schemeClr val="dk2">
+                  <a:shade val="69000"/>
+                  <a:hueMod val="108000"/>
+                  <a:satMod val="164000"/>
+                  <a:lumMod val="74000"/>
+                </a:schemeClr>
+                <a:schemeClr val="dk2">
+                  <a:tint val="96000"/>
+                  <a:hueMod val="88000"/>
+                  <a:satMod val="140000"/>
+                  <a:lumMod val="132000"/>
+                </a:schemeClr>
+              </a:duotone>
+            </a:blip>
+            <a:stretch>
+              <a:fillRect/>
+            </a:stretch>
+          </a:blipFill>
+          <a:ln>
+            <a:noFill/>
+          </a:ln>
+        </p:spPr>
+        <p:style>
+          <a:lnRef idx="2">
+            <a:schemeClr val="accent1">
+              <a:shade val="50000"/>
+            </a:schemeClr>
+          </a:lnRef>
+          <a:fillRef idx="1">
+            <a:schemeClr val="accent1"/>
+          </a:fillRef>
+          <a:effectRef idx="0">
+            <a:schemeClr val="accent1"/>
+          </a:effectRef>
+          <a:fontRef idx="minor">
+            <a:schemeClr val="lt1"/>
+          </a:fontRef>
+        </p:style>
+      </p:sp>
+      <p:grpSp>
+        <p:nvGrpSpPr>
+          <p:cNvPr id="13" name="Group 12">
+            <a:extLst>
+              <a:ext uri="{FF2B5EF4-FFF2-40B4-BE49-F238E27FC236}">
+                <a16:creationId xmlns:a16="http://schemas.microsoft.com/office/drawing/2014/main" id="{33E4A70D-68CA-47CD-A397-390393D6C889}"/>
+              </a:ext>
+              <a:ext uri="{C183D7F6-B498-43B3-948B-1728B52AA6E4}">
+                <adec:decorative xmlns:adec="http://schemas.microsoft.com/office/drawing/2017/decorative" val="1"/>
+              </a:ext>
+            </a:extLst>
+          </p:cNvPr>
+          <p:cNvGrpSpPr>
+            <a:grpSpLocks noGrp="1" noUngrp="1" noRot="1" noChangeAspect="1" noMove="1" noResize="1"/>
+          </p:cNvGrpSpPr>
+          <p:nvPr>
+            <p:extLst>
+              <p:ext uri="{386F3935-93C4-4BCD-93E2-E3B085C9AB24}">
+                <p16:designElem xmlns:p16="http://schemas.microsoft.com/office/powerpoint/2015/main" val="1"/>
+              </p:ext>
+            </p:extLst>
+          </p:nvPr>
+        </p:nvGrpSpPr>
+        <p:grpSpPr>
+          <a:xfrm>
+            <a:off x="0" y="1587"/>
+            <a:ext cx="12192000" cy="6856413"/>
+            <a:chOff x="0" y="1587"/>
+            <a:chExt cx="12192000" cy="6856413"/>
+          </a:xfrm>
+        </p:grpSpPr>
+        <p:sp>
+          <p:nvSpPr>
+            <p:cNvPr id="14" name="Oval 13">
+              <a:extLst>
+                <a:ext uri="{FF2B5EF4-FFF2-40B4-BE49-F238E27FC236}">
+                  <a16:creationId xmlns:a16="http://schemas.microsoft.com/office/drawing/2014/main" id="{6E300448-2B1A-4CAF-9207-7750145183BE}"/>
+                </a:ext>
+                <a:ext uri="{C183D7F6-B498-43B3-948B-1728B52AA6E4}">
+                  <adec:decorative xmlns:adec="http://schemas.microsoft.com/office/drawing/2017/decorative" val="1"/>
+                </a:ext>
+              </a:extLst>
+            </p:cNvPr>
+            <p:cNvSpPr/>
+            <p:nvPr>
+              <p:extLst>
+                <p:ext uri="{386F3935-93C4-4BCD-93E2-E3B085C9AB24}">
+                  <p16:designElem xmlns:p16="http://schemas.microsoft.com/office/powerpoint/2015/main" val="1"/>
+                </p:ext>
+              </p:extLst>
+            </p:nvPr>
+          </p:nvSpPr>
+          <p:spPr>
+            <a:xfrm>
+              <a:off x="0" y="2667000"/>
+              <a:ext cx="4191000" cy="4191000"/>
+            </a:xfrm>
+            <a:prstGeom prst="ellipse">
+              <a:avLst/>
+            </a:prstGeom>
+            <a:gradFill flip="none" rotWithShape="1">
+              <a:gsLst>
+                <a:gs pos="0">
+                  <a:schemeClr val="accent5">
+                    <a:alpha val="11000"/>
+                  </a:schemeClr>
+                </a:gs>
+                <a:gs pos="75000">
+                  <a:schemeClr val="accent5">
+                    <a:alpha val="0"/>
+                  </a:schemeClr>
+                </a:gs>
+                <a:gs pos="36000">
+                  <a:schemeClr val="accent5">
+                    <a:alpha val="10000"/>
+                  </a:schemeClr>
+                </a:gs>
+              </a:gsLst>
+              <a:path path="circle">
+                <a:fillToRect l="50000" t="50000" r="50000" b="50000"/>
+              </a:path>
+              <a:tileRect/>
+            </a:gradFill>
+            <a:ln>
+              <a:noFill/>
+            </a:ln>
+            <a:effectLst/>
+          </p:spPr>
+          <p:style>
+            <a:lnRef idx="1">
+              <a:schemeClr val="accent1"/>
+            </a:lnRef>
+            <a:fillRef idx="3">
+              <a:schemeClr val="accent1"/>
+            </a:fillRef>
+            <a:effectRef idx="2">
+              <a:schemeClr val="accent1"/>
+            </a:effectRef>
+            <a:fontRef idx="minor">
+              <a:schemeClr val="lt1"/>
+            </a:fontRef>
+          </p:style>
+        </p:sp>
+        <p:sp>
+          <p:nvSpPr>
+            <p:cNvPr id="15" name="Oval 14">
+              <a:extLst>
+                <a:ext uri="{FF2B5EF4-FFF2-40B4-BE49-F238E27FC236}">
+                  <a16:creationId xmlns:a16="http://schemas.microsoft.com/office/drawing/2014/main" id="{28D1394B-6E38-4A72-BF6C-FD6DB64C6762}"/>
+                </a:ext>
+                <a:ext uri="{C183D7F6-B498-43B3-948B-1728B52AA6E4}">
+                  <adec:decorative xmlns:adec="http://schemas.microsoft.com/office/drawing/2017/decorative" val="1"/>
+                </a:ext>
+              </a:extLst>
+            </p:cNvPr>
+            <p:cNvSpPr/>
+            <p:nvPr>
+              <p:extLst>
+                <p:ext uri="{386F3935-93C4-4BCD-93E2-E3B085C9AB24}">
+                  <p16:designElem xmlns:p16="http://schemas.microsoft.com/office/powerpoint/2015/main" val="1"/>
+                </p:ext>
+              </p:extLst>
+            </p:nvPr>
+          </p:nvSpPr>
+          <p:spPr>
+            <a:xfrm>
+              <a:off x="0" y="2895600"/>
+              <a:ext cx="2362200" cy="2362200"/>
+            </a:xfrm>
+            <a:prstGeom prst="ellipse">
+              <a:avLst/>
+            </a:prstGeom>
+            <a:gradFill flip="none" rotWithShape="1">
+              <a:gsLst>
+                <a:gs pos="0">
+                  <a:schemeClr val="accent5">
+                    <a:alpha val="8000"/>
+                  </a:schemeClr>
+                </a:gs>
+                <a:gs pos="72000">
+                  <a:schemeClr val="accent5">
+                    <a:alpha val="0"/>
+                  </a:schemeClr>
+                </a:gs>
+                <a:gs pos="36000">
+                  <a:schemeClr val="accent5">
+                    <a:alpha val="8000"/>
+                  </a:schemeClr>
+                </a:gs>
+              </a:gsLst>
+              <a:path path="circle">
+                <a:fillToRect l="50000" t="50000" r="50000" b="50000"/>
+              </a:path>
+              <a:tileRect/>
+            </a:gradFill>
+            <a:ln>
+              <a:noFill/>
+            </a:ln>
+            <a:effectLst/>
+          </p:spPr>
+          <p:style>
+            <a:lnRef idx="1">
+              <a:schemeClr val="accent1"/>
+            </a:lnRef>
+            <a:fillRef idx="3">
+              <a:schemeClr val="accent1"/>
+            </a:fillRef>
+            <a:effectRef idx="2">
+              <a:schemeClr val="accent1"/>
+            </a:effectRef>
+            <a:fontRef idx="minor">
+              <a:schemeClr val="lt1"/>
+            </a:fontRef>
+          </p:style>
+        </p:sp>
+        <p:sp>
+          <p:nvSpPr>
+            <p:cNvPr id="16" name="Rectangle 15">
+              <a:extLst>
+                <a:ext uri="{FF2B5EF4-FFF2-40B4-BE49-F238E27FC236}">
+                  <a16:creationId xmlns:a16="http://schemas.microsoft.com/office/drawing/2014/main" id="{BB5BBBEF-5E27-4125-808B-53FD258B7CE6}"/>
+                </a:ext>
+                <a:ext uri="{C183D7F6-B498-43B3-948B-1728B52AA6E4}">
+                  <adec:decorative xmlns:adec="http://schemas.microsoft.com/office/drawing/2017/decorative" val="1"/>
+                </a:ext>
+              </a:extLst>
+            </p:cNvPr>
+            <p:cNvSpPr/>
+            <p:nvPr>
+              <p:extLst>
+                <p:ext uri="{386F3935-93C4-4BCD-93E2-E3B085C9AB24}">
+                  <p16:designElem xmlns:p16="http://schemas.microsoft.com/office/powerpoint/2015/main" val="1"/>
+                </p:ext>
+              </p:extLst>
+            </p:nvPr>
+          </p:nvSpPr>
+          <p:spPr bwMode="gray">
+            <a:xfrm>
+              <a:off x="7289800" y="402165"/>
+              <a:ext cx="4478865" cy="6053670"/>
+            </a:xfrm>
+            <a:prstGeom prst="rect">
+              <a:avLst/>
+            </a:prstGeom>
+            <a:solidFill>
+              <a:schemeClr val="bg1"/>
+            </a:solidFill>
+            <a:ln>
+              <a:noFill/>
+            </a:ln>
+            <a:effectLst/>
+          </p:spPr>
+          <p:style>
+            <a:lnRef idx="1">
+              <a:schemeClr val="accent1"/>
+            </a:lnRef>
+            <a:fillRef idx="3">
+              <a:schemeClr val="accent1"/>
+            </a:fillRef>
+            <a:effectRef idx="2">
+              <a:schemeClr val="accent1"/>
+            </a:effectRef>
+            <a:fontRef idx="minor">
+              <a:schemeClr val="lt1"/>
+            </a:fontRef>
+          </p:style>
+        </p:sp>
+        <p:sp>
+          <p:nvSpPr>
+            <p:cNvPr id="17" name="Freeform 5">
+              <a:extLst>
+                <a:ext uri="{FF2B5EF4-FFF2-40B4-BE49-F238E27FC236}">
+                  <a16:creationId xmlns:a16="http://schemas.microsoft.com/office/drawing/2014/main" id="{6A8E2910-FBBD-47B6-A6D5-1FA30388D544}"/>
+                </a:ext>
+                <a:ext uri="{C183D7F6-B498-43B3-948B-1728B52AA6E4}">
+                  <adec:decorative xmlns:adec="http://schemas.microsoft.com/office/drawing/2017/decorative" val="1"/>
+                </a:ext>
+              </a:extLst>
+            </p:cNvPr>
+            <p:cNvSpPr/>
+            <p:nvPr>
+              <p:extLst>
+                <p:ext uri="{386F3935-93C4-4BCD-93E2-E3B085C9AB24}">
+                  <p16:designElem xmlns:p16="http://schemas.microsoft.com/office/powerpoint/2015/main" val="1"/>
+                </p:ext>
+              </p:extLst>
+            </p:nvPr>
+          </p:nvSpPr>
+          <p:spPr bwMode="gray">
+            <a:xfrm rot="16200000">
+              <a:off x="4465654" y="2801721"/>
+              <a:ext cx="6053670" cy="1254558"/>
+            </a:xfrm>
+            <a:custGeom>
+              <a:avLst/>
+              <a:gdLst/>
+              <a:ahLst/>
+              <a:cxnLst/>
+              <a:rect l="l" t="t" r="r" b="b"/>
+              <a:pathLst>
+                <a:path w="10000" h="8000">
+                  <a:moveTo>
+                    <a:pt x="0" y="0"/>
+                  </a:moveTo>
+                  <a:lnTo>
+                    <a:pt x="0" y="7970"/>
+                  </a:lnTo>
+                  <a:lnTo>
+                    <a:pt x="10000" y="8000"/>
+                  </a:lnTo>
+                  <a:lnTo>
+                    <a:pt x="10000" y="7"/>
+                  </a:lnTo>
+                  <a:lnTo>
+                    <a:pt x="10000" y="7"/>
+                  </a:lnTo>
+                  <a:lnTo>
+                    <a:pt x="9773" y="156"/>
+                  </a:lnTo>
+                  <a:lnTo>
+                    <a:pt x="9547" y="298"/>
+                  </a:lnTo>
+                  <a:lnTo>
+                    <a:pt x="9320" y="437"/>
+                  </a:lnTo>
+                  <a:lnTo>
+                    <a:pt x="9092" y="556"/>
+                  </a:lnTo>
+                  <a:lnTo>
+                    <a:pt x="8865" y="676"/>
+                  </a:lnTo>
+                  <a:lnTo>
+                    <a:pt x="8637" y="788"/>
+                  </a:lnTo>
+                  <a:lnTo>
+                    <a:pt x="8412" y="884"/>
+                  </a:lnTo>
+                  <a:lnTo>
+                    <a:pt x="8184" y="975"/>
+                  </a:lnTo>
+                  <a:lnTo>
+                    <a:pt x="7957" y="1058"/>
+                  </a:lnTo>
+                  <a:lnTo>
+                    <a:pt x="7734" y="1130"/>
+                  </a:lnTo>
+                  <a:lnTo>
+                    <a:pt x="7508" y="1202"/>
+                  </a:lnTo>
+                  <a:lnTo>
+                    <a:pt x="7285" y="1262"/>
+                  </a:lnTo>
+                  <a:lnTo>
+                    <a:pt x="7062" y="1309"/>
+                  </a:lnTo>
+                  <a:lnTo>
+                    <a:pt x="6840" y="1358"/>
+                  </a:lnTo>
+                  <a:lnTo>
+                    <a:pt x="6620" y="1399"/>
+                  </a:lnTo>
+                  <a:lnTo>
+                    <a:pt x="6402" y="1428"/>
+                  </a:lnTo>
+                  <a:lnTo>
+                    <a:pt x="6184" y="1453"/>
+                  </a:lnTo>
+                  <a:lnTo>
+                    <a:pt x="5968" y="1477"/>
+                  </a:lnTo>
+                  <a:lnTo>
+                    <a:pt x="5755" y="1488"/>
+                  </a:lnTo>
+                  <a:lnTo>
+                    <a:pt x="5542" y="1500"/>
+                  </a:lnTo>
+                  <a:lnTo>
+                    <a:pt x="5332" y="1506"/>
+                  </a:lnTo>
+                  <a:lnTo>
+                    <a:pt x="5124" y="1500"/>
+                  </a:lnTo>
+                  <a:lnTo>
+                    <a:pt x="4918" y="1500"/>
+                  </a:lnTo>
+                  <a:lnTo>
+                    <a:pt x="4714" y="1488"/>
+                  </a:lnTo>
+                  <a:lnTo>
+                    <a:pt x="4514" y="1470"/>
+                  </a:lnTo>
+                  <a:lnTo>
+                    <a:pt x="4316" y="1453"/>
+                  </a:lnTo>
+                  <a:lnTo>
+                    <a:pt x="4122" y="1434"/>
+                  </a:lnTo>
+                  <a:lnTo>
+                    <a:pt x="3929" y="1405"/>
+                  </a:lnTo>
+                  <a:lnTo>
+                    <a:pt x="3739" y="1374"/>
+                  </a:lnTo>
+                  <a:lnTo>
+                    <a:pt x="3553" y="1346"/>
+                  </a:lnTo>
+                  <a:lnTo>
+                    <a:pt x="3190" y="1267"/>
+                  </a:lnTo>
+                  <a:lnTo>
+                    <a:pt x="2842" y="1183"/>
+                  </a:lnTo>
+                  <a:lnTo>
+                    <a:pt x="2508" y="1095"/>
+                  </a:lnTo>
+                  <a:lnTo>
+                    <a:pt x="2192" y="998"/>
+                  </a:lnTo>
+                  <a:lnTo>
+                    <a:pt x="1890" y="897"/>
+                  </a:lnTo>
+                  <a:lnTo>
+                    <a:pt x="1610" y="788"/>
+                  </a:lnTo>
+                  <a:lnTo>
+                    <a:pt x="1347" y="681"/>
+                  </a:lnTo>
+                  <a:lnTo>
+                    <a:pt x="1105" y="574"/>
+                  </a:lnTo>
+                  <a:lnTo>
+                    <a:pt x="883" y="473"/>
+                  </a:lnTo>
+                  <a:lnTo>
+                    <a:pt x="686" y="377"/>
+                  </a:lnTo>
+                  <a:lnTo>
+                    <a:pt x="508" y="286"/>
+                  </a:lnTo>
+                  <a:lnTo>
+                    <a:pt x="358" y="210"/>
+                  </a:lnTo>
+                  <a:lnTo>
+                    <a:pt x="232" y="138"/>
+                  </a:lnTo>
+                  <a:lnTo>
+                    <a:pt x="59" y="35"/>
+                  </a:lnTo>
+                  <a:lnTo>
+                    <a:pt x="0" y="0"/>
+                  </a:lnTo>
+                  <a:lnTo>
+                    <a:pt x="0" y="0"/>
+                  </a:lnTo>
+                  <a:close/>
+                </a:path>
+              </a:pathLst>
+            </a:custGeom>
+            <a:solidFill>
+              <a:schemeClr val="bg1"/>
+            </a:solidFill>
+            <a:ln>
+              <a:noFill/>
+            </a:ln>
+          </p:spPr>
+        </p:sp>
+        <p:sp>
+          <p:nvSpPr>
+            <p:cNvPr id="18" name="Freeform 5">
+              <a:extLst>
+                <a:ext uri="{FF2B5EF4-FFF2-40B4-BE49-F238E27FC236}">
+                  <a16:creationId xmlns:a16="http://schemas.microsoft.com/office/drawing/2014/main" id="{02CE8B07-E3AE-41C6-9378-543D478C7A8F}"/>
+                </a:ext>
+                <a:ext uri="{C183D7F6-B498-43B3-948B-1728B52AA6E4}">
+                  <adec:decorative xmlns:adec="http://schemas.microsoft.com/office/drawing/2017/decorative" val="1"/>
+                </a:ext>
+              </a:extLst>
+            </p:cNvPr>
+            <p:cNvSpPr/>
+            <p:nvPr>
+              <p:extLst>
+                <p:ext uri="{386F3935-93C4-4BCD-93E2-E3B085C9AB24}">
+                  <p16:designElem xmlns:p16="http://schemas.microsoft.com/office/powerpoint/2015/main" val="1"/>
+                </p:ext>
+              </p:extLst>
+            </p:nvPr>
+          </p:nvSpPr>
+          <p:spPr bwMode="gray">
+            <a:xfrm rot="15922489">
+              <a:off x="5376762" y="1826078"/>
+              <a:ext cx="3299407" cy="440924"/>
+            </a:xfrm>
+            <a:custGeom>
+              <a:avLst/>
+              <a:gdLst/>
+              <a:ahLst/>
+              <a:cxnLst/>
+              <a:rect l="l" t="t" r="r" b="b"/>
+              <a:pathLst>
+                <a:path w="10000" h="5291">
+                  <a:moveTo>
+                    <a:pt x="85" y="2532"/>
+                  </a:moveTo>
+                  <a:cubicBezTo>
+                    <a:pt x="1736" y="3911"/>
+                    <a:pt x="7524" y="5298"/>
+                    <a:pt x="9958" y="5291"/>
+                  </a:cubicBezTo>
+                  <a:cubicBezTo>
+                    <a:pt x="9989" y="1958"/>
+                    <a:pt x="9969" y="3333"/>
+                    <a:pt x="10000" y="0"/>
+                  </a:cubicBezTo>
+                  <a:lnTo>
+                    <a:pt x="10000" y="0"/>
+                  </a:lnTo>
+                  <a:lnTo>
+                    <a:pt x="9667" y="204"/>
+                  </a:lnTo>
+                  <a:lnTo>
+                    <a:pt x="9334" y="400"/>
+                  </a:lnTo>
+                  <a:lnTo>
+                    <a:pt x="9001" y="590"/>
+                  </a:lnTo>
+                  <a:lnTo>
+                    <a:pt x="8667" y="753"/>
+                  </a:lnTo>
+                  <a:lnTo>
+                    <a:pt x="8333" y="917"/>
+                  </a:lnTo>
+                  <a:lnTo>
+                    <a:pt x="7999" y="1071"/>
+                  </a:lnTo>
+                  <a:lnTo>
+                    <a:pt x="7669" y="1202"/>
+                  </a:lnTo>
+                  <a:lnTo>
+                    <a:pt x="7333" y="1325"/>
+                  </a:lnTo>
+                  <a:lnTo>
+                    <a:pt x="7000" y="1440"/>
+                  </a:lnTo>
+                  <a:lnTo>
+                    <a:pt x="6673" y="1538"/>
+                  </a:lnTo>
+                  <a:lnTo>
+                    <a:pt x="6340" y="1636"/>
+                  </a:lnTo>
+                  <a:lnTo>
+                    <a:pt x="6013" y="1719"/>
+                  </a:lnTo>
+                  <a:lnTo>
+                    <a:pt x="5686" y="1784"/>
+                  </a:lnTo>
+                  <a:lnTo>
+                    <a:pt x="5359" y="1850"/>
+                  </a:lnTo>
+                  <a:lnTo>
+                    <a:pt x="5036" y="1906"/>
+                  </a:lnTo>
+                  <a:lnTo>
+                    <a:pt x="4717" y="1948"/>
+                  </a:lnTo>
+                  <a:lnTo>
+                    <a:pt x="4396" y="1980"/>
+                  </a:lnTo>
+                  <a:lnTo>
+                    <a:pt x="4079" y="2013"/>
+                  </a:lnTo>
+                  <a:lnTo>
+                    <a:pt x="3766" y="2029"/>
+                  </a:lnTo>
+                  <a:lnTo>
+                    <a:pt x="3454" y="2046"/>
+                  </a:lnTo>
+                  <a:lnTo>
+                    <a:pt x="3145" y="2053"/>
+                  </a:lnTo>
+                  <a:lnTo>
+                    <a:pt x="2839" y="2046"/>
+                  </a:lnTo>
+                  <a:lnTo>
+                    <a:pt x="2537" y="2046"/>
+                  </a:lnTo>
+                  <a:lnTo>
+                    <a:pt x="2238" y="2029"/>
+                  </a:lnTo>
+                  <a:lnTo>
+                    <a:pt x="1943" y="2004"/>
+                  </a:lnTo>
+                  <a:lnTo>
+                    <a:pt x="1653" y="1980"/>
+                  </a:lnTo>
+                  <a:lnTo>
+                    <a:pt x="1368" y="1955"/>
+                  </a:lnTo>
+                  <a:lnTo>
+                    <a:pt x="1085" y="1915"/>
+                  </a:lnTo>
+                  <a:lnTo>
+                    <a:pt x="806" y="1873"/>
+                  </a:lnTo>
+                  <a:lnTo>
+                    <a:pt x="533" y="1833"/>
+                  </a:lnTo>
+                  <a:lnTo>
+                    <a:pt x="0" y="1726"/>
+                  </a:lnTo>
+                  <a:cubicBezTo>
+                    <a:pt x="28" y="1995"/>
+                    <a:pt x="57" y="2263"/>
+                    <a:pt x="85" y="2532"/>
+                  </a:cubicBezTo>
+                  <a:close/>
+                </a:path>
+              </a:pathLst>
+            </a:custGeom>
+            <a:solidFill>
+              <a:schemeClr val="bg1">
+                <a:alpha val="20000"/>
+              </a:schemeClr>
+            </a:solidFill>
+            <a:ln>
+              <a:noFill/>
+            </a:ln>
+          </p:spPr>
+        </p:sp>
+        <p:sp>
+          <p:nvSpPr>
+            <p:cNvPr id="19" name="Freeform 5">
+              <a:extLst>
+                <a:ext uri="{FF2B5EF4-FFF2-40B4-BE49-F238E27FC236}">
+                  <a16:creationId xmlns:a16="http://schemas.microsoft.com/office/drawing/2014/main" id="{BDF4725C-2B01-4AF0-8AE9-18A242E17126}"/>
+                </a:ext>
+                <a:ext uri="{C183D7F6-B498-43B3-948B-1728B52AA6E4}">
+                  <adec:decorative xmlns:adec="http://schemas.microsoft.com/office/drawing/2017/decorative" val="1"/>
+                </a:ext>
+              </a:extLst>
+            </p:cNvPr>
+            <p:cNvSpPr>
+              <a:spLocks noEditPoints="1"/>
+            </p:cNvSpPr>
+            <p:nvPr>
+              <p:extLst>
+                <p:ext uri="{386F3935-93C4-4BCD-93E2-E3B085C9AB24}">
+                  <p16:designElem xmlns:p16="http://schemas.microsoft.com/office/powerpoint/2015/main" val="1"/>
+                </p:ext>
+              </p:extLst>
+            </p:nvPr>
+          </p:nvSpPr>
+          <p:spPr bwMode="gray">
+            <a:xfrm>
+              <a:off x="0" y="1587"/>
+              <a:ext cx="12192000" cy="6856413"/>
+            </a:xfrm>
+            <a:custGeom>
+              <a:avLst/>
+              <a:gdLst/>
+              <a:ahLst/>
+              <a:cxnLst/>
+              <a:rect l="0" t="0" r="r" b="b"/>
+              <a:pathLst>
+                <a:path w="15356" h="8638">
+                  <a:moveTo>
+                    <a:pt x="0" y="0"/>
+                  </a:moveTo>
+                  <a:lnTo>
+                    <a:pt x="0" y="8638"/>
+                  </a:lnTo>
+                  <a:lnTo>
+                    <a:pt x="15356" y="8638"/>
+                  </a:lnTo>
+                  <a:lnTo>
+                    <a:pt x="15356" y="0"/>
+                  </a:lnTo>
+                  <a:lnTo>
+                    <a:pt x="0" y="0"/>
+                  </a:lnTo>
+                  <a:close/>
+                  <a:moveTo>
+                    <a:pt x="14748" y="8038"/>
+                  </a:moveTo>
+                  <a:lnTo>
+                    <a:pt x="600" y="8038"/>
+                  </a:lnTo>
+                  <a:lnTo>
+                    <a:pt x="600" y="592"/>
+                  </a:lnTo>
+                  <a:lnTo>
+                    <a:pt x="14748" y="592"/>
+                  </a:lnTo>
+                  <a:lnTo>
+                    <a:pt x="14748" y="8038"/>
+                  </a:lnTo>
+                  <a:close/>
+                </a:path>
+              </a:pathLst>
+            </a:custGeom>
+            <a:solidFill>
+              <a:schemeClr val="bg1"/>
+            </a:solidFill>
+            <a:ln>
+              <a:noFill/>
+            </a:ln>
+          </p:spPr>
+        </p:sp>
+      </p:grpSp>
+      <p:sp>
+        <p:nvSpPr>
+          <p:cNvPr id="2" name="Title 1">
+            <a:extLst>
+              <a:ext uri="{FF2B5EF4-FFF2-40B4-BE49-F238E27FC236}">
+                <a16:creationId xmlns:a16="http://schemas.microsoft.com/office/drawing/2014/main" id="{ECDBF09F-BDDC-4AAE-BE8F-06B95358EB8C}"/>
+              </a:ext>
+            </a:extLst>
+          </p:cNvPr>
+          <p:cNvSpPr>
+            <a:spLocks noGrp="1"/>
+          </p:cNvSpPr>
+          <p:nvPr>
+            <p:ph type="title"/>
+          </p:nvPr>
+        </p:nvSpPr>
+        <p:spPr>
+          <a:xfrm>
+            <a:off x="639098" y="629265"/>
+            <a:ext cx="6072776" cy="1622322"/>
+          </a:xfrm>
+        </p:spPr>
+        <p:txBody>
+          <a:bodyPr>
+            <a:normAutofit/>
+          </a:bodyPr>
+          <a:lstStyle/>
+          <a:p>
+            <a:r>
+              <a:rPr lang="en-US" dirty="0"/>
+              <a:t>Most Significant Factor: Overtime</a:t>
+            </a:r>
+          </a:p>
+        </p:txBody>
+      </p:sp>
+      <p:sp>
+        <p:nvSpPr>
+          <p:cNvPr id="3" name="Content Placeholder 2">
+            <a:extLst>
+              <a:ext uri="{FF2B5EF4-FFF2-40B4-BE49-F238E27FC236}">
+                <a16:creationId xmlns:a16="http://schemas.microsoft.com/office/drawing/2014/main" id="{689AA02A-07A9-463F-A9E0-BE3CB920A85D}"/>
+              </a:ext>
+            </a:extLst>
+          </p:cNvPr>
+          <p:cNvSpPr>
+            <a:spLocks noGrp="1"/>
+          </p:cNvSpPr>
+          <p:nvPr>
+            <p:ph idx="1"/>
+          </p:nvPr>
+        </p:nvSpPr>
+        <p:spPr>
+          <a:xfrm>
+            <a:off x="639098" y="2418735"/>
+            <a:ext cx="6072776" cy="3811740"/>
+          </a:xfrm>
+        </p:spPr>
+        <p:txBody>
+          <a:bodyPr anchor="ctr">
+            <a:normAutofit/>
+          </a:bodyPr>
+          <a:lstStyle/>
+          <a:p>
+            <a:r>
+              <a:rPr lang="en-US" dirty="0">
+                <a:solidFill>
+                  <a:schemeClr val="bg1"/>
+                </a:solidFill>
+              </a:rPr>
+              <a:t>We need to insert a strongly worded statement here that says  </a:t>
+            </a:r>
+          </a:p>
+        </p:txBody>
+      </p:sp>
+      <p:pic>
+        <p:nvPicPr>
+          <p:cNvPr id="6" name="Picture 5">
+            <a:extLst>
+              <a:ext uri="{FF2B5EF4-FFF2-40B4-BE49-F238E27FC236}">
+                <a16:creationId xmlns:a16="http://schemas.microsoft.com/office/drawing/2014/main" id="{82698949-B985-457F-B94E-759299F07136}"/>
+              </a:ext>
+            </a:extLst>
+          </p:cNvPr>
+          <p:cNvPicPr>
+            <a:picLocks noChangeAspect="1"/>
+          </p:cNvPicPr>
+          <p:nvPr/>
+        </p:nvPicPr>
+        <p:blipFill>
+          <a:blip r:embed="rId3"/>
+          <a:stretch>
+            <a:fillRect/>
+          </a:stretch>
+        </p:blipFill>
+        <p:spPr>
+          <a:xfrm>
+            <a:off x="7379237" y="1176345"/>
+            <a:ext cx="4125317" cy="2413310"/>
+          </a:xfrm>
+          <a:prstGeom prst="rect">
+            <a:avLst/>
+          </a:prstGeom>
+        </p:spPr>
+      </p:pic>
+      <p:sp>
+        <p:nvSpPr>
+          <p:cNvPr id="21" name="Rectangle 20">
+            <a:extLst>
+              <a:ext uri="{FF2B5EF4-FFF2-40B4-BE49-F238E27FC236}">
+                <a16:creationId xmlns:a16="http://schemas.microsoft.com/office/drawing/2014/main" id="{D8E14221-6F70-4546-812E-6EA2ADA99344}"/>
+              </a:ext>
+              <a:ext uri="{C183D7F6-B498-43B3-948B-1728B52AA6E4}">
+                <adec:decorative xmlns:adec="http://schemas.microsoft.com/office/drawing/2017/decorative" val="1"/>
+              </a:ext>
+            </a:extLst>
+          </p:cNvPr>
+          <p:cNvSpPr>
+            <a:spLocks noGrp="1" noRot="1" noChangeAspect="1" noMove="1" noResize="1" noEditPoints="1" noAdjustHandles="1" noChangeArrowheads="1" noChangeShapeType="1" noTextEdit="1"/>
+          </p:cNvSpPr>
+          <p:nvPr>
+            <p:extLst>
+              <p:ext uri="{386F3935-93C4-4BCD-93E2-E3B085C9AB24}">
+                <p16:designElem xmlns:p16="http://schemas.microsoft.com/office/powerpoint/2015/main" val="1"/>
+              </p:ext>
+            </p:extLst>
+          </p:nvPr>
+        </p:nvSpPr>
+        <p:spPr>
+          <a:xfrm>
+            <a:off x="10437812" y="0"/>
+            <a:ext cx="685800" cy="1143000"/>
+          </a:xfrm>
+          <a:prstGeom prst="rect">
+            <a:avLst/>
+          </a:prstGeom>
+          <a:solidFill>
+            <a:schemeClr val="accent1"/>
+          </a:solidFill>
+          <a:ln>
+            <a:noFill/>
+          </a:ln>
+        </p:spPr>
+        <p:style>
+          <a:lnRef idx="1">
+            <a:schemeClr val="accent1"/>
+          </a:lnRef>
+          <a:fillRef idx="3">
+            <a:schemeClr val="accent1"/>
+          </a:fillRef>
+          <a:effectRef idx="2">
+            <a:schemeClr val="accent1"/>
+          </a:effectRef>
+          <a:fontRef idx="minor">
+            <a:schemeClr val="lt1"/>
+          </a:fontRef>
+        </p:style>
+      </p:sp>
+      <p:sp>
+        <p:nvSpPr>
+          <p:cNvPr id="4" name="Slide Number Placeholder 3">
+            <a:extLst>
+              <a:ext uri="{FF2B5EF4-FFF2-40B4-BE49-F238E27FC236}">
+                <a16:creationId xmlns:a16="http://schemas.microsoft.com/office/drawing/2014/main" id="{31C40EF3-C8A7-40EE-B3CD-DF40F25492D1}"/>
+              </a:ext>
+            </a:extLst>
+          </p:cNvPr>
+          <p:cNvSpPr>
+            <a:spLocks noGrp="1"/>
+          </p:cNvSpPr>
+          <p:nvPr>
+            <p:ph type="sldNum" sz="quarter" idx="12"/>
+          </p:nvPr>
+        </p:nvSpPr>
+        <p:spPr>
+          <a:xfrm>
+            <a:off x="10352540" y="295729"/>
+            <a:ext cx="838199" cy="767687"/>
+          </a:xfrm>
+        </p:spPr>
+        <p:txBody>
+          <a:bodyPr>
+            <a:normAutofit/>
+          </a:bodyPr>
+          <a:lstStyle/>
+          <a:p>
+            <a:pPr>
+              <a:spcAft>
+                <a:spcPts val="600"/>
+              </a:spcAft>
+            </a:pPr>
+            <a:fld id="{D57F1E4F-1CFF-5643-939E-217C01CDF565}" type="slidenum">
+              <a:rPr lang="en-US" smtClean="0"/>
+              <a:pPr>
+                <a:spcAft>
+                  <a:spcPts val="600"/>
+                </a:spcAft>
+              </a:pPr>
+              <a:t>10</a:t>
+            </a:fld>
+            <a:endParaRPr lang="en-US"/>
+          </a:p>
+        </p:txBody>
+      </p:sp>
+      <p:pic>
+        <p:nvPicPr>
+          <p:cNvPr id="5" name="Picture 4">
+            <a:extLst>
+              <a:ext uri="{FF2B5EF4-FFF2-40B4-BE49-F238E27FC236}">
+                <a16:creationId xmlns:a16="http://schemas.microsoft.com/office/drawing/2014/main" id="{D5BF64D6-6ED3-4D71-82B2-08C101ACCBA0}"/>
+              </a:ext>
+            </a:extLst>
+          </p:cNvPr>
+          <p:cNvPicPr>
+            <a:picLocks noChangeAspect="1"/>
+          </p:cNvPicPr>
+          <p:nvPr/>
+        </p:nvPicPr>
+        <p:blipFill>
+          <a:blip r:embed="rId4"/>
+          <a:stretch>
+            <a:fillRect/>
+          </a:stretch>
+        </p:blipFill>
+        <p:spPr>
+          <a:xfrm>
+            <a:off x="7216132" y="3788690"/>
+            <a:ext cx="4125317" cy="2361743"/>
+          </a:xfrm>
+          <a:prstGeom prst="rect">
+            <a:avLst/>
+          </a:prstGeom>
+        </p:spPr>
+      </p:pic>
+    </p:spTree>
+    <p:extLst>
+      <p:ext uri="{BB962C8B-B14F-4D97-AF65-F5344CB8AC3E}">
+        <p14:creationId xmlns:p14="http://schemas.microsoft.com/office/powerpoint/2010/main" val="265571558"/>
+      </p:ext>
+    </p:extLst>
+  </p:cSld>
+  <p:clrMapOvr>
+    <a:masterClrMapping/>
+  </p:clrMapOvr>
+</p:sld>
+</file>
+
+<file path=ppt/slides/slide11.xml><?xml version="1.0" encoding="utf-8"?>
+<p:sld xmlns:a="http://schemas.openxmlformats.org/drawingml/2006/main" xmlns:r="http://schemas.openxmlformats.org/officeDocument/2006/relationships" xmlns:p="http://schemas.openxmlformats.org/presentationml/2006/main">
+  <p:cSld>
+    <p:spTree>
+      <p:nvGrpSpPr>
+        <p:cNvPr id="1" name=""/>
+        <p:cNvGrpSpPr/>
+        <p:nvPr/>
+      </p:nvGrpSpPr>
+      <p:grpSpPr>
+        <a:xfrm>
+          <a:off x="0" y="0"/>
+          <a:ext cx="0" cy="0"/>
+          <a:chOff x="0" y="0"/>
+          <a:chExt cx="0" cy="0"/>
+        </a:xfrm>
+      </p:grpSpPr>
+      <p:sp>
+        <p:nvSpPr>
+          <p:cNvPr id="2" name="Title 1">
+            <a:extLst>
+              <a:ext uri="{FF2B5EF4-FFF2-40B4-BE49-F238E27FC236}">
+                <a16:creationId xmlns:a16="http://schemas.microsoft.com/office/drawing/2014/main" id="{ECDBF09F-BDDC-4AAE-BE8F-06B95358EB8C}"/>
+              </a:ext>
+            </a:extLst>
+          </p:cNvPr>
+          <p:cNvSpPr>
+            <a:spLocks noGrp="1"/>
+          </p:cNvSpPr>
+          <p:nvPr>
+            <p:ph type="title"/>
+          </p:nvPr>
+        </p:nvSpPr>
+        <p:spPr/>
+        <p:txBody>
+          <a:bodyPr>
+            <a:normAutofit fontScale="90000"/>
+          </a:bodyPr>
+          <a:lstStyle/>
+          <a:p>
+            <a:r>
+              <a:rPr lang="en-US" dirty="0"/>
+              <a:t>Aditya going to insert some things about age. </a:t>
+            </a:r>
+          </a:p>
+        </p:txBody>
+      </p:sp>
+      <p:sp>
+        <p:nvSpPr>
+          <p:cNvPr id="7" name="Picture Placeholder 6">
+            <a:extLst>
+              <a:ext uri="{FF2B5EF4-FFF2-40B4-BE49-F238E27FC236}">
+                <a16:creationId xmlns:a16="http://schemas.microsoft.com/office/drawing/2014/main" id="{41DEE0D4-16BC-42AC-B194-7A0E796EE8BF}"/>
+              </a:ext>
+            </a:extLst>
+          </p:cNvPr>
+          <p:cNvSpPr>
+            <a:spLocks noGrp="1"/>
+          </p:cNvSpPr>
+          <p:nvPr>
+            <p:ph type="pic" idx="1"/>
+          </p:nvPr>
+        </p:nvSpPr>
+        <p:spPr/>
+      </p:sp>
+      <p:sp>
+        <p:nvSpPr>
+          <p:cNvPr id="3" name="Content Placeholder 2">
+            <a:extLst>
+              <a:ext uri="{FF2B5EF4-FFF2-40B4-BE49-F238E27FC236}">
+                <a16:creationId xmlns:a16="http://schemas.microsoft.com/office/drawing/2014/main" id="{689AA02A-07A9-463F-A9E0-BE3CB920A85D}"/>
+              </a:ext>
+            </a:extLst>
+          </p:cNvPr>
+          <p:cNvSpPr>
+            <a:spLocks noGrp="1"/>
+          </p:cNvSpPr>
+          <p:nvPr>
+            <p:ph type="body" sz="half" idx="2"/>
+          </p:nvPr>
+        </p:nvSpPr>
+        <p:spPr/>
+        <p:txBody>
+          <a:bodyPr anchor="ctr">
+            <a:normAutofit/>
+          </a:bodyPr>
+          <a:lstStyle/>
+          <a:p>
+            <a:r>
+              <a:rPr lang="en-US" dirty="0">
+                <a:solidFill>
+                  <a:schemeClr val="bg1"/>
+                </a:solidFill>
+              </a:rPr>
+              <a:t>We need to insert a strongly worded statement here that says  something about age and plots from age here (histogram)</a:t>
+            </a:r>
+          </a:p>
+        </p:txBody>
+      </p:sp>
+      <p:sp>
+        <p:nvSpPr>
+          <p:cNvPr id="4" name="Slide Number Placeholder 3">
+            <a:extLst>
+              <a:ext uri="{FF2B5EF4-FFF2-40B4-BE49-F238E27FC236}">
+                <a16:creationId xmlns:a16="http://schemas.microsoft.com/office/drawing/2014/main" id="{31C40EF3-C8A7-40EE-B3CD-DF40F25492D1}"/>
+              </a:ext>
+            </a:extLst>
+          </p:cNvPr>
+          <p:cNvSpPr>
+            <a:spLocks noGrp="1"/>
+          </p:cNvSpPr>
+          <p:nvPr>
+            <p:ph type="sldNum" sz="quarter" idx="12"/>
+          </p:nvPr>
+        </p:nvSpPr>
+        <p:spPr/>
+        <p:txBody>
+          <a:bodyPr>
+            <a:normAutofit/>
+          </a:bodyPr>
+          <a:lstStyle/>
+          <a:p>
+            <a:pPr>
+              <a:spcAft>
+                <a:spcPts val="600"/>
+              </a:spcAft>
+            </a:pPr>
+            <a:fld id="{D57F1E4F-1CFF-5643-939E-217C01CDF565}" type="slidenum">
+              <a:rPr lang="en-US" smtClean="0"/>
+              <a:pPr>
+                <a:spcAft>
+                  <a:spcPts val="600"/>
+                </a:spcAft>
+              </a:pPr>
+              <a:t>11</a:t>
+            </a:fld>
+            <a:endParaRPr lang="en-US"/>
+          </a:p>
+        </p:txBody>
+      </p:sp>
+    </p:spTree>
+    <p:extLst>
+      <p:ext uri="{BB962C8B-B14F-4D97-AF65-F5344CB8AC3E}">
+        <p14:creationId xmlns:p14="http://schemas.microsoft.com/office/powerpoint/2010/main" val="3613684595"/>
+      </p:ext>
+    </p:extLst>
+  </p:cSld>
+  <p:clrMapOvr>
+    <a:masterClrMapping/>
+  </p:clrMapOvr>
+</p:sld>
+</file>
+
+<file path=ppt/slides/slide12.xml><?xml version="1.0" encoding="utf-8"?>
+<p:sld xmlns:a="http://schemas.openxmlformats.org/drawingml/2006/main" xmlns:r="http://schemas.openxmlformats.org/officeDocument/2006/relationships" xmlns:p="http://schemas.openxmlformats.org/presentationml/2006/main">
+  <p:cSld>
+    <p:spTree>
+      <p:nvGrpSpPr>
+        <p:cNvPr id="1" name=""/>
+        <p:cNvGrpSpPr/>
+        <p:nvPr/>
+      </p:nvGrpSpPr>
+      <p:grpSpPr>
+        <a:xfrm>
+          <a:off x="0" y="0"/>
+          <a:ext cx="0" cy="0"/>
+          <a:chOff x="0" y="0"/>
+          <a:chExt cx="0" cy="0"/>
+        </a:xfrm>
+      </p:grpSpPr>
+      <p:sp>
+        <p:nvSpPr>
           <p:cNvPr id="2" name="Title 1">
             <a:extLst>
               <a:ext uri="{FF2B5EF4-FFF2-40B4-BE49-F238E27FC236}">
@@ -12964,15 +14131,7 @@
           <a:p>
             <a:r>
               <a:rPr lang="en-US" dirty="0"/>
-              <a:t>QOL Factors (</a:t>
-            </a:r>
-            <a:r>
-              <a:rPr lang="en-US" sz="1800" dirty="0"/>
-              <a:t>Business trave</a:t>
-            </a:r>
-            <a:r>
-              <a:rPr lang="en-US" dirty="0"/>
-              <a:t>l)</a:t>
+              <a:t>Other Factors: Business Travel</a:t>
             </a:r>
           </a:p>
         </p:txBody>
@@ -13050,7 +14209,7 @@
 </p:sld>
 </file>
 
-<file path=ppt/slides/slide11.xml><?xml version="1.0" encoding="utf-8"?>
+<file path=ppt/slides/slide13.xml><?xml version="1.0" encoding="utf-8"?>
 <p:sld xmlns:a="http://schemas.openxmlformats.org/drawingml/2006/main" xmlns:r="http://schemas.openxmlformats.org/officeDocument/2006/relationships" xmlns:p="http://schemas.openxmlformats.org/presentationml/2006/main">
   <p:cSld>
     <p:spTree>
@@ -13072,132 +14231,6 @@
           <p:cNvPr id="2" name="Title 1">
             <a:extLst>
               <a:ext uri="{FF2B5EF4-FFF2-40B4-BE49-F238E27FC236}">
-                <a16:creationId xmlns:a16="http://schemas.microsoft.com/office/drawing/2014/main" id="{6260E46F-6952-4DA2-92B5-DAC214064231}"/>
-              </a:ext>
-            </a:extLst>
-          </p:cNvPr>
-          <p:cNvSpPr>
-            <a:spLocks noGrp="1"/>
-          </p:cNvSpPr>
-          <p:nvPr>
-            <p:ph type="title"/>
-          </p:nvPr>
-        </p:nvSpPr>
-        <p:spPr/>
-        <p:txBody>
-          <a:bodyPr/>
-          <a:lstStyle/>
-          <a:p>
-            <a:r>
-              <a:rPr lang="en-US" dirty="0"/>
-              <a:t>QOL Factors (</a:t>
-            </a:r>
-            <a:r>
-              <a:rPr lang="en-US" sz="1800" dirty="0"/>
-              <a:t>Overtime</a:t>
-            </a:r>
-            <a:r>
-              <a:rPr lang="en-US" dirty="0"/>
-              <a:t>)</a:t>
-            </a:r>
-          </a:p>
-        </p:txBody>
-      </p:sp>
-      <p:pic>
-        <p:nvPicPr>
-          <p:cNvPr id="5" name="Picture 4">
-            <a:extLst>
-              <a:ext uri="{FF2B5EF4-FFF2-40B4-BE49-F238E27FC236}">
-                <a16:creationId xmlns:a16="http://schemas.microsoft.com/office/drawing/2014/main" id="{9D583699-96B7-48A3-BC33-DE5ACF55B5FC}"/>
-              </a:ext>
-            </a:extLst>
-          </p:cNvPr>
-          <p:cNvPicPr>
-            <a:picLocks noChangeAspect="1"/>
-          </p:cNvPicPr>
-          <p:nvPr/>
-        </p:nvPicPr>
-        <p:blipFill>
-          <a:blip r:embed="rId2"/>
-          <a:stretch>
-            <a:fillRect/>
-          </a:stretch>
-        </p:blipFill>
-        <p:spPr>
-          <a:xfrm>
-            <a:off x="149711" y="2412434"/>
-            <a:ext cx="5715000" cy="3267075"/>
-          </a:xfrm>
-          <a:prstGeom prst="rect">
-            <a:avLst/>
-          </a:prstGeom>
-        </p:spPr>
-      </p:pic>
-      <p:pic>
-        <p:nvPicPr>
-          <p:cNvPr id="6" name="Picture 5">
-            <a:extLst>
-              <a:ext uri="{FF2B5EF4-FFF2-40B4-BE49-F238E27FC236}">
-                <a16:creationId xmlns:a16="http://schemas.microsoft.com/office/drawing/2014/main" id="{F734ED59-656E-4647-B2AA-C897ACE30C19}"/>
-              </a:ext>
-            </a:extLst>
-          </p:cNvPr>
-          <p:cNvPicPr>
-            <a:picLocks noChangeAspect="1"/>
-          </p:cNvPicPr>
-          <p:nvPr/>
-        </p:nvPicPr>
-        <p:blipFill>
-          <a:blip r:embed="rId3"/>
-          <a:stretch>
-            <a:fillRect/>
-          </a:stretch>
-        </p:blipFill>
-        <p:spPr>
-          <a:xfrm>
-            <a:off x="6262849" y="2412434"/>
-            <a:ext cx="5400675" cy="3152775"/>
-          </a:xfrm>
-          <a:prstGeom prst="rect">
-            <a:avLst/>
-          </a:prstGeom>
-        </p:spPr>
-      </p:pic>
-    </p:spTree>
-    <p:extLst>
-      <p:ext uri="{BB962C8B-B14F-4D97-AF65-F5344CB8AC3E}">
-        <p14:creationId xmlns:p14="http://schemas.microsoft.com/office/powerpoint/2010/main" val="2616292469"/>
-      </p:ext>
-    </p:extLst>
-  </p:cSld>
-  <p:clrMapOvr>
-    <a:masterClrMapping/>
-  </p:clrMapOvr>
-</p:sld>
-</file>
-
-<file path=ppt/slides/slide12.xml><?xml version="1.0" encoding="utf-8"?>
-<p:sld xmlns:a="http://schemas.openxmlformats.org/drawingml/2006/main" xmlns:r="http://schemas.openxmlformats.org/officeDocument/2006/relationships" xmlns:p="http://schemas.openxmlformats.org/presentationml/2006/main">
-  <p:cSld>
-    <p:spTree>
-      <p:nvGrpSpPr>
-        <p:cNvPr id="1" name=""/>
-        <p:cNvGrpSpPr/>
-        <p:nvPr/>
-      </p:nvGrpSpPr>
-      <p:grpSpPr>
-        <a:xfrm>
-          <a:off x="0" y="0"/>
-          <a:ext cx="0" cy="0"/>
-          <a:chOff x="0" y="0"/>
-          <a:chExt cx="0" cy="0"/>
-        </a:xfrm>
-      </p:grpSpPr>
-      <p:sp>
-        <p:nvSpPr>
-          <p:cNvPr id="2" name="Title 1">
-            <a:extLst>
-              <a:ext uri="{FF2B5EF4-FFF2-40B4-BE49-F238E27FC236}">
                 <a16:creationId xmlns:a16="http://schemas.microsoft.com/office/drawing/2014/main" id="{389308DA-C69E-44C1-9F3E-D60F49B89D1C}"/>
               </a:ext>
             </a:extLst>
@@ -13245,7 +14278,7 @@
             <a:fld id="{D57F1E4F-1CFF-5643-939E-217C01CDF565}" type="slidenum">
               <a:rPr lang="en-US" smtClean="0"/>
               <a:pPr/>
-              <a:t>12</a:t>
+              <a:t>13</a:t>
             </a:fld>
             <a:endParaRPr lang="en-US" dirty="0"/>
           </a:p>
@@ -13350,7 +14383,7 @@
 </p:sld>
 </file>
 
-<file path=ppt/slides/slide13.xml><?xml version="1.0" encoding="utf-8"?>
+<file path=ppt/slides/slide14.xml><?xml version="1.0" encoding="utf-8"?>
 <p:sld xmlns:a="http://schemas.openxmlformats.org/drawingml/2006/main" xmlns:r="http://schemas.openxmlformats.org/officeDocument/2006/relationships" xmlns:p="http://schemas.openxmlformats.org/presentationml/2006/main">
   <p:cSld>
     <p:bg>
@@ -13902,7 +14935,7 @@
             <a:fld id="{D57F1E4F-1CFF-5643-939E-217C01CDF565}" type="slidenum">
               <a:rPr lang="en-US" smtClean="0"/>
               <a:pPr/>
-              <a:t>13</a:t>
+              <a:t>14</a:t>
             </a:fld>
             <a:endParaRPr lang="en-US" dirty="0"/>
           </a:p>
@@ -13921,7 +14954,7 @@
 </p:sld>
 </file>
 
-<file path=ppt/slides/slide14.xml><?xml version="1.0" encoding="utf-8"?>
+<file path=ppt/slides/slide15.xml><?xml version="1.0" encoding="utf-8"?>
 <p:sld xmlns:a="http://schemas.openxmlformats.org/drawingml/2006/main" xmlns:r="http://schemas.openxmlformats.org/officeDocument/2006/relationships" xmlns:p="http://schemas.openxmlformats.org/presentationml/2006/main">
   <p:cSld>
     <p:spTree>
@@ -14251,7 +15284,7 @@
             <a:fld id="{D57F1E4F-1CFF-5643-939E-217C01CDF565}" type="slidenum">
               <a:rPr lang="en-US" smtClean="0"/>
               <a:pPr/>
-              <a:t>14</a:t>
+              <a:t>15</a:t>
             </a:fld>
             <a:endParaRPr lang="en-US" dirty="0"/>
           </a:p>
@@ -14270,7 +15303,7 @@
 </p:sld>
 </file>
 
-<file path=ppt/slides/slide15.xml><?xml version="1.0" encoding="utf-8"?>
+<file path=ppt/slides/slide16.xml><?xml version="1.0" encoding="utf-8"?>
 <p:sld xmlns:a="http://schemas.openxmlformats.org/drawingml/2006/main" xmlns:r="http://schemas.openxmlformats.org/officeDocument/2006/relationships" xmlns:p="http://schemas.openxmlformats.org/presentationml/2006/main">
   <p:cSld>
     <p:spTree>
@@ -14461,7 +15494,7 @@
             <a:fld id="{D57F1E4F-1CFF-5643-939E-217C01CDF565}" type="slidenum">
               <a:rPr lang="en-US" smtClean="0"/>
               <a:pPr/>
-              <a:t>15</a:t>
+              <a:t>16</a:t>
             </a:fld>
             <a:endParaRPr lang="en-US" dirty="0"/>
           </a:p>
@@ -14471,6 +15504,122 @@
     <p:extLst>
       <p:ext uri="{BB962C8B-B14F-4D97-AF65-F5344CB8AC3E}">
         <p14:creationId xmlns:p14="http://schemas.microsoft.com/office/powerpoint/2010/main" val="1234567773"/>
+      </p:ext>
+    </p:extLst>
+  </p:cSld>
+  <p:clrMapOvr>
+    <a:masterClrMapping/>
+  </p:clrMapOvr>
+</p:sld>
+</file>
+
+<file path=ppt/slides/slide17.xml><?xml version="1.0" encoding="utf-8"?>
+<p:sld xmlns:a="http://schemas.openxmlformats.org/drawingml/2006/main" xmlns:r="http://schemas.openxmlformats.org/officeDocument/2006/relationships" xmlns:p="http://schemas.openxmlformats.org/presentationml/2006/main">
+  <p:cSld>
+    <p:spTree>
+      <p:nvGrpSpPr>
+        <p:cNvPr id="1" name=""/>
+        <p:cNvGrpSpPr/>
+        <p:nvPr/>
+      </p:nvGrpSpPr>
+      <p:grpSpPr>
+        <a:xfrm>
+          <a:off x="0" y="0"/>
+          <a:ext cx="0" cy="0"/>
+          <a:chOff x="0" y="0"/>
+          <a:chExt cx="0" cy="0"/>
+        </a:xfrm>
+      </p:grpSpPr>
+      <p:sp>
+        <p:nvSpPr>
+          <p:cNvPr id="6" name="Title 5">
+            <a:extLst>
+              <a:ext uri="{FF2B5EF4-FFF2-40B4-BE49-F238E27FC236}">
+                <a16:creationId xmlns:a16="http://schemas.microsoft.com/office/drawing/2014/main" id="{F79D4733-7BA8-4219-A586-933C73B882A9}"/>
+              </a:ext>
+            </a:extLst>
+          </p:cNvPr>
+          <p:cNvSpPr>
+            <a:spLocks noGrp="1"/>
+          </p:cNvSpPr>
+          <p:nvPr>
+            <p:ph type="title"/>
+          </p:nvPr>
+        </p:nvSpPr>
+        <p:spPr/>
+        <p:txBody>
+          <a:bodyPr/>
+          <a:lstStyle/>
+          <a:p>
+            <a:r>
+              <a:rPr lang="en-US" dirty="0"/>
+              <a:t>Conclusion / Questions</a:t>
+            </a:r>
+          </a:p>
+        </p:txBody>
+      </p:sp>
+      <p:sp>
+        <p:nvSpPr>
+          <p:cNvPr id="7" name="Text Placeholder 6">
+            <a:extLst>
+              <a:ext uri="{FF2B5EF4-FFF2-40B4-BE49-F238E27FC236}">
+                <a16:creationId xmlns:a16="http://schemas.microsoft.com/office/drawing/2014/main" id="{08EE7C45-A394-41F2-9920-0C6CF0BDF14C}"/>
+              </a:ext>
+            </a:extLst>
+          </p:cNvPr>
+          <p:cNvSpPr>
+            <a:spLocks noGrp="1"/>
+          </p:cNvSpPr>
+          <p:nvPr>
+            <p:ph type="body" idx="1"/>
+          </p:nvPr>
+        </p:nvSpPr>
+        <p:spPr/>
+        <p:txBody>
+          <a:bodyPr/>
+          <a:lstStyle/>
+          <a:p>
+            <a:r>
+              <a:rPr lang="en-US" dirty="0"/>
+              <a:t>Thank you for your attention. </a:t>
+            </a:r>
+          </a:p>
+        </p:txBody>
+      </p:sp>
+      <p:sp>
+        <p:nvSpPr>
+          <p:cNvPr id="5" name="Slide Number Placeholder 4">
+            <a:extLst>
+              <a:ext uri="{FF2B5EF4-FFF2-40B4-BE49-F238E27FC236}">
+                <a16:creationId xmlns:a16="http://schemas.microsoft.com/office/drawing/2014/main" id="{F42B6BB0-A15D-4284-BCFE-DFE0EFA2F41B}"/>
+              </a:ext>
+            </a:extLst>
+          </p:cNvPr>
+          <p:cNvSpPr>
+            <a:spLocks noGrp="1"/>
+          </p:cNvSpPr>
+          <p:nvPr>
+            <p:ph type="sldNum" sz="quarter" idx="12"/>
+          </p:nvPr>
+        </p:nvSpPr>
+        <p:spPr/>
+        <p:txBody>
+          <a:bodyPr/>
+          <a:lstStyle/>
+          <a:p>
+            <a:fld id="{D57F1E4F-1CFF-5643-939E-217C01CDF565}" type="slidenum">
+              <a:rPr lang="en-US" smtClean="0"/>
+              <a:pPr/>
+              <a:t>17</a:t>
+            </a:fld>
+            <a:endParaRPr lang="en-US" dirty="0"/>
+          </a:p>
+        </p:txBody>
+      </p:sp>
+    </p:spTree>
+    <p:extLst>
+      <p:ext uri="{BB962C8B-B14F-4D97-AF65-F5344CB8AC3E}">
+        <p14:creationId xmlns:p14="http://schemas.microsoft.com/office/powerpoint/2010/main" val="3859610957"/>
       </p:ext>
     </p:extLst>
   </p:cSld>
@@ -16324,6 +17473,603 @@
       </p:grpSpPr>
       <p:sp>
         <p:nvSpPr>
+          <p:cNvPr id="4" name="Title 3">
+            <a:extLst>
+              <a:ext uri="{FF2B5EF4-FFF2-40B4-BE49-F238E27FC236}">
+                <a16:creationId xmlns:a16="http://schemas.microsoft.com/office/drawing/2014/main" id="{7AA92035-0E69-41B0-8C40-E90DDD399133}"/>
+              </a:ext>
+            </a:extLst>
+          </p:cNvPr>
+          <p:cNvSpPr>
+            <a:spLocks noGrp="1"/>
+          </p:cNvSpPr>
+          <p:nvPr>
+            <p:ph type="title"/>
+          </p:nvPr>
+        </p:nvSpPr>
+        <p:spPr/>
+        <p:txBody>
+          <a:bodyPr/>
+          <a:lstStyle/>
+          <a:p>
+            <a:r>
+              <a:rPr lang="en-US" dirty="0"/>
+              <a:t>Identified Contributors to Attrition Rates – Two High Level Categories</a:t>
+            </a:r>
+          </a:p>
+        </p:txBody>
+      </p:sp>
+      <p:sp>
+        <p:nvSpPr>
+          <p:cNvPr id="5" name="Content Placeholder 4">
+            <a:extLst>
+              <a:ext uri="{FF2B5EF4-FFF2-40B4-BE49-F238E27FC236}">
+                <a16:creationId xmlns:a16="http://schemas.microsoft.com/office/drawing/2014/main" id="{57C44A09-8207-4A12-AA79-0AC54635CAF8}"/>
+              </a:ext>
+            </a:extLst>
+          </p:cNvPr>
+          <p:cNvSpPr>
+            <a:spLocks noGrp="1"/>
+          </p:cNvSpPr>
+          <p:nvPr>
+            <p:ph sz="half" idx="1"/>
+          </p:nvPr>
+        </p:nvSpPr>
+        <p:spPr>
+          <a:xfrm>
+            <a:off x="1154954" y="2603500"/>
+            <a:ext cx="4828032" cy="3416301"/>
+          </a:xfrm>
+        </p:spPr>
+        <p:txBody>
+          <a:bodyPr/>
+          <a:lstStyle/>
+          <a:p>
+            <a:pPr marL="0" indent="0" algn="ctr">
+              <a:buNone/>
+            </a:pPr>
+            <a:r>
+              <a:rPr lang="en-US" b="1" u="sng" dirty="0"/>
+              <a:t>Quality of Life Factors</a:t>
+            </a:r>
+          </a:p>
+          <a:p>
+            <a:r>
+              <a:rPr lang="en-US" dirty="0"/>
+              <a:t>Overtime</a:t>
+            </a:r>
+          </a:p>
+          <a:p>
+            <a:r>
+              <a:rPr lang="en-US" dirty="0"/>
+              <a:t>Environment Satisfaction</a:t>
+            </a:r>
+          </a:p>
+          <a:p>
+            <a:r>
+              <a:rPr lang="en-US" dirty="0"/>
+              <a:t>Frequent Business Travel</a:t>
+            </a:r>
+          </a:p>
+          <a:p>
+            <a:r>
+              <a:rPr lang="en-US" dirty="0"/>
+              <a:t>Job Involvement</a:t>
+            </a:r>
+          </a:p>
+          <a:p>
+            <a:r>
+              <a:rPr lang="en-US" dirty="0"/>
+              <a:t>Distance From Home</a:t>
+            </a:r>
+          </a:p>
+          <a:p>
+            <a:r>
+              <a:rPr lang="en-US" dirty="0"/>
+              <a:t>Relationship Satisfaction</a:t>
+            </a:r>
+          </a:p>
+        </p:txBody>
+      </p:sp>
+      <p:sp>
+        <p:nvSpPr>
+          <p:cNvPr id="6" name="Content Placeholder 5">
+            <a:extLst>
+              <a:ext uri="{FF2B5EF4-FFF2-40B4-BE49-F238E27FC236}">
+                <a16:creationId xmlns:a16="http://schemas.microsoft.com/office/drawing/2014/main" id="{57AFFD4E-A2C4-4E82-9C4F-03DCBF9EEDAB}"/>
+              </a:ext>
+            </a:extLst>
+          </p:cNvPr>
+          <p:cNvSpPr>
+            <a:spLocks noGrp="1"/>
+          </p:cNvSpPr>
+          <p:nvPr>
+            <p:ph sz="half" idx="2"/>
+          </p:nvPr>
+        </p:nvSpPr>
+        <p:spPr>
+          <a:xfrm>
+            <a:off x="6208776" y="2603500"/>
+            <a:ext cx="4828032" cy="3416300"/>
+          </a:xfrm>
+        </p:spPr>
+        <p:txBody>
+          <a:bodyPr/>
+          <a:lstStyle/>
+          <a:p>
+            <a:pPr marL="0" indent="0" algn="ctr">
+              <a:buNone/>
+            </a:pPr>
+            <a:r>
+              <a:rPr lang="en-US" b="1" u="sng" dirty="0"/>
+              <a:t>Career Progression Factors</a:t>
+            </a:r>
+          </a:p>
+          <a:p>
+            <a:r>
+              <a:rPr lang="en-US" dirty="0"/>
+              <a:t>Number of companies worked for previously</a:t>
+            </a:r>
+          </a:p>
+          <a:p>
+            <a:r>
+              <a:rPr lang="en-US" dirty="0"/>
+              <a:t>Years since last promotion</a:t>
+            </a:r>
+          </a:p>
+          <a:p>
+            <a:r>
+              <a:rPr lang="en-US" dirty="0"/>
+              <a:t>Years in current role</a:t>
+            </a:r>
+          </a:p>
+          <a:p>
+            <a:r>
+              <a:rPr lang="en-US" dirty="0"/>
+              <a:t>Age</a:t>
+            </a:r>
+          </a:p>
+          <a:p>
+            <a:r>
+              <a:rPr lang="en-US" dirty="0"/>
+              <a:t>Job Role (for specific roles) </a:t>
+            </a:r>
+          </a:p>
+        </p:txBody>
+      </p:sp>
+      <p:sp>
+        <p:nvSpPr>
+          <p:cNvPr id="2" name="Slide Number Placeholder 1">
+            <a:extLst>
+              <a:ext uri="{FF2B5EF4-FFF2-40B4-BE49-F238E27FC236}">
+                <a16:creationId xmlns:a16="http://schemas.microsoft.com/office/drawing/2014/main" id="{0247864A-00D5-4526-B91E-58C24A2160BC}"/>
+              </a:ext>
+            </a:extLst>
+          </p:cNvPr>
+          <p:cNvSpPr>
+            <a:spLocks noGrp="1"/>
+          </p:cNvSpPr>
+          <p:nvPr>
+            <p:ph type="sldNum" sz="quarter" idx="12"/>
+          </p:nvPr>
+        </p:nvSpPr>
+        <p:spPr/>
+        <p:txBody>
+          <a:bodyPr/>
+          <a:lstStyle/>
+          <a:p>
+            <a:fld id="{D57F1E4F-1CFF-5643-939E-217C01CDF565}" type="slidenum">
+              <a:rPr lang="en-US" smtClean="0"/>
+              <a:pPr/>
+              <a:t>7</a:t>
+            </a:fld>
+            <a:endParaRPr lang="en-US" dirty="0"/>
+          </a:p>
+        </p:txBody>
+      </p:sp>
+    </p:spTree>
+    <p:extLst>
+      <p:ext uri="{BB962C8B-B14F-4D97-AF65-F5344CB8AC3E}">
+        <p14:creationId xmlns:p14="http://schemas.microsoft.com/office/powerpoint/2010/main" val="1653147564"/>
+      </p:ext>
+    </p:extLst>
+  </p:cSld>
+  <p:clrMapOvr>
+    <a:masterClrMapping/>
+  </p:clrMapOvr>
+</p:sld>
+</file>
+
+<file path=ppt/slides/slide8.xml><?xml version="1.0" encoding="utf-8"?>
+<p:sld xmlns:a="http://schemas.openxmlformats.org/drawingml/2006/main" xmlns:r="http://schemas.openxmlformats.org/officeDocument/2006/relationships" xmlns:p="http://schemas.openxmlformats.org/presentationml/2006/main">
+  <p:cSld>
+    <p:spTree>
+      <p:nvGrpSpPr>
+        <p:cNvPr id="1" name=""/>
+        <p:cNvGrpSpPr/>
+        <p:nvPr/>
+      </p:nvGrpSpPr>
+      <p:grpSpPr>
+        <a:xfrm>
+          <a:off x="0" y="0"/>
+          <a:ext cx="0" cy="0"/>
+          <a:chOff x="0" y="0"/>
+          <a:chExt cx="0" cy="0"/>
+        </a:xfrm>
+      </p:grpSpPr>
+      <p:sp>
+        <p:nvSpPr>
+          <p:cNvPr id="2" name="Title 1">
+            <a:extLst>
+              <a:ext uri="{FF2B5EF4-FFF2-40B4-BE49-F238E27FC236}">
+                <a16:creationId xmlns:a16="http://schemas.microsoft.com/office/drawing/2014/main" id="{B6E93104-27B8-4610-BF83-7EF41813F691}"/>
+              </a:ext>
+            </a:extLst>
+          </p:cNvPr>
+          <p:cNvSpPr>
+            <a:spLocks noGrp="1"/>
+          </p:cNvSpPr>
+          <p:nvPr>
+            <p:ph type="title"/>
+          </p:nvPr>
+        </p:nvSpPr>
+        <p:spPr/>
+        <p:txBody>
+          <a:bodyPr/>
+          <a:lstStyle/>
+          <a:p>
+            <a:r>
+              <a:rPr lang="en-US" dirty="0"/>
+              <a:t>Job Role Statistics</a:t>
+            </a:r>
+          </a:p>
+        </p:txBody>
+      </p:sp>
+      <p:pic>
+        <p:nvPicPr>
+          <p:cNvPr id="4" name="Picture 3">
+            <a:extLst>
+              <a:ext uri="{FF2B5EF4-FFF2-40B4-BE49-F238E27FC236}">
+                <a16:creationId xmlns:a16="http://schemas.microsoft.com/office/drawing/2014/main" id="{CFDB5073-4B17-4631-AADC-1E2FCA424E3B}"/>
+              </a:ext>
+            </a:extLst>
+          </p:cNvPr>
+          <p:cNvPicPr>
+            <a:picLocks noChangeAspect="1"/>
+          </p:cNvPicPr>
+          <p:nvPr/>
+        </p:nvPicPr>
+        <p:blipFill>
+          <a:blip r:embed="rId2"/>
+          <a:stretch>
+            <a:fillRect/>
+          </a:stretch>
+        </p:blipFill>
+        <p:spPr>
+          <a:xfrm>
+            <a:off x="257175" y="2490787"/>
+            <a:ext cx="11677650" cy="4010025"/>
+          </a:xfrm>
+          <a:prstGeom prst="rect">
+            <a:avLst/>
+          </a:prstGeom>
+        </p:spPr>
+      </p:pic>
+      <p:sp>
+        <p:nvSpPr>
+          <p:cNvPr id="5" name="Rectangle 4">
+            <a:extLst>
+              <a:ext uri="{FF2B5EF4-FFF2-40B4-BE49-F238E27FC236}">
+                <a16:creationId xmlns:a16="http://schemas.microsoft.com/office/drawing/2014/main" id="{656CFFEB-A71D-48D7-A354-82FBB68FBA15}"/>
+              </a:ext>
+            </a:extLst>
+          </p:cNvPr>
+          <p:cNvSpPr/>
+          <p:nvPr/>
+        </p:nvSpPr>
+        <p:spPr>
+          <a:xfrm>
+            <a:off x="7874000" y="2819400"/>
+            <a:ext cx="431800" cy="228600"/>
+          </a:xfrm>
+          <a:prstGeom prst="rect">
+            <a:avLst/>
+          </a:prstGeom>
+          <a:solidFill>
+            <a:srgbClr val="FF0000">
+              <a:alpha val="43922"/>
+            </a:srgbClr>
+          </a:solidFill>
+          <a:ln>
+            <a:noFill/>
+          </a:ln>
+        </p:spPr>
+        <p:style>
+          <a:lnRef idx="2">
+            <a:schemeClr val="accent1">
+              <a:shade val="50000"/>
+            </a:schemeClr>
+          </a:lnRef>
+          <a:fillRef idx="1">
+            <a:schemeClr val="accent1"/>
+          </a:fillRef>
+          <a:effectRef idx="0">
+            <a:schemeClr val="accent1"/>
+          </a:effectRef>
+          <a:fontRef idx="minor">
+            <a:schemeClr val="lt1"/>
+          </a:fontRef>
+        </p:style>
+        <p:txBody>
+          <a:bodyPr rtlCol="0" anchor="ctr"/>
+          <a:lstStyle/>
+          <a:p>
+            <a:pPr algn="ctr"/>
+            <a:endParaRPr lang="en-US"/>
+          </a:p>
+        </p:txBody>
+      </p:sp>
+      <p:sp>
+        <p:nvSpPr>
+          <p:cNvPr id="6" name="Rectangle 5">
+            <a:extLst>
+              <a:ext uri="{FF2B5EF4-FFF2-40B4-BE49-F238E27FC236}">
+                <a16:creationId xmlns:a16="http://schemas.microsoft.com/office/drawing/2014/main" id="{D8D493B8-FB59-499E-AE3A-F93D6F18DCE4}"/>
+              </a:ext>
+            </a:extLst>
+          </p:cNvPr>
+          <p:cNvSpPr/>
+          <p:nvPr/>
+        </p:nvSpPr>
+        <p:spPr>
+          <a:xfrm>
+            <a:off x="7874000" y="3835401"/>
+            <a:ext cx="431800" cy="228600"/>
+          </a:xfrm>
+          <a:prstGeom prst="rect">
+            <a:avLst/>
+          </a:prstGeom>
+          <a:solidFill>
+            <a:srgbClr val="FF0000">
+              <a:alpha val="43922"/>
+            </a:srgbClr>
+          </a:solidFill>
+          <a:ln>
+            <a:noFill/>
+          </a:ln>
+        </p:spPr>
+        <p:style>
+          <a:lnRef idx="2">
+            <a:schemeClr val="accent1">
+              <a:shade val="50000"/>
+            </a:schemeClr>
+          </a:lnRef>
+          <a:fillRef idx="1">
+            <a:schemeClr val="accent1"/>
+          </a:fillRef>
+          <a:effectRef idx="0">
+            <a:schemeClr val="accent1"/>
+          </a:effectRef>
+          <a:fontRef idx="minor">
+            <a:schemeClr val="lt1"/>
+          </a:fontRef>
+        </p:style>
+        <p:txBody>
+          <a:bodyPr rtlCol="0" anchor="ctr"/>
+          <a:lstStyle/>
+          <a:p>
+            <a:pPr algn="ctr"/>
+            <a:endParaRPr lang="en-US"/>
+          </a:p>
+        </p:txBody>
+      </p:sp>
+      <p:sp>
+        <p:nvSpPr>
+          <p:cNvPr id="7" name="Rectangle 6">
+            <a:extLst>
+              <a:ext uri="{FF2B5EF4-FFF2-40B4-BE49-F238E27FC236}">
+                <a16:creationId xmlns:a16="http://schemas.microsoft.com/office/drawing/2014/main" id="{D1A006B6-AD9E-4310-BD2F-B6B98E2AA9EF}"/>
+              </a:ext>
+            </a:extLst>
+          </p:cNvPr>
+          <p:cNvSpPr/>
+          <p:nvPr/>
+        </p:nvSpPr>
+        <p:spPr>
+          <a:xfrm>
+            <a:off x="7874000" y="6184901"/>
+            <a:ext cx="431800" cy="228600"/>
+          </a:xfrm>
+          <a:prstGeom prst="rect">
+            <a:avLst/>
+          </a:prstGeom>
+          <a:solidFill>
+            <a:srgbClr val="FF0000">
+              <a:alpha val="43922"/>
+            </a:srgbClr>
+          </a:solidFill>
+          <a:ln>
+            <a:noFill/>
+          </a:ln>
+        </p:spPr>
+        <p:style>
+          <a:lnRef idx="2">
+            <a:schemeClr val="accent1">
+              <a:shade val="50000"/>
+            </a:schemeClr>
+          </a:lnRef>
+          <a:fillRef idx="1">
+            <a:schemeClr val="accent1"/>
+          </a:fillRef>
+          <a:effectRef idx="0">
+            <a:schemeClr val="accent1"/>
+          </a:effectRef>
+          <a:fontRef idx="minor">
+            <a:schemeClr val="lt1"/>
+          </a:fontRef>
+        </p:style>
+        <p:txBody>
+          <a:bodyPr rtlCol="0" anchor="ctr"/>
+          <a:lstStyle/>
+          <a:p>
+            <a:pPr algn="ctr"/>
+            <a:endParaRPr lang="en-US"/>
+          </a:p>
+        </p:txBody>
+      </p:sp>
+      <p:sp>
+        <p:nvSpPr>
+          <p:cNvPr id="8" name="Rectangle 7">
+            <a:extLst>
+              <a:ext uri="{FF2B5EF4-FFF2-40B4-BE49-F238E27FC236}">
+                <a16:creationId xmlns:a16="http://schemas.microsoft.com/office/drawing/2014/main" id="{74EAB7EE-8E27-40FA-82F4-2C9D7347DBE3}"/>
+              </a:ext>
+            </a:extLst>
+          </p:cNvPr>
+          <p:cNvSpPr/>
+          <p:nvPr/>
+        </p:nvSpPr>
+        <p:spPr>
+          <a:xfrm>
+            <a:off x="2247900" y="6500812"/>
+            <a:ext cx="431800" cy="228600"/>
+          </a:xfrm>
+          <a:prstGeom prst="rect">
+            <a:avLst/>
+          </a:prstGeom>
+          <a:solidFill>
+            <a:srgbClr val="FF0000">
+              <a:alpha val="43922"/>
+            </a:srgbClr>
+          </a:solidFill>
+          <a:ln>
+            <a:solidFill>
+              <a:schemeClr val="tx1"/>
+            </a:solidFill>
+          </a:ln>
+        </p:spPr>
+        <p:style>
+          <a:lnRef idx="2">
+            <a:schemeClr val="accent1">
+              <a:shade val="50000"/>
+            </a:schemeClr>
+          </a:lnRef>
+          <a:fillRef idx="1">
+            <a:schemeClr val="accent1"/>
+          </a:fillRef>
+          <a:effectRef idx="0">
+            <a:schemeClr val="accent1"/>
+          </a:effectRef>
+          <a:fontRef idx="minor">
+            <a:schemeClr val="lt1"/>
+          </a:fontRef>
+        </p:style>
+        <p:txBody>
+          <a:bodyPr rtlCol="0" anchor="ctr"/>
+          <a:lstStyle/>
+          <a:p>
+            <a:pPr algn="ctr"/>
+            <a:endParaRPr lang="en-US"/>
+          </a:p>
+        </p:txBody>
+      </p:sp>
+      <p:sp>
+        <p:nvSpPr>
+          <p:cNvPr id="9" name="TextBox 8">
+            <a:extLst>
+              <a:ext uri="{FF2B5EF4-FFF2-40B4-BE49-F238E27FC236}">
+                <a16:creationId xmlns:a16="http://schemas.microsoft.com/office/drawing/2014/main" id="{EF9E5EEA-1A80-48F1-96E0-1AAEB70BB852}"/>
+              </a:ext>
+            </a:extLst>
+          </p:cNvPr>
+          <p:cNvSpPr txBox="1"/>
+          <p:nvPr/>
+        </p:nvSpPr>
+        <p:spPr>
+          <a:xfrm>
+            <a:off x="2679700" y="6430446"/>
+            <a:ext cx="6944530" cy="369332"/>
+          </a:xfrm>
+          <a:prstGeom prst="rect">
+            <a:avLst/>
+          </a:prstGeom>
+          <a:noFill/>
+        </p:spPr>
+        <p:txBody>
+          <a:bodyPr wrap="none" rtlCol="0">
+            <a:spAutoFit/>
+          </a:bodyPr>
+          <a:lstStyle/>
+          <a:p>
+            <a:r>
+              <a:rPr lang="en-US" b="1" dirty="0"/>
+              <a:t>Red highlight indicates job roles where attrition exceeds 20%</a:t>
+            </a:r>
+          </a:p>
+        </p:txBody>
+      </p:sp>
+      <p:sp>
+        <p:nvSpPr>
+          <p:cNvPr id="3" name="Slide Number Placeholder 2">
+            <a:extLst>
+              <a:ext uri="{FF2B5EF4-FFF2-40B4-BE49-F238E27FC236}">
+                <a16:creationId xmlns:a16="http://schemas.microsoft.com/office/drawing/2014/main" id="{F6F91D69-1CA8-42C2-BB20-14CBD07D9F98}"/>
+              </a:ext>
+            </a:extLst>
+          </p:cNvPr>
+          <p:cNvSpPr>
+            <a:spLocks noGrp="1"/>
+          </p:cNvSpPr>
+          <p:nvPr>
+            <p:ph type="sldNum" sz="quarter" idx="12"/>
+          </p:nvPr>
+        </p:nvSpPr>
+        <p:spPr/>
+        <p:txBody>
+          <a:bodyPr/>
+          <a:lstStyle/>
+          <a:p>
+            <a:fld id="{D57F1E4F-1CFF-5643-939E-217C01CDF565}" type="slidenum">
+              <a:rPr lang="en-US" smtClean="0"/>
+              <a:pPr/>
+              <a:t>8</a:t>
+            </a:fld>
+            <a:endParaRPr lang="en-US" dirty="0"/>
+          </a:p>
+        </p:txBody>
+      </p:sp>
+    </p:spTree>
+    <p:extLst>
+      <p:ext uri="{BB962C8B-B14F-4D97-AF65-F5344CB8AC3E}">
+        <p14:creationId xmlns:p14="http://schemas.microsoft.com/office/powerpoint/2010/main" val="891628228"/>
+      </p:ext>
+    </p:extLst>
+  </p:cSld>
+  <p:clrMapOvr>
+    <a:masterClrMapping/>
+  </p:clrMapOvr>
+</p:sld>
+</file>
+
+<file path=ppt/slides/slide9.xml><?xml version="1.0" encoding="utf-8"?>
+<p:sld xmlns:a="http://schemas.openxmlformats.org/drawingml/2006/main" xmlns:r="http://schemas.openxmlformats.org/officeDocument/2006/relationships" xmlns:p="http://schemas.openxmlformats.org/presentationml/2006/main">
+  <p:cSld>
+    <p:spTree>
+      <p:nvGrpSpPr>
+        <p:cNvPr id="1" name=""/>
+        <p:cNvGrpSpPr/>
+        <p:nvPr/>
+      </p:nvGrpSpPr>
+      <p:grpSpPr>
+        <a:xfrm>
+          <a:off x="0" y="0"/>
+          <a:ext cx="0" cy="0"/>
+          <a:chOff x="0" y="0"/>
+          <a:chExt cx="0" cy="0"/>
+        </a:xfrm>
+      </p:grpSpPr>
+      <p:sp>
+        <p:nvSpPr>
           <p:cNvPr id="2" name="Title 1">
             <a:extLst>
               <a:ext uri="{FF2B5EF4-FFF2-40B4-BE49-F238E27FC236}">
@@ -16791,7 +18537,7 @@
             <a:fld id="{D57F1E4F-1CFF-5643-939E-217C01CDF565}" type="slidenum">
               <a:rPr lang="en-US" smtClean="0"/>
               <a:pPr/>
-              <a:t>7</a:t>
+              <a:t>9</a:t>
             </a:fld>
             <a:endParaRPr lang="en-US" dirty="0"/>
           </a:p>
@@ -16801,603 +18547,6 @@
     <p:extLst>
       <p:ext uri="{BB962C8B-B14F-4D97-AF65-F5344CB8AC3E}">
         <p14:creationId xmlns:p14="http://schemas.microsoft.com/office/powerpoint/2010/main" val="1307872378"/>
-      </p:ext>
-    </p:extLst>
-  </p:cSld>
-  <p:clrMapOvr>
-    <a:masterClrMapping/>
-  </p:clrMapOvr>
-</p:sld>
-</file>
-
-<file path=ppt/slides/slide8.xml><?xml version="1.0" encoding="utf-8"?>
-<p:sld xmlns:a="http://schemas.openxmlformats.org/drawingml/2006/main" xmlns:r="http://schemas.openxmlformats.org/officeDocument/2006/relationships" xmlns:p="http://schemas.openxmlformats.org/presentationml/2006/main">
-  <p:cSld>
-    <p:spTree>
-      <p:nvGrpSpPr>
-        <p:cNvPr id="1" name=""/>
-        <p:cNvGrpSpPr/>
-        <p:nvPr/>
-      </p:nvGrpSpPr>
-      <p:grpSpPr>
-        <a:xfrm>
-          <a:off x="0" y="0"/>
-          <a:ext cx="0" cy="0"/>
-          <a:chOff x="0" y="0"/>
-          <a:chExt cx="0" cy="0"/>
-        </a:xfrm>
-      </p:grpSpPr>
-      <p:sp>
-        <p:nvSpPr>
-          <p:cNvPr id="2" name="Title 1">
-            <a:extLst>
-              <a:ext uri="{FF2B5EF4-FFF2-40B4-BE49-F238E27FC236}">
-                <a16:creationId xmlns:a16="http://schemas.microsoft.com/office/drawing/2014/main" id="{B6E93104-27B8-4610-BF83-7EF41813F691}"/>
-              </a:ext>
-            </a:extLst>
-          </p:cNvPr>
-          <p:cNvSpPr>
-            <a:spLocks noGrp="1"/>
-          </p:cNvSpPr>
-          <p:nvPr>
-            <p:ph type="title"/>
-          </p:nvPr>
-        </p:nvSpPr>
-        <p:spPr/>
-        <p:txBody>
-          <a:bodyPr/>
-          <a:lstStyle/>
-          <a:p>
-            <a:r>
-              <a:rPr lang="en-US" dirty="0"/>
-              <a:t>Job Role Statistics</a:t>
-            </a:r>
-          </a:p>
-        </p:txBody>
-      </p:sp>
-      <p:pic>
-        <p:nvPicPr>
-          <p:cNvPr id="4" name="Picture 3">
-            <a:extLst>
-              <a:ext uri="{FF2B5EF4-FFF2-40B4-BE49-F238E27FC236}">
-                <a16:creationId xmlns:a16="http://schemas.microsoft.com/office/drawing/2014/main" id="{CFDB5073-4B17-4631-AADC-1E2FCA424E3B}"/>
-              </a:ext>
-            </a:extLst>
-          </p:cNvPr>
-          <p:cNvPicPr>
-            <a:picLocks noChangeAspect="1"/>
-          </p:cNvPicPr>
-          <p:nvPr/>
-        </p:nvPicPr>
-        <p:blipFill>
-          <a:blip r:embed="rId2"/>
-          <a:stretch>
-            <a:fillRect/>
-          </a:stretch>
-        </p:blipFill>
-        <p:spPr>
-          <a:xfrm>
-            <a:off x="257175" y="2490787"/>
-            <a:ext cx="11677650" cy="4010025"/>
-          </a:xfrm>
-          <a:prstGeom prst="rect">
-            <a:avLst/>
-          </a:prstGeom>
-        </p:spPr>
-      </p:pic>
-      <p:sp>
-        <p:nvSpPr>
-          <p:cNvPr id="5" name="Rectangle 4">
-            <a:extLst>
-              <a:ext uri="{FF2B5EF4-FFF2-40B4-BE49-F238E27FC236}">
-                <a16:creationId xmlns:a16="http://schemas.microsoft.com/office/drawing/2014/main" id="{656CFFEB-A71D-48D7-A354-82FBB68FBA15}"/>
-              </a:ext>
-            </a:extLst>
-          </p:cNvPr>
-          <p:cNvSpPr/>
-          <p:nvPr/>
-        </p:nvSpPr>
-        <p:spPr>
-          <a:xfrm>
-            <a:off x="7874000" y="2819400"/>
-            <a:ext cx="431800" cy="228600"/>
-          </a:xfrm>
-          <a:prstGeom prst="rect">
-            <a:avLst/>
-          </a:prstGeom>
-          <a:solidFill>
-            <a:srgbClr val="FF0000">
-              <a:alpha val="43922"/>
-            </a:srgbClr>
-          </a:solidFill>
-          <a:ln>
-            <a:noFill/>
-          </a:ln>
-        </p:spPr>
-        <p:style>
-          <a:lnRef idx="2">
-            <a:schemeClr val="accent1">
-              <a:shade val="50000"/>
-            </a:schemeClr>
-          </a:lnRef>
-          <a:fillRef idx="1">
-            <a:schemeClr val="accent1"/>
-          </a:fillRef>
-          <a:effectRef idx="0">
-            <a:schemeClr val="accent1"/>
-          </a:effectRef>
-          <a:fontRef idx="minor">
-            <a:schemeClr val="lt1"/>
-          </a:fontRef>
-        </p:style>
-        <p:txBody>
-          <a:bodyPr rtlCol="0" anchor="ctr"/>
-          <a:lstStyle/>
-          <a:p>
-            <a:pPr algn="ctr"/>
-            <a:endParaRPr lang="en-US"/>
-          </a:p>
-        </p:txBody>
-      </p:sp>
-      <p:sp>
-        <p:nvSpPr>
-          <p:cNvPr id="6" name="Rectangle 5">
-            <a:extLst>
-              <a:ext uri="{FF2B5EF4-FFF2-40B4-BE49-F238E27FC236}">
-                <a16:creationId xmlns:a16="http://schemas.microsoft.com/office/drawing/2014/main" id="{D8D493B8-FB59-499E-AE3A-F93D6F18DCE4}"/>
-              </a:ext>
-            </a:extLst>
-          </p:cNvPr>
-          <p:cNvSpPr/>
-          <p:nvPr/>
-        </p:nvSpPr>
-        <p:spPr>
-          <a:xfrm>
-            <a:off x="7874000" y="3835401"/>
-            <a:ext cx="431800" cy="228600"/>
-          </a:xfrm>
-          <a:prstGeom prst="rect">
-            <a:avLst/>
-          </a:prstGeom>
-          <a:solidFill>
-            <a:srgbClr val="FF0000">
-              <a:alpha val="43922"/>
-            </a:srgbClr>
-          </a:solidFill>
-          <a:ln>
-            <a:noFill/>
-          </a:ln>
-        </p:spPr>
-        <p:style>
-          <a:lnRef idx="2">
-            <a:schemeClr val="accent1">
-              <a:shade val="50000"/>
-            </a:schemeClr>
-          </a:lnRef>
-          <a:fillRef idx="1">
-            <a:schemeClr val="accent1"/>
-          </a:fillRef>
-          <a:effectRef idx="0">
-            <a:schemeClr val="accent1"/>
-          </a:effectRef>
-          <a:fontRef idx="minor">
-            <a:schemeClr val="lt1"/>
-          </a:fontRef>
-        </p:style>
-        <p:txBody>
-          <a:bodyPr rtlCol="0" anchor="ctr"/>
-          <a:lstStyle/>
-          <a:p>
-            <a:pPr algn="ctr"/>
-            <a:endParaRPr lang="en-US"/>
-          </a:p>
-        </p:txBody>
-      </p:sp>
-      <p:sp>
-        <p:nvSpPr>
-          <p:cNvPr id="7" name="Rectangle 6">
-            <a:extLst>
-              <a:ext uri="{FF2B5EF4-FFF2-40B4-BE49-F238E27FC236}">
-                <a16:creationId xmlns:a16="http://schemas.microsoft.com/office/drawing/2014/main" id="{D1A006B6-AD9E-4310-BD2F-B6B98E2AA9EF}"/>
-              </a:ext>
-            </a:extLst>
-          </p:cNvPr>
-          <p:cNvSpPr/>
-          <p:nvPr/>
-        </p:nvSpPr>
-        <p:spPr>
-          <a:xfrm>
-            <a:off x="7874000" y="6184901"/>
-            <a:ext cx="431800" cy="228600"/>
-          </a:xfrm>
-          <a:prstGeom prst="rect">
-            <a:avLst/>
-          </a:prstGeom>
-          <a:solidFill>
-            <a:srgbClr val="FF0000">
-              <a:alpha val="43922"/>
-            </a:srgbClr>
-          </a:solidFill>
-          <a:ln>
-            <a:noFill/>
-          </a:ln>
-        </p:spPr>
-        <p:style>
-          <a:lnRef idx="2">
-            <a:schemeClr val="accent1">
-              <a:shade val="50000"/>
-            </a:schemeClr>
-          </a:lnRef>
-          <a:fillRef idx="1">
-            <a:schemeClr val="accent1"/>
-          </a:fillRef>
-          <a:effectRef idx="0">
-            <a:schemeClr val="accent1"/>
-          </a:effectRef>
-          <a:fontRef idx="minor">
-            <a:schemeClr val="lt1"/>
-          </a:fontRef>
-        </p:style>
-        <p:txBody>
-          <a:bodyPr rtlCol="0" anchor="ctr"/>
-          <a:lstStyle/>
-          <a:p>
-            <a:pPr algn="ctr"/>
-            <a:endParaRPr lang="en-US"/>
-          </a:p>
-        </p:txBody>
-      </p:sp>
-      <p:sp>
-        <p:nvSpPr>
-          <p:cNvPr id="8" name="Rectangle 7">
-            <a:extLst>
-              <a:ext uri="{FF2B5EF4-FFF2-40B4-BE49-F238E27FC236}">
-                <a16:creationId xmlns:a16="http://schemas.microsoft.com/office/drawing/2014/main" id="{74EAB7EE-8E27-40FA-82F4-2C9D7347DBE3}"/>
-              </a:ext>
-            </a:extLst>
-          </p:cNvPr>
-          <p:cNvSpPr/>
-          <p:nvPr/>
-        </p:nvSpPr>
-        <p:spPr>
-          <a:xfrm>
-            <a:off x="2247900" y="6500812"/>
-            <a:ext cx="431800" cy="228600"/>
-          </a:xfrm>
-          <a:prstGeom prst="rect">
-            <a:avLst/>
-          </a:prstGeom>
-          <a:solidFill>
-            <a:srgbClr val="FF0000">
-              <a:alpha val="43922"/>
-            </a:srgbClr>
-          </a:solidFill>
-          <a:ln>
-            <a:solidFill>
-              <a:schemeClr val="tx1"/>
-            </a:solidFill>
-          </a:ln>
-        </p:spPr>
-        <p:style>
-          <a:lnRef idx="2">
-            <a:schemeClr val="accent1">
-              <a:shade val="50000"/>
-            </a:schemeClr>
-          </a:lnRef>
-          <a:fillRef idx="1">
-            <a:schemeClr val="accent1"/>
-          </a:fillRef>
-          <a:effectRef idx="0">
-            <a:schemeClr val="accent1"/>
-          </a:effectRef>
-          <a:fontRef idx="minor">
-            <a:schemeClr val="lt1"/>
-          </a:fontRef>
-        </p:style>
-        <p:txBody>
-          <a:bodyPr rtlCol="0" anchor="ctr"/>
-          <a:lstStyle/>
-          <a:p>
-            <a:pPr algn="ctr"/>
-            <a:endParaRPr lang="en-US"/>
-          </a:p>
-        </p:txBody>
-      </p:sp>
-      <p:sp>
-        <p:nvSpPr>
-          <p:cNvPr id="9" name="TextBox 8">
-            <a:extLst>
-              <a:ext uri="{FF2B5EF4-FFF2-40B4-BE49-F238E27FC236}">
-                <a16:creationId xmlns:a16="http://schemas.microsoft.com/office/drawing/2014/main" id="{EF9E5EEA-1A80-48F1-96E0-1AAEB70BB852}"/>
-              </a:ext>
-            </a:extLst>
-          </p:cNvPr>
-          <p:cNvSpPr txBox="1"/>
-          <p:nvPr/>
-        </p:nvSpPr>
-        <p:spPr>
-          <a:xfrm>
-            <a:off x="2679700" y="6430446"/>
-            <a:ext cx="6944530" cy="369332"/>
-          </a:xfrm>
-          <a:prstGeom prst="rect">
-            <a:avLst/>
-          </a:prstGeom>
-          <a:noFill/>
-        </p:spPr>
-        <p:txBody>
-          <a:bodyPr wrap="none" rtlCol="0">
-            <a:spAutoFit/>
-          </a:bodyPr>
-          <a:lstStyle/>
-          <a:p>
-            <a:r>
-              <a:rPr lang="en-US" b="1" dirty="0"/>
-              <a:t>Red highlight indicates job roles where attrition exceeds 20%</a:t>
-            </a:r>
-          </a:p>
-        </p:txBody>
-      </p:sp>
-      <p:sp>
-        <p:nvSpPr>
-          <p:cNvPr id="3" name="Slide Number Placeholder 2">
-            <a:extLst>
-              <a:ext uri="{FF2B5EF4-FFF2-40B4-BE49-F238E27FC236}">
-                <a16:creationId xmlns:a16="http://schemas.microsoft.com/office/drawing/2014/main" id="{F6F91D69-1CA8-42C2-BB20-14CBD07D9F98}"/>
-              </a:ext>
-            </a:extLst>
-          </p:cNvPr>
-          <p:cNvSpPr>
-            <a:spLocks noGrp="1"/>
-          </p:cNvSpPr>
-          <p:nvPr>
-            <p:ph type="sldNum" sz="quarter" idx="12"/>
-          </p:nvPr>
-        </p:nvSpPr>
-        <p:spPr/>
-        <p:txBody>
-          <a:bodyPr/>
-          <a:lstStyle/>
-          <a:p>
-            <a:fld id="{D57F1E4F-1CFF-5643-939E-217C01CDF565}" type="slidenum">
-              <a:rPr lang="en-US" smtClean="0"/>
-              <a:pPr/>
-              <a:t>8</a:t>
-            </a:fld>
-            <a:endParaRPr lang="en-US" dirty="0"/>
-          </a:p>
-        </p:txBody>
-      </p:sp>
-    </p:spTree>
-    <p:extLst>
-      <p:ext uri="{BB962C8B-B14F-4D97-AF65-F5344CB8AC3E}">
-        <p14:creationId xmlns:p14="http://schemas.microsoft.com/office/powerpoint/2010/main" val="891628228"/>
-      </p:ext>
-    </p:extLst>
-  </p:cSld>
-  <p:clrMapOvr>
-    <a:masterClrMapping/>
-  </p:clrMapOvr>
-</p:sld>
-</file>
-
-<file path=ppt/slides/slide9.xml><?xml version="1.0" encoding="utf-8"?>
-<p:sld xmlns:a="http://schemas.openxmlformats.org/drawingml/2006/main" xmlns:r="http://schemas.openxmlformats.org/officeDocument/2006/relationships" xmlns:p="http://schemas.openxmlformats.org/presentationml/2006/main">
-  <p:cSld>
-    <p:spTree>
-      <p:nvGrpSpPr>
-        <p:cNvPr id="1" name=""/>
-        <p:cNvGrpSpPr/>
-        <p:nvPr/>
-      </p:nvGrpSpPr>
-      <p:grpSpPr>
-        <a:xfrm>
-          <a:off x="0" y="0"/>
-          <a:ext cx="0" cy="0"/>
-          <a:chOff x="0" y="0"/>
-          <a:chExt cx="0" cy="0"/>
-        </a:xfrm>
-      </p:grpSpPr>
-      <p:sp>
-        <p:nvSpPr>
-          <p:cNvPr id="4" name="Title 3">
-            <a:extLst>
-              <a:ext uri="{FF2B5EF4-FFF2-40B4-BE49-F238E27FC236}">
-                <a16:creationId xmlns:a16="http://schemas.microsoft.com/office/drawing/2014/main" id="{7AA92035-0E69-41B0-8C40-E90DDD399133}"/>
-              </a:ext>
-            </a:extLst>
-          </p:cNvPr>
-          <p:cNvSpPr>
-            <a:spLocks noGrp="1"/>
-          </p:cNvSpPr>
-          <p:nvPr>
-            <p:ph type="title"/>
-          </p:nvPr>
-        </p:nvSpPr>
-        <p:spPr/>
-        <p:txBody>
-          <a:bodyPr/>
-          <a:lstStyle/>
-          <a:p>
-            <a:r>
-              <a:rPr lang="en-US" dirty="0"/>
-              <a:t>Identified Contributors to Attrition Rates – Two High Level Categories</a:t>
-            </a:r>
-          </a:p>
-        </p:txBody>
-      </p:sp>
-      <p:sp>
-        <p:nvSpPr>
-          <p:cNvPr id="5" name="Content Placeholder 4">
-            <a:extLst>
-              <a:ext uri="{FF2B5EF4-FFF2-40B4-BE49-F238E27FC236}">
-                <a16:creationId xmlns:a16="http://schemas.microsoft.com/office/drawing/2014/main" id="{57C44A09-8207-4A12-AA79-0AC54635CAF8}"/>
-              </a:ext>
-            </a:extLst>
-          </p:cNvPr>
-          <p:cNvSpPr>
-            <a:spLocks noGrp="1"/>
-          </p:cNvSpPr>
-          <p:nvPr>
-            <p:ph sz="half" idx="1"/>
-          </p:nvPr>
-        </p:nvSpPr>
-        <p:spPr>
-          <a:xfrm>
-            <a:off x="1154954" y="2603500"/>
-            <a:ext cx="4828032" cy="3416301"/>
-          </a:xfrm>
-        </p:spPr>
-        <p:txBody>
-          <a:bodyPr/>
-          <a:lstStyle/>
-          <a:p>
-            <a:pPr marL="0" indent="0" algn="ctr">
-              <a:buNone/>
-            </a:pPr>
-            <a:r>
-              <a:rPr lang="en-US" b="1" u="sng" dirty="0"/>
-              <a:t>Quality of Life Factors</a:t>
-            </a:r>
-          </a:p>
-          <a:p>
-            <a:r>
-              <a:rPr lang="en-US" dirty="0"/>
-              <a:t>Overtime</a:t>
-            </a:r>
-          </a:p>
-          <a:p>
-            <a:r>
-              <a:rPr lang="en-US" dirty="0"/>
-              <a:t>Environment Satisfaction</a:t>
-            </a:r>
-          </a:p>
-          <a:p>
-            <a:r>
-              <a:rPr lang="en-US" dirty="0"/>
-              <a:t>Frequent Business Travel</a:t>
-            </a:r>
-          </a:p>
-          <a:p>
-            <a:r>
-              <a:rPr lang="en-US" dirty="0"/>
-              <a:t>Job Involvement</a:t>
-            </a:r>
-          </a:p>
-          <a:p>
-            <a:r>
-              <a:rPr lang="en-US" dirty="0"/>
-              <a:t>Distance From Home</a:t>
-            </a:r>
-          </a:p>
-          <a:p>
-            <a:r>
-              <a:rPr lang="en-US" dirty="0"/>
-              <a:t>Relationship Satisfaction</a:t>
-            </a:r>
-          </a:p>
-        </p:txBody>
-      </p:sp>
-      <p:sp>
-        <p:nvSpPr>
-          <p:cNvPr id="6" name="Content Placeholder 5">
-            <a:extLst>
-              <a:ext uri="{FF2B5EF4-FFF2-40B4-BE49-F238E27FC236}">
-                <a16:creationId xmlns:a16="http://schemas.microsoft.com/office/drawing/2014/main" id="{57AFFD4E-A2C4-4E82-9C4F-03DCBF9EEDAB}"/>
-              </a:ext>
-            </a:extLst>
-          </p:cNvPr>
-          <p:cNvSpPr>
-            <a:spLocks noGrp="1"/>
-          </p:cNvSpPr>
-          <p:nvPr>
-            <p:ph sz="half" idx="2"/>
-          </p:nvPr>
-        </p:nvSpPr>
-        <p:spPr>
-          <a:xfrm>
-            <a:off x="6208776" y="2603500"/>
-            <a:ext cx="4828032" cy="3416300"/>
-          </a:xfrm>
-        </p:spPr>
-        <p:txBody>
-          <a:bodyPr/>
-          <a:lstStyle/>
-          <a:p>
-            <a:pPr marL="0" indent="0" algn="ctr">
-              <a:buNone/>
-            </a:pPr>
-            <a:r>
-              <a:rPr lang="en-US" b="1" u="sng" dirty="0"/>
-              <a:t>Career Progression Factors</a:t>
-            </a:r>
-          </a:p>
-          <a:p>
-            <a:r>
-              <a:rPr lang="en-US" dirty="0"/>
-              <a:t>Number of companies worked for previously</a:t>
-            </a:r>
-          </a:p>
-          <a:p>
-            <a:r>
-              <a:rPr lang="en-US" dirty="0"/>
-              <a:t>Years since last promotion</a:t>
-            </a:r>
-          </a:p>
-          <a:p>
-            <a:r>
-              <a:rPr lang="en-US" dirty="0"/>
-              <a:t>Years in current role</a:t>
-            </a:r>
-          </a:p>
-          <a:p>
-            <a:r>
-              <a:rPr lang="en-US" dirty="0"/>
-              <a:t>Age</a:t>
-            </a:r>
-          </a:p>
-          <a:p>
-            <a:r>
-              <a:rPr lang="en-US" dirty="0"/>
-              <a:t>Job Role (for specific roles) </a:t>
-            </a:r>
-          </a:p>
-        </p:txBody>
-      </p:sp>
-      <p:sp>
-        <p:nvSpPr>
-          <p:cNvPr id="2" name="Slide Number Placeholder 1">
-            <a:extLst>
-              <a:ext uri="{FF2B5EF4-FFF2-40B4-BE49-F238E27FC236}">
-                <a16:creationId xmlns:a16="http://schemas.microsoft.com/office/drawing/2014/main" id="{0247864A-00D5-4526-B91E-58C24A2160BC}"/>
-              </a:ext>
-            </a:extLst>
-          </p:cNvPr>
-          <p:cNvSpPr>
-            <a:spLocks noGrp="1"/>
-          </p:cNvSpPr>
-          <p:nvPr>
-            <p:ph type="sldNum" sz="quarter" idx="12"/>
-          </p:nvPr>
-        </p:nvSpPr>
-        <p:spPr/>
-        <p:txBody>
-          <a:bodyPr/>
-          <a:lstStyle/>
-          <a:p>
-            <a:fld id="{D57F1E4F-1CFF-5643-939E-217C01CDF565}" type="slidenum">
-              <a:rPr lang="en-US" smtClean="0"/>
-              <a:pPr/>
-              <a:t>9</a:t>
-            </a:fld>
-            <a:endParaRPr lang="en-US" dirty="0"/>
-          </a:p>
-        </p:txBody>
-      </p:sp>
-    </p:spTree>
-    <p:extLst>
-      <p:ext uri="{BB962C8B-B14F-4D97-AF65-F5344CB8AC3E}">
-        <p14:creationId xmlns:p14="http://schemas.microsoft.com/office/powerpoint/2010/main" val="1653147564"/>
       </p:ext>
     </p:extLst>
   </p:cSld>

</xml_diff>

<commit_message>
Updated draft presentatin stats slides... Sorry Brian if this destroys it all
</commit_message>
<xml_diff>
--- a/DraftPresentation.pptx
+++ b/DraftPresentation.pptx
@@ -133,7 +133,7 @@
 <file path=ppt/revisionInfo.xml><?xml version="1.0" encoding="utf-8"?>
 <p1510:revInfo xmlns:a="http://schemas.openxmlformats.org/drawingml/2006/main" xmlns:r="http://schemas.openxmlformats.org/officeDocument/2006/relationships" xmlns:p1510="http://schemas.microsoft.com/office/powerpoint/2015/10/main">
   <p1510:revLst>
-    <p1510:client id="{B85D8D1D-2C3A-441C-A314-6BCD0724E910}" v="1" dt="2019-02-24T04:56:11.987"/>
+    <p1510:client id="{25EA6830-CCD9-43A0-959E-08186E5CF02D}" v="4" dt="2019-02-27T00:49:24.952"/>
   </p1510:revLst>
 </p1510:revInfo>
 </file>
@@ -170,6 +170,109 @@
       </pc:sldChg>
     </pc:docChg>
   </pc:docChgLst>
+  <pc:docChgLst>
+    <pc:chgData name="Carl Walenciak" userId="04b023ba5be62806" providerId="LiveId" clId="{25EA6830-CCD9-43A0-959E-08186E5CF02D}"/>
+    <pc:docChg chg="undo custSel modSld">
+      <pc:chgData name="Carl Walenciak" userId="04b023ba5be62806" providerId="LiveId" clId="{25EA6830-CCD9-43A0-959E-08186E5CF02D}" dt="2019-02-27T00:53:04.822" v="26" actId="1076"/>
+      <pc:docMkLst>
+        <pc:docMk/>
+      </pc:docMkLst>
+      <pc:sldChg chg="addSp delSp modSp">
+        <pc:chgData name="Carl Walenciak" userId="04b023ba5be62806" providerId="LiveId" clId="{25EA6830-CCD9-43A0-959E-08186E5CF02D}" dt="2019-02-27T00:53:04.822" v="26" actId="1076"/>
+        <pc:sldMkLst>
+          <pc:docMk/>
+          <pc:sldMk cId="891628228" sldId="259"/>
+        </pc:sldMkLst>
+        <pc:spChg chg="mod">
+          <ac:chgData name="Carl Walenciak" userId="04b023ba5be62806" providerId="LiveId" clId="{25EA6830-CCD9-43A0-959E-08186E5CF02D}" dt="2019-02-27T00:52:44.054" v="21" actId="1076"/>
+          <ac:spMkLst>
+            <pc:docMk/>
+            <pc:sldMk cId="891628228" sldId="259"/>
+            <ac:spMk id="5" creationId="{656CFFEB-A71D-48D7-A354-82FBB68FBA15}"/>
+          </ac:spMkLst>
+        </pc:spChg>
+        <pc:spChg chg="mod">
+          <ac:chgData name="Carl Walenciak" userId="04b023ba5be62806" providerId="LiveId" clId="{25EA6830-CCD9-43A0-959E-08186E5CF02D}" dt="2019-02-27T00:52:46.562" v="22" actId="1076"/>
+          <ac:spMkLst>
+            <pc:docMk/>
+            <pc:sldMk cId="891628228" sldId="259"/>
+            <ac:spMk id="6" creationId="{D8D493B8-FB59-499E-AE3A-F93D6F18DCE4}"/>
+          </ac:spMkLst>
+        </pc:spChg>
+        <pc:spChg chg="mod">
+          <ac:chgData name="Carl Walenciak" userId="04b023ba5be62806" providerId="LiveId" clId="{25EA6830-CCD9-43A0-959E-08186E5CF02D}" dt="2019-02-27T00:52:50.943" v="23" actId="1076"/>
+          <ac:spMkLst>
+            <pc:docMk/>
+            <pc:sldMk cId="891628228" sldId="259"/>
+            <ac:spMk id="7" creationId="{D1A006B6-AD9E-4310-BD2F-B6B98E2AA9EF}"/>
+          </ac:spMkLst>
+        </pc:spChg>
+        <pc:spChg chg="mod">
+          <ac:chgData name="Carl Walenciak" userId="04b023ba5be62806" providerId="LiveId" clId="{25EA6830-CCD9-43A0-959E-08186E5CF02D}" dt="2019-02-27T00:53:04.822" v="26" actId="1076"/>
+          <ac:spMkLst>
+            <pc:docMk/>
+            <pc:sldMk cId="891628228" sldId="259"/>
+            <ac:spMk id="8" creationId="{74EAB7EE-8E27-40FA-82F4-2C9D7347DBE3}"/>
+          </ac:spMkLst>
+        </pc:spChg>
+        <pc:spChg chg="mod">
+          <ac:chgData name="Carl Walenciak" userId="04b023ba5be62806" providerId="LiveId" clId="{25EA6830-CCD9-43A0-959E-08186E5CF02D}" dt="2019-02-27T00:53:00.685" v="25" actId="1076"/>
+          <ac:spMkLst>
+            <pc:docMk/>
+            <pc:sldMk cId="891628228" sldId="259"/>
+            <ac:spMk id="9" creationId="{EF9E5EEA-1A80-48F1-96E0-1AAEB70BB852}"/>
+          </ac:spMkLst>
+        </pc:spChg>
+        <pc:picChg chg="del">
+          <ac:chgData name="Carl Walenciak" userId="04b023ba5be62806" providerId="LiveId" clId="{25EA6830-CCD9-43A0-959E-08186E5CF02D}" dt="2019-02-27T00:32:10.570" v="1" actId="478"/>
+          <ac:picMkLst>
+            <pc:docMk/>
+            <pc:sldMk cId="891628228" sldId="259"/>
+            <ac:picMk id="4" creationId="{CFDB5073-4B17-4631-AADC-1E2FCA424E3B}"/>
+          </ac:picMkLst>
+        </pc:picChg>
+        <pc:picChg chg="add del mod">
+          <ac:chgData name="Carl Walenciak" userId="04b023ba5be62806" providerId="LiveId" clId="{25EA6830-CCD9-43A0-959E-08186E5CF02D}" dt="2019-02-27T00:32:35.540" v="7"/>
+          <ac:picMkLst>
+            <pc:docMk/>
+            <pc:sldMk cId="891628228" sldId="259"/>
+            <ac:picMk id="10" creationId="{5A61FF2C-CFC9-45EE-9EA3-C238BBBA8F07}"/>
+          </ac:picMkLst>
+        </pc:picChg>
+        <pc:picChg chg="add del mod">
+          <ac:chgData name="Carl Walenciak" userId="04b023ba5be62806" providerId="LiveId" clId="{25EA6830-CCD9-43A0-959E-08186E5CF02D}" dt="2019-02-27T00:48:56.011" v="11" actId="478"/>
+          <ac:picMkLst>
+            <pc:docMk/>
+            <pc:sldMk cId="891628228" sldId="259"/>
+            <ac:picMk id="11" creationId="{401C10C5-6D63-424E-9B95-B1AE6DA05E13}"/>
+          </ac:picMkLst>
+        </pc:picChg>
+        <pc:picChg chg="add mod ord modCrop">
+          <ac:chgData name="Carl Walenciak" userId="04b023ba5be62806" providerId="LiveId" clId="{25EA6830-CCD9-43A0-959E-08186E5CF02D}" dt="2019-02-27T00:52:40.365" v="20" actId="167"/>
+          <ac:picMkLst>
+            <pc:docMk/>
+            <pc:sldMk cId="891628228" sldId="259"/>
+            <ac:picMk id="12" creationId="{9E073FC9-899D-4847-867C-7834E9F4F3E5}"/>
+          </ac:picMkLst>
+        </pc:picChg>
+      </pc:sldChg>
+      <pc:sldChg chg="modSp">
+        <pc:chgData name="Carl Walenciak" userId="04b023ba5be62806" providerId="LiveId" clId="{25EA6830-CCD9-43A0-959E-08186E5CF02D}" dt="2019-02-26T02:11:09.209" v="0" actId="1076"/>
+        <pc:sldMkLst>
+          <pc:docMk/>
+          <pc:sldMk cId="1065726751" sldId="264"/>
+        </pc:sldMkLst>
+        <pc:picChg chg="mod">
+          <ac:chgData name="Carl Walenciak" userId="04b023ba5be62806" providerId="LiveId" clId="{25EA6830-CCD9-43A0-959E-08186E5CF02D}" dt="2019-02-26T02:11:09.209" v="0" actId="1076"/>
+          <ac:picMkLst>
+            <pc:docMk/>
+            <pc:sldMk cId="1065726751" sldId="264"/>
+            <ac:picMk id="30" creationId="{896E6AFE-B3E3-4716-A980-A844E94817E7}"/>
+          </ac:picMkLst>
+        </pc:picChg>
+      </pc:sldChg>
+    </pc:docChg>
+  </pc:docChgLst>
 </pc:chgInfo>
 </file>
 
@@ -255,7 +358,7 @@
           <a:p>
             <a:fld id="{0A89938E-F505-410C-A904-2587BF127AA3}" type="datetimeFigureOut">
               <a:rPr lang="en-US" smtClean="0"/>
-              <a:t>2/25/2019</a:t>
+              <a:t>2/26/2019</a:t>
             </a:fld>
             <a:endParaRPr lang="en-US"/>
           </a:p>
@@ -1030,7 +1133,7 @@
           <a:p>
             <a:fld id="{93C1DD29-BCA9-4BD4-874E-2BFB0EB54CBC}" type="datetime1">
               <a:rPr lang="en-US" smtClean="0"/>
-              <a:t>2/25/2019</a:t>
+              <a:t>2/26/2019</a:t>
             </a:fld>
             <a:endParaRPr lang="en-US" dirty="0"/>
           </a:p>
@@ -2012,7 +2115,7 @@
           <a:p>
             <a:fld id="{7D8C4A03-AD86-46BF-AF07-341B65C8EF34}" type="datetime1">
               <a:rPr lang="en-US" smtClean="0"/>
-              <a:t>2/25/2019</a:t>
+              <a:t>2/26/2019</a:t>
             </a:fld>
             <a:endParaRPr lang="en-US" dirty="0"/>
           </a:p>
@@ -2882,7 +2985,7 @@
           <a:p>
             <a:fld id="{CDD0B0D0-4C31-4767-B6C8-C05AEB029E5E}" type="datetime1">
               <a:rPr lang="en-US" smtClean="0"/>
-              <a:t>2/25/2019</a:t>
+              <a:t>2/26/2019</a:t>
             </a:fld>
             <a:endParaRPr lang="en-US" dirty="0"/>
           </a:p>
@@ -3903,7 +4006,7 @@
           <a:p>
             <a:fld id="{0CB5AADC-4AB6-43C2-AFC5-C2BF3EC4CD51}" type="datetime1">
               <a:rPr lang="en-US" smtClean="0"/>
-              <a:t>2/25/2019</a:t>
+              <a:t>2/26/2019</a:t>
             </a:fld>
             <a:endParaRPr lang="en-US" dirty="0"/>
           </a:p>
@@ -4823,7 +4926,7 @@
           <a:p>
             <a:fld id="{F8BAB27F-FFB1-4669-993A-EAD4AEE8E7B1}" type="datetime1">
               <a:rPr lang="en-US" smtClean="0"/>
-              <a:t>2/25/2019</a:t>
+              <a:t>2/26/2019</a:t>
             </a:fld>
             <a:endParaRPr lang="en-US" dirty="0"/>
           </a:p>
@@ -5479,7 +5582,7 @@
           <a:p>
             <a:fld id="{69C02705-5D8A-44D4-80C0-1A7D4207E89D}" type="datetime1">
               <a:rPr lang="en-US" smtClean="0"/>
-              <a:t>2/25/2019</a:t>
+              <a:t>2/26/2019</a:t>
             </a:fld>
             <a:endParaRPr lang="en-US" dirty="0"/>
           </a:p>
@@ -6336,7 +6439,7 @@
           <a:p>
             <a:fld id="{6451A9A1-7E63-4886-8FD9-5FE07F56FC3D}" type="datetime1">
               <a:rPr lang="en-US" smtClean="0"/>
-              <a:t>2/25/2019</a:t>
+              <a:t>2/26/2019</a:t>
             </a:fld>
             <a:endParaRPr lang="en-US" dirty="0"/>
           </a:p>
@@ -6519,7 +6622,7 @@
           <a:p>
             <a:fld id="{BC67367B-96B2-42E5-AF83-F6AE54A56307}" type="datetime1">
               <a:rPr lang="en-US" smtClean="0"/>
-              <a:t>2/25/2019</a:t>
+              <a:t>2/26/2019</a:t>
             </a:fld>
             <a:endParaRPr lang="en-US" dirty="0"/>
           </a:p>
@@ -7376,7 +7479,7 @@
           <a:p>
             <a:fld id="{378C577E-D17B-427A-858E-EB2AABCFFA35}" type="datetime1">
               <a:rPr lang="en-US" smtClean="0"/>
-              <a:t>2/25/2019</a:t>
+              <a:t>2/26/2019</a:t>
             </a:fld>
             <a:endParaRPr lang="en-US" dirty="0"/>
           </a:p>
@@ -7595,7 +7698,7 @@
           <a:p>
             <a:fld id="{EFA24DE6-E57A-42AB-BC4D-F21BD068AF01}" type="datetime1">
               <a:rPr lang="en-US" smtClean="0"/>
-              <a:t>2/25/2019</a:t>
+              <a:t>2/26/2019</a:t>
             </a:fld>
             <a:endParaRPr lang="en-US" dirty="0"/>
           </a:p>
@@ -8520,7 +8623,7 @@
           <a:p>
             <a:fld id="{E192520C-5071-4ADE-814C-C587828C6E96}" type="datetime1">
               <a:rPr lang="en-US" smtClean="0"/>
-              <a:t>2/25/2019</a:t>
+              <a:t>2/26/2019</a:t>
             </a:fld>
             <a:endParaRPr lang="en-US" dirty="0"/>
           </a:p>
@@ -8804,7 +8907,7 @@
           <a:p>
             <a:fld id="{B2696D86-FC59-4D7B-8DC1-965F794CD926}" type="datetime1">
               <a:rPr lang="en-US" smtClean="0"/>
-              <a:t>2/25/2019</a:t>
+              <a:t>2/26/2019</a:t>
             </a:fld>
             <a:endParaRPr lang="en-US" dirty="0"/>
           </a:p>
@@ -9194,7 +9297,7 @@
           <a:p>
             <a:fld id="{10B37338-9B7C-42DE-82D4-0A6E61519CEB}" type="datetime1">
               <a:rPr lang="en-US" smtClean="0"/>
-              <a:t>2/25/2019</a:t>
+              <a:t>2/26/2019</a:t>
             </a:fld>
             <a:endParaRPr lang="en-US" dirty="0"/>
           </a:p>
@@ -9320,7 +9423,7 @@
           <a:p>
             <a:fld id="{8A5DD31C-B819-4AE2-B012-E627CE841828}" type="datetime1">
               <a:rPr lang="en-US" smtClean="0"/>
-              <a:t>2/25/2019</a:t>
+              <a:t>2/26/2019</a:t>
             </a:fld>
             <a:endParaRPr lang="en-US" dirty="0"/>
           </a:p>
@@ -9415,7 +9518,7 @@
           <a:p>
             <a:fld id="{DFE9658B-1BCB-4C4C-B7B0-A626BA3CC689}" type="datetime1">
               <a:rPr lang="en-US" smtClean="0"/>
-              <a:t>2/25/2019</a:t>
+              <a:t>2/26/2019</a:t>
             </a:fld>
             <a:endParaRPr lang="en-US" dirty="0"/>
           </a:p>
@@ -10385,7 +10488,7 @@
           <a:p>
             <a:fld id="{A199D328-A86A-4398-BC07-FC27DA5031F5}" type="datetime1">
               <a:rPr lang="en-US" smtClean="0"/>
-              <a:t>2/25/2019</a:t>
+              <a:t>2/26/2019</a:t>
             </a:fld>
             <a:endParaRPr lang="en-US" dirty="0"/>
           </a:p>
@@ -11380,7 +11483,7 @@
           <a:p>
             <a:fld id="{DEA6C3BE-1C12-4F35-888E-8FCA2792BD33}" type="datetime1">
               <a:rPr lang="en-US" smtClean="0"/>
-              <a:t>2/25/2019</a:t>
+              <a:t>2/26/2019</a:t>
             </a:fld>
             <a:endParaRPr lang="en-US" dirty="0"/>
           </a:p>
@@ -12264,7 +12367,7 @@
           <a:p>
             <a:fld id="{A617ADFC-23F8-46A5-9CCE-566D7233319A}" type="datetime1">
               <a:rPr lang="en-US" smtClean="0"/>
-              <a:t>2/25/2019</a:t>
+              <a:t>2/26/2019</a:t>
             </a:fld>
             <a:endParaRPr lang="en-US" dirty="0"/>
           </a:p>
@@ -14931,7 +15034,7 @@
         </p:blipFill>
         <p:spPr>
           <a:xfrm>
-            <a:off x="467945" y="3015718"/>
+            <a:off x="535056" y="3007329"/>
             <a:ext cx="5153134" cy="2665799"/>
           </a:xfrm>
           <a:prstGeom prst="rect">
@@ -15534,6 +15637,35 @@
           <a:chExt cx="0" cy="0"/>
         </a:xfrm>
       </p:grpSpPr>
+      <p:pic>
+        <p:nvPicPr>
+          <p:cNvPr id="12" name="Picture 11">
+            <a:extLst>
+              <a:ext uri="{FF2B5EF4-FFF2-40B4-BE49-F238E27FC236}">
+                <a16:creationId xmlns:a16="http://schemas.microsoft.com/office/drawing/2014/main" id="{9E073FC9-899D-4847-867C-7834E9F4F3E5}"/>
+              </a:ext>
+            </a:extLst>
+          </p:cNvPr>
+          <p:cNvPicPr>
+            <a:picLocks noChangeAspect="1"/>
+          </p:cNvPicPr>
+          <p:nvPr/>
+        </p:nvPicPr>
+        <p:blipFill rotWithShape="1">
+          <a:blip r:embed="rId2"/>
+          <a:srcRect t="1069"/>
+          <a:stretch/>
+        </p:blipFill>
+        <p:spPr>
+          <a:xfrm>
+            <a:off x="491277" y="2380317"/>
+            <a:ext cx="11209445" cy="3918884"/>
+          </a:xfrm>
+          <a:prstGeom prst="rect">
+            <a:avLst/>
+          </a:prstGeom>
+        </p:spPr>
+      </p:pic>
       <p:sp>
         <p:nvSpPr>
           <p:cNvPr id="2" name="Title 1">
@@ -15562,36 +15694,6 @@
           </a:p>
         </p:txBody>
       </p:sp>
-      <p:pic>
-        <p:nvPicPr>
-          <p:cNvPr id="4" name="Picture 3">
-            <a:extLst>
-              <a:ext uri="{FF2B5EF4-FFF2-40B4-BE49-F238E27FC236}">
-                <a16:creationId xmlns:a16="http://schemas.microsoft.com/office/drawing/2014/main" id="{CFDB5073-4B17-4631-AADC-1E2FCA424E3B}"/>
-              </a:ext>
-            </a:extLst>
-          </p:cNvPr>
-          <p:cNvPicPr>
-            <a:picLocks noChangeAspect="1"/>
-          </p:cNvPicPr>
-          <p:nvPr/>
-        </p:nvPicPr>
-        <p:blipFill>
-          <a:blip r:embed="rId2"/>
-          <a:stretch>
-            <a:fillRect/>
-          </a:stretch>
-        </p:blipFill>
-        <p:spPr>
-          <a:xfrm>
-            <a:off x="257175" y="2490787"/>
-            <a:ext cx="11677650" cy="4010025"/>
-          </a:xfrm>
-          <a:prstGeom prst="rect">
-            <a:avLst/>
-          </a:prstGeom>
-        </p:spPr>
-      </p:pic>
       <p:sp>
         <p:nvSpPr>
           <p:cNvPr id="5" name="Rectangle 4">
@@ -15606,7 +15708,7 @@
         </p:nvSpPr>
         <p:spPr>
           <a:xfrm>
-            <a:off x="7874000" y="2819400"/>
+            <a:off x="7286771" y="2768934"/>
             <a:ext cx="431800" cy="228600"/>
           </a:xfrm>
           <a:prstGeom prst="rect">
@@ -15660,7 +15762,7 @@
         </p:nvSpPr>
         <p:spPr>
           <a:xfrm>
-            <a:off x="7874000" y="3835401"/>
+            <a:off x="7286771" y="3746167"/>
             <a:ext cx="431800" cy="228600"/>
           </a:xfrm>
           <a:prstGeom prst="rect">
@@ -15714,7 +15816,7 @@
         </p:nvSpPr>
         <p:spPr>
           <a:xfrm>
-            <a:off x="7874000" y="6184901"/>
+            <a:off x="7286771" y="6021924"/>
             <a:ext cx="431800" cy="228600"/>
           </a:xfrm>
           <a:prstGeom prst="rect">
@@ -15768,7 +15870,7 @@
         </p:nvSpPr>
         <p:spPr>
           <a:xfrm>
-            <a:off x="2247900" y="6500812"/>
+            <a:off x="2558220" y="6478735"/>
             <a:ext cx="431800" cy="228600"/>
           </a:xfrm>
           <a:prstGeom prst="rect">
@@ -15824,8 +15926,8 @@
         </p:nvSpPr>
         <p:spPr>
           <a:xfrm>
-            <a:off x="2679700" y="6430446"/>
-            <a:ext cx="6944530" cy="369332"/>
+            <a:off x="2990020" y="6423758"/>
+            <a:ext cx="6211957" cy="338554"/>
           </a:xfrm>
           <a:prstGeom prst="rect">
             <a:avLst/>
@@ -15839,7 +15941,7 @@
           <a:lstStyle/>
           <a:p>
             <a:r>
-              <a:rPr lang="en-US" b="1" dirty="0"/>
+              <a:rPr lang="en-US" sz="1600" b="1" dirty="0"/>
               <a:t>Red highlight indicates job roles where attrition exceeds 20%</a:t>
             </a:r>
           </a:p>

</xml_diff>

<commit_message>
Fixing Carl's mistake. Yes...you Carl!
</commit_message>
<xml_diff>
--- a/DraftPresentation.pptx
+++ b/DraftPresentation.pptx
@@ -5,7 +5,7 @@
     <p:sldMasterId id="2147483648" r:id="rId1"/>
   </p:sldMasterIdLst>
   <p:notesMasterIdLst>
-    <p:notesMasterId r:id="rId18"/>
+    <p:notesMasterId r:id="rId19"/>
   </p:notesMasterIdLst>
   <p:sldIdLst>
     <p:sldId id="256" r:id="rId2"/>
@@ -18,12 +18,13 @@
     <p:sldId id="258" r:id="rId9"/>
     <p:sldId id="271" r:id="rId10"/>
     <p:sldId id="272" r:id="rId11"/>
-    <p:sldId id="268" r:id="rId12"/>
-    <p:sldId id="270" r:id="rId13"/>
-    <p:sldId id="260" r:id="rId14"/>
-    <p:sldId id="266" r:id="rId15"/>
-    <p:sldId id="267" r:id="rId16"/>
-    <p:sldId id="273" r:id="rId17"/>
+    <p:sldId id="275" r:id="rId12"/>
+    <p:sldId id="274" r:id="rId13"/>
+    <p:sldId id="276" r:id="rId14"/>
+    <p:sldId id="260" r:id="rId15"/>
+    <p:sldId id="266" r:id="rId16"/>
+    <p:sldId id="267" r:id="rId17"/>
+    <p:sldId id="273" r:id="rId18"/>
   </p:sldIdLst>
   <p:sldSz cx="12192000" cy="6858000"/>
   <p:notesSz cx="6858000" cy="9144000"/>
@@ -13208,10 +13209,10 @@
       </p:grpSpPr>
       <p:sp>
         <p:nvSpPr>
-          <p:cNvPr id="2" name="Title 1">
+          <p:cNvPr id="7" name="Content Placeholder 6">
             <a:extLst>
               <a:ext uri="{FF2B5EF4-FFF2-40B4-BE49-F238E27FC236}">
-                <a16:creationId xmlns:a16="http://schemas.microsoft.com/office/drawing/2014/main" id="{07BA1A0C-5EFC-42E0-A0FF-941E3518C30D}"/>
+                <a16:creationId xmlns:a16="http://schemas.microsoft.com/office/drawing/2014/main" id="{D76DDA57-25B1-4641-B200-8AE5C996E58D}"/>
               </a:ext>
             </a:extLst>
           </p:cNvPr>
@@ -13219,7 +13220,7 @@
             <a:spLocks noGrp="1"/>
           </p:cNvSpPr>
           <p:nvPr>
-            <p:ph type="title"/>
+            <p:ph idx="1"/>
           </p:nvPr>
         </p:nvSpPr>
         <p:spPr/>
@@ -13227,6 +13228,140 @@
           <a:bodyPr/>
           <a:lstStyle/>
           <a:p>
+            <a:endParaRPr lang="en-US"/>
+          </a:p>
+        </p:txBody>
+      </p:sp>
+      <p:sp>
+        <p:nvSpPr>
+          <p:cNvPr id="5" name="Slide Number Placeholder 4">
+            <a:extLst>
+              <a:ext uri="{FF2B5EF4-FFF2-40B4-BE49-F238E27FC236}">
+                <a16:creationId xmlns:a16="http://schemas.microsoft.com/office/drawing/2014/main" id="{99A93F0B-928B-4060-B0AE-B656293E08C6}"/>
+              </a:ext>
+            </a:extLst>
+          </p:cNvPr>
+          <p:cNvSpPr>
+            <a:spLocks noGrp="1"/>
+          </p:cNvSpPr>
+          <p:nvPr>
+            <p:ph type="sldNum" sz="quarter" idx="12"/>
+          </p:nvPr>
+        </p:nvSpPr>
+        <p:spPr/>
+        <p:txBody>
+          <a:bodyPr/>
+          <a:lstStyle/>
+          <a:p>
+            <a:fld id="{D57F1E4F-1CFF-5643-939E-217C01CDF565}" type="slidenum">
+              <a:rPr lang="en-US" smtClean="0"/>
+              <a:pPr/>
+              <a:t>11</a:t>
+            </a:fld>
+            <a:endParaRPr lang="en-US" dirty="0"/>
+          </a:p>
+        </p:txBody>
+      </p:sp>
+      <p:sp>
+        <p:nvSpPr>
+          <p:cNvPr id="8" name="Title 1">
+            <a:extLst>
+              <a:ext uri="{FF2B5EF4-FFF2-40B4-BE49-F238E27FC236}">
+                <a16:creationId xmlns:a16="http://schemas.microsoft.com/office/drawing/2014/main" id="{05CDCE46-9293-4ED4-BDA2-D4B35A6915CD}"/>
+              </a:ext>
+            </a:extLst>
+          </p:cNvPr>
+          <p:cNvSpPr txBox="1">
+            <a:spLocks/>
+          </p:cNvSpPr>
+          <p:nvPr/>
+        </p:nvSpPr>
+        <p:spPr bwMode="gray">
+          <a:xfrm>
+            <a:off x="1186590" y="913391"/>
+            <a:ext cx="8825659" cy="704088"/>
+          </a:xfrm>
+          <a:prstGeom prst="rect">
+            <a:avLst/>
+          </a:prstGeom>
+        </p:spPr>
+        <p:txBody>
+          <a:bodyPr vert="horz" lIns="91440" tIns="45720" rIns="91440" bIns="45720" rtlCol="0" anchor="ctr">
+            <a:noAutofit/>
+          </a:bodyPr>
+          <a:lstStyle>
+            <a:lvl1pPr algn="l" defTabSz="457200" rtl="0" eaLnBrk="1" latinLnBrk="0" hangingPunct="1">
+              <a:spcBef>
+                <a:spcPct val="0"/>
+              </a:spcBef>
+              <a:buNone/>
+              <a:defRPr sz="3600" b="0" i="0" kern="1200">
+                <a:solidFill>
+                  <a:schemeClr val="bg2"/>
+                </a:solidFill>
+                <a:latin typeface="+mj-lt"/>
+                <a:ea typeface="+mj-ea"/>
+                <a:cs typeface="+mj-cs"/>
+              </a:defRPr>
+            </a:lvl1pPr>
+            <a:lvl2pPr eaLnBrk="1" hangingPunct="1">
+              <a:defRPr>
+                <a:solidFill>
+                  <a:schemeClr val="tx2"/>
+                </a:solidFill>
+              </a:defRPr>
+            </a:lvl2pPr>
+            <a:lvl3pPr eaLnBrk="1" hangingPunct="1">
+              <a:defRPr>
+                <a:solidFill>
+                  <a:schemeClr val="tx2"/>
+                </a:solidFill>
+              </a:defRPr>
+            </a:lvl3pPr>
+            <a:lvl4pPr eaLnBrk="1" hangingPunct="1">
+              <a:defRPr>
+                <a:solidFill>
+                  <a:schemeClr val="tx2"/>
+                </a:solidFill>
+              </a:defRPr>
+            </a:lvl4pPr>
+            <a:lvl5pPr eaLnBrk="1" hangingPunct="1">
+              <a:defRPr>
+                <a:solidFill>
+                  <a:schemeClr val="tx2"/>
+                </a:solidFill>
+              </a:defRPr>
+            </a:lvl5pPr>
+            <a:lvl6pPr eaLnBrk="1" hangingPunct="1">
+              <a:defRPr>
+                <a:solidFill>
+                  <a:schemeClr val="tx2"/>
+                </a:solidFill>
+              </a:defRPr>
+            </a:lvl6pPr>
+            <a:lvl7pPr eaLnBrk="1" hangingPunct="1">
+              <a:defRPr>
+                <a:solidFill>
+                  <a:schemeClr val="tx2"/>
+                </a:solidFill>
+              </a:defRPr>
+            </a:lvl7pPr>
+            <a:lvl8pPr eaLnBrk="1" hangingPunct="1">
+              <a:defRPr>
+                <a:solidFill>
+                  <a:schemeClr val="tx2"/>
+                </a:solidFill>
+              </a:defRPr>
+            </a:lvl8pPr>
+            <a:lvl9pPr eaLnBrk="1" hangingPunct="1">
+              <a:defRPr>
+                <a:solidFill>
+                  <a:schemeClr val="tx2"/>
+                </a:solidFill>
+              </a:defRPr>
+            </a:lvl9pPr>
+          </a:lstStyle>
+          <a:p>
             <a:r>
               <a:rPr lang="en-US" dirty="0"/>
               <a:t>Other Factors: Business Travel</a:t>
@@ -13236,10 +13371,10 @@
       </p:sp>
       <p:pic>
         <p:nvPicPr>
-          <p:cNvPr id="5" name="Picture 4">
+          <p:cNvPr id="9" name="Picture 8">
             <a:extLst>
               <a:ext uri="{FF2B5EF4-FFF2-40B4-BE49-F238E27FC236}">
-                <a16:creationId xmlns:a16="http://schemas.microsoft.com/office/drawing/2014/main" id="{078FD37E-3A0E-41D9-BA33-2477A3976FC7}"/>
+                <a16:creationId xmlns:a16="http://schemas.microsoft.com/office/drawing/2014/main" id="{931F85C9-9B58-42AA-84FE-2065B30C2358}"/>
               </a:ext>
             </a:extLst>
           </p:cNvPr>
@@ -13256,7 +13391,7 @@
         </p:blipFill>
         <p:spPr>
           <a:xfrm>
-            <a:off x="0" y="2223951"/>
+            <a:off x="0" y="2244972"/>
             <a:ext cx="5395127" cy="2681264"/>
           </a:xfrm>
           <a:prstGeom prst="rect">
@@ -13266,10 +13401,10 @@
       </p:pic>
       <p:pic>
         <p:nvPicPr>
-          <p:cNvPr id="6" name="Picture 5">
+          <p:cNvPr id="10" name="Picture 9">
             <a:extLst>
               <a:ext uri="{FF2B5EF4-FFF2-40B4-BE49-F238E27FC236}">
-                <a16:creationId xmlns:a16="http://schemas.microsoft.com/office/drawing/2014/main" id="{9484AB16-5759-4B24-A16E-9695E1A02F5E}"/>
+                <a16:creationId xmlns:a16="http://schemas.microsoft.com/office/drawing/2014/main" id="{04A33AD0-3494-40C0-92A7-7566EEB2FF1D}"/>
               </a:ext>
             </a:extLst>
           </p:cNvPr>
@@ -13286,7 +13421,7 @@
         </p:blipFill>
         <p:spPr>
           <a:xfrm>
-            <a:off x="5760768" y="2297381"/>
+            <a:off x="5760768" y="2318402"/>
             <a:ext cx="5026052" cy="2730690"/>
           </a:xfrm>
           <a:prstGeom prst="rect">
@@ -13297,7 +13432,7 @@
     </p:spTree>
     <p:extLst>
       <p:ext uri="{BB962C8B-B14F-4D97-AF65-F5344CB8AC3E}">
-        <p14:creationId xmlns:p14="http://schemas.microsoft.com/office/powerpoint/2010/main" val="2551388406"/>
+        <p14:creationId xmlns:p14="http://schemas.microsoft.com/office/powerpoint/2010/main" val="482969324"/>
       </p:ext>
     </p:extLst>
   </p:cSld>
@@ -13471,7 +13606,7 @@
     </p:spTree>
     <p:extLst>
       <p:ext uri="{BB962C8B-B14F-4D97-AF65-F5344CB8AC3E}">
-        <p14:creationId xmlns:p14="http://schemas.microsoft.com/office/powerpoint/2010/main" val="3234536396"/>
+        <p14:creationId xmlns:p14="http://schemas.microsoft.com/office/powerpoint/2010/main" val="974720796"/>
       </p:ext>
     </p:extLst>
   </p:cSld>
@@ -13482,6 +13617,180 @@
 </file>
 
 <file path=ppt/slides/slide13.xml><?xml version="1.0" encoding="utf-8"?>
+<p:sld xmlns:a="http://schemas.openxmlformats.org/drawingml/2006/main" xmlns:r="http://schemas.openxmlformats.org/officeDocument/2006/relationships" xmlns:p="http://schemas.openxmlformats.org/presentationml/2006/main">
+  <p:cSld>
+    <p:spTree>
+      <p:nvGrpSpPr>
+        <p:cNvPr id="1" name=""/>
+        <p:cNvGrpSpPr/>
+        <p:nvPr/>
+      </p:nvGrpSpPr>
+      <p:grpSpPr>
+        <a:xfrm>
+          <a:off x="0" y="0"/>
+          <a:ext cx="0" cy="0"/>
+          <a:chOff x="0" y="0"/>
+          <a:chExt cx="0" cy="0"/>
+        </a:xfrm>
+      </p:grpSpPr>
+      <p:sp>
+        <p:nvSpPr>
+          <p:cNvPr id="2" name="Title 1">
+            <a:extLst>
+              <a:ext uri="{FF2B5EF4-FFF2-40B4-BE49-F238E27FC236}">
+                <a16:creationId xmlns:a16="http://schemas.microsoft.com/office/drawing/2014/main" id="{FDA98A4B-0205-450C-B362-24F6870F5B88}"/>
+              </a:ext>
+            </a:extLst>
+          </p:cNvPr>
+          <p:cNvSpPr>
+            <a:spLocks noGrp="1"/>
+          </p:cNvSpPr>
+          <p:nvPr>
+            <p:ph type="title"/>
+          </p:nvPr>
+        </p:nvSpPr>
+        <p:spPr>
+          <a:xfrm>
+            <a:off x="1089169" y="777326"/>
+            <a:ext cx="8825659" cy="704088"/>
+          </a:xfrm>
+        </p:spPr>
+        <p:txBody>
+          <a:bodyPr/>
+          <a:lstStyle/>
+          <a:p>
+            <a:r>
+              <a:rPr lang="en-US" dirty="0"/>
+              <a:t>QOL factor </a:t>
+            </a:r>
+            <a:r>
+              <a:rPr lang="en-US" sz="1800" dirty="0"/>
+              <a:t>(</a:t>
+            </a:r>
+            <a:r>
+              <a:rPr lang="en-US" sz="1800" dirty="0" err="1"/>
+              <a:t>montly</a:t>
+            </a:r>
+            <a:r>
+              <a:rPr lang="en-US" sz="1800" dirty="0"/>
+              <a:t> income)</a:t>
+            </a:r>
+          </a:p>
+        </p:txBody>
+      </p:sp>
+      <p:sp>
+        <p:nvSpPr>
+          <p:cNvPr id="5" name="Slide Number Placeholder 4">
+            <a:extLst>
+              <a:ext uri="{FF2B5EF4-FFF2-40B4-BE49-F238E27FC236}">
+                <a16:creationId xmlns:a16="http://schemas.microsoft.com/office/drawing/2014/main" id="{B7889885-746D-47DC-8EAF-EDA7F36753B4}"/>
+              </a:ext>
+            </a:extLst>
+          </p:cNvPr>
+          <p:cNvSpPr>
+            <a:spLocks noGrp="1"/>
+          </p:cNvSpPr>
+          <p:nvPr>
+            <p:ph type="sldNum" sz="quarter" idx="12"/>
+          </p:nvPr>
+        </p:nvSpPr>
+        <p:spPr/>
+        <p:txBody>
+          <a:bodyPr/>
+          <a:lstStyle/>
+          <a:p>
+            <a:fld id="{D57F1E4F-1CFF-5643-939E-217C01CDF565}" type="slidenum">
+              <a:rPr lang="en-US" smtClean="0"/>
+              <a:pPr/>
+              <a:t>13</a:t>
+            </a:fld>
+            <a:endParaRPr lang="en-US" dirty="0"/>
+          </a:p>
+        </p:txBody>
+      </p:sp>
+      <p:pic>
+        <p:nvPicPr>
+          <p:cNvPr id="6" name="Picture 5">
+            <a:extLst>
+              <a:ext uri="{FF2B5EF4-FFF2-40B4-BE49-F238E27FC236}">
+                <a16:creationId xmlns:a16="http://schemas.microsoft.com/office/drawing/2014/main" id="{CE13E8D8-4D7B-4C2D-862D-39C7839D698C}"/>
+              </a:ext>
+            </a:extLst>
+          </p:cNvPr>
+          <p:cNvPicPr>
+            <a:picLocks noChangeAspect="1"/>
+          </p:cNvPicPr>
+          <p:nvPr/>
+        </p:nvPicPr>
+        <p:blipFill>
+          <a:blip r:embed="rId2"/>
+          <a:stretch>
+            <a:fillRect/>
+          </a:stretch>
+        </p:blipFill>
+        <p:spPr>
+          <a:xfrm>
+            <a:off x="212702" y="2509233"/>
+            <a:ext cx="5637908" cy="4078674"/>
+          </a:xfrm>
+          <a:prstGeom prst="rect">
+            <a:avLst/>
+          </a:prstGeom>
+        </p:spPr>
+      </p:pic>
+      <p:sp>
+        <p:nvSpPr>
+          <p:cNvPr id="7" name="TextBox 6">
+            <a:extLst>
+              <a:ext uri="{FF2B5EF4-FFF2-40B4-BE49-F238E27FC236}">
+                <a16:creationId xmlns:a16="http://schemas.microsoft.com/office/drawing/2014/main" id="{2F2D34BE-9479-47CE-90CD-A6C15FC8FC77}"/>
+              </a:ext>
+            </a:extLst>
+          </p:cNvPr>
+          <p:cNvSpPr txBox="1"/>
+          <p:nvPr/>
+        </p:nvSpPr>
+        <p:spPr>
+          <a:xfrm>
+            <a:off x="6447295" y="2898795"/>
+            <a:ext cx="5268866" cy="923330"/>
+          </a:xfrm>
+          <a:prstGeom prst="rect">
+            <a:avLst/>
+          </a:prstGeom>
+          <a:noFill/>
+        </p:spPr>
+        <p:txBody>
+          <a:bodyPr wrap="square" rtlCol="0">
+            <a:spAutoFit/>
+          </a:bodyPr>
+          <a:lstStyle/>
+          <a:p>
+            <a:pPr marL="285750" indent="-285750">
+              <a:buFont typeface="Arial" panose="020B0604020202020204" pitchFamily="34" charset="0"/>
+              <a:buChar char="•"/>
+            </a:pPr>
+            <a:r>
+              <a:rPr lang="en-US" dirty="0"/>
+              <a:t>Employees who receive lower income (lower pay structures) are tending to leave more </a:t>
+            </a:r>
+          </a:p>
+        </p:txBody>
+      </p:sp>
+    </p:spTree>
+    <p:extLst>
+      <p:ext uri="{BB962C8B-B14F-4D97-AF65-F5344CB8AC3E}">
+        <p14:creationId xmlns:p14="http://schemas.microsoft.com/office/powerpoint/2010/main" val="3424303955"/>
+      </p:ext>
+    </p:extLst>
+  </p:cSld>
+  <p:clrMapOvr>
+    <a:masterClrMapping/>
+  </p:clrMapOvr>
+</p:sld>
+</file>
+
+<file path=ppt/slides/slide14.xml><?xml version="1.0" encoding="utf-8"?>
 <p:sld xmlns:a="http://schemas.openxmlformats.org/drawingml/2006/main" xmlns:r="http://schemas.openxmlformats.org/officeDocument/2006/relationships" xmlns:p="http://schemas.openxmlformats.org/presentationml/2006/main">
   <p:cSld>
     <p:bg>
@@ -13992,7 +14301,7 @@
             <a:fld id="{D57F1E4F-1CFF-5643-939E-217C01CDF565}" type="slidenum">
               <a:rPr lang="en-US" smtClean="0"/>
               <a:pPr/>
-              <a:t>13</a:t>
+              <a:t>14</a:t>
             </a:fld>
             <a:endParaRPr lang="en-US" dirty="0"/>
           </a:p>
@@ -14041,7 +14350,7 @@
 </p:sld>
 </file>
 
-<file path=ppt/slides/slide14.xml><?xml version="1.0" encoding="utf-8"?>
+<file path=ppt/slides/slide15.xml><?xml version="1.0" encoding="utf-8"?>
 <p:sld xmlns:a="http://schemas.openxmlformats.org/drawingml/2006/main" xmlns:r="http://schemas.openxmlformats.org/officeDocument/2006/relationships" xmlns:p="http://schemas.openxmlformats.org/presentationml/2006/main">
   <p:cSld>
     <p:spTree>
@@ -14371,7 +14680,7 @@
             <a:fld id="{D57F1E4F-1CFF-5643-939E-217C01CDF565}" type="slidenum">
               <a:rPr lang="en-US" smtClean="0"/>
               <a:pPr/>
-              <a:t>14</a:t>
+              <a:t>15</a:t>
             </a:fld>
             <a:endParaRPr lang="en-US" dirty="0"/>
           </a:p>
@@ -14381,216 +14690,6 @@
     <p:extLst>
       <p:ext uri="{BB962C8B-B14F-4D97-AF65-F5344CB8AC3E}">
         <p14:creationId xmlns:p14="http://schemas.microsoft.com/office/powerpoint/2010/main" val="204995131"/>
-      </p:ext>
-    </p:extLst>
-  </p:cSld>
-  <p:clrMapOvr>
-    <a:masterClrMapping/>
-  </p:clrMapOvr>
-</p:sld>
-</file>
-
-<file path=ppt/slides/slide15.xml><?xml version="1.0" encoding="utf-8"?>
-<p:sld xmlns:a="http://schemas.openxmlformats.org/drawingml/2006/main" xmlns:r="http://schemas.openxmlformats.org/officeDocument/2006/relationships" xmlns:p="http://schemas.openxmlformats.org/presentationml/2006/main">
-  <p:cSld>
-    <p:spTree>
-      <p:nvGrpSpPr>
-        <p:cNvPr id="1" name=""/>
-        <p:cNvGrpSpPr/>
-        <p:nvPr/>
-      </p:nvGrpSpPr>
-      <p:grpSpPr>
-        <a:xfrm>
-          <a:off x="0" y="0"/>
-          <a:ext cx="0" cy="0"/>
-          <a:chOff x="0" y="0"/>
-          <a:chExt cx="0" cy="0"/>
-        </a:xfrm>
-      </p:grpSpPr>
-      <p:sp>
-        <p:nvSpPr>
-          <p:cNvPr id="2" name="Title 1">
-            <a:extLst>
-              <a:ext uri="{FF2B5EF4-FFF2-40B4-BE49-F238E27FC236}">
-                <a16:creationId xmlns:a16="http://schemas.microsoft.com/office/drawing/2014/main" id="{CE2DCDC5-A71F-445E-96E0-A6659B352463}"/>
-              </a:ext>
-            </a:extLst>
-          </p:cNvPr>
-          <p:cNvSpPr>
-            <a:spLocks noGrp="1"/>
-          </p:cNvSpPr>
-          <p:nvPr>
-            <p:ph type="title"/>
-          </p:nvPr>
-        </p:nvSpPr>
-        <p:spPr/>
-        <p:txBody>
-          <a:bodyPr/>
-          <a:lstStyle/>
-          <a:p>
-            <a:r>
-              <a:rPr lang="en-US" dirty="0"/>
-              <a:t>Model Performance</a:t>
-            </a:r>
-          </a:p>
-        </p:txBody>
-      </p:sp>
-      <p:sp>
-        <p:nvSpPr>
-          <p:cNvPr id="3" name="Content Placeholder 2">
-            <a:extLst>
-              <a:ext uri="{FF2B5EF4-FFF2-40B4-BE49-F238E27FC236}">
-                <a16:creationId xmlns:a16="http://schemas.microsoft.com/office/drawing/2014/main" id="{BFAA199F-C95B-4F11-92CA-C194D9D46A38}"/>
-              </a:ext>
-            </a:extLst>
-          </p:cNvPr>
-          <p:cNvSpPr>
-            <a:spLocks noGrp="1"/>
-          </p:cNvSpPr>
-          <p:nvPr>
-            <p:ph idx="1"/>
-          </p:nvPr>
-        </p:nvSpPr>
-        <p:spPr>
-          <a:xfrm>
-            <a:off x="5770216" y="1298448"/>
-            <a:ext cx="5195997" cy="4572000"/>
-          </a:xfrm>
-        </p:spPr>
-        <p:txBody>
-          <a:bodyPr/>
-          <a:lstStyle/>
-          <a:p>
-            <a:r>
-              <a:rPr lang="en-US" b="1" dirty="0"/>
-              <a:t>Precision: </a:t>
-            </a:r>
-            <a:r>
-              <a:rPr lang="en-US" dirty="0"/>
-              <a:t>Metric accounting for false positives. </a:t>
-            </a:r>
-          </a:p>
-          <a:p>
-            <a:r>
-              <a:rPr lang="en-US" b="1" dirty="0"/>
-              <a:t>Recall: </a:t>
-            </a:r>
-            <a:r>
-              <a:rPr lang="en-US" dirty="0"/>
-              <a:t>Metric accounting for false negatives. </a:t>
-            </a:r>
-          </a:p>
-          <a:p>
-            <a:r>
-              <a:rPr lang="en-US" b="1" dirty="0"/>
-              <a:t>Accuracy: </a:t>
-            </a:r>
-            <a:r>
-              <a:rPr lang="en-US" dirty="0"/>
-              <a:t>“How many times does the model get it right?” </a:t>
-            </a:r>
-          </a:p>
-          <a:p>
-            <a:endParaRPr lang="en-US" dirty="0"/>
-          </a:p>
-          <a:p>
-            <a:pPr marL="0" indent="0">
-              <a:buNone/>
-            </a:pPr>
-            <a:r>
-              <a:rPr lang="en-US" dirty="0"/>
-              <a:t>Note: This model is a prototype and is not a certain predictor of attrition. However, it may be used to identify contributing factors and target retention efforts to specific categories of employees or make policy modifications. </a:t>
-            </a:r>
-          </a:p>
-        </p:txBody>
-      </p:sp>
-      <p:sp>
-        <p:nvSpPr>
-          <p:cNvPr id="4" name="Text Placeholder 3">
-            <a:extLst>
-              <a:ext uri="{FF2B5EF4-FFF2-40B4-BE49-F238E27FC236}">
-                <a16:creationId xmlns:a16="http://schemas.microsoft.com/office/drawing/2014/main" id="{0954EF1D-7F79-4556-8E70-1D9D795296F6}"/>
-              </a:ext>
-            </a:extLst>
-          </p:cNvPr>
-          <p:cNvSpPr>
-            <a:spLocks noGrp="1"/>
-          </p:cNvSpPr>
-          <p:nvPr>
-            <p:ph type="body" sz="half" idx="2"/>
-          </p:nvPr>
-        </p:nvSpPr>
-        <p:spPr/>
-        <p:txBody>
-          <a:bodyPr/>
-          <a:lstStyle/>
-          <a:p>
-            <a:r>
-              <a:rPr lang="en-US" dirty="0"/>
-              <a:t>Precision: 0.91</a:t>
-            </a:r>
-          </a:p>
-          <a:p>
-            <a:endParaRPr lang="en-US" dirty="0"/>
-          </a:p>
-          <a:p>
-            <a:r>
-              <a:rPr lang="en-US" dirty="0"/>
-              <a:t>Recall: 0.95</a:t>
-            </a:r>
-          </a:p>
-          <a:p>
-            <a:endParaRPr lang="en-US" dirty="0"/>
-          </a:p>
-          <a:p>
-            <a:r>
-              <a:rPr lang="en-US" b="1" dirty="0"/>
-              <a:t>Accuracy: 0.87 </a:t>
-            </a:r>
-            <a:r>
-              <a:rPr lang="en-US" b="1" dirty="0">
-                <a:sym typeface="Wingdings" panose="05000000000000000000" pitchFamily="2" charset="2"/>
-              </a:rPr>
-              <a:t> 87%</a:t>
-            </a:r>
-            <a:endParaRPr lang="en-US" b="1" dirty="0"/>
-          </a:p>
-        </p:txBody>
-      </p:sp>
-      <p:sp>
-        <p:nvSpPr>
-          <p:cNvPr id="5" name="Slide Number Placeholder 4">
-            <a:extLst>
-              <a:ext uri="{FF2B5EF4-FFF2-40B4-BE49-F238E27FC236}">
-                <a16:creationId xmlns:a16="http://schemas.microsoft.com/office/drawing/2014/main" id="{BB6D025A-5F15-4F61-9F73-A20E0B39BDEE}"/>
-              </a:ext>
-            </a:extLst>
-          </p:cNvPr>
-          <p:cNvSpPr>
-            <a:spLocks noGrp="1"/>
-          </p:cNvSpPr>
-          <p:nvPr>
-            <p:ph type="sldNum" sz="quarter" idx="12"/>
-          </p:nvPr>
-        </p:nvSpPr>
-        <p:spPr/>
-        <p:txBody>
-          <a:bodyPr/>
-          <a:lstStyle/>
-          <a:p>
-            <a:fld id="{D57F1E4F-1CFF-5643-939E-217C01CDF565}" type="slidenum">
-              <a:rPr lang="en-US" smtClean="0"/>
-              <a:pPr/>
-              <a:t>15</a:t>
-            </a:fld>
-            <a:endParaRPr lang="en-US" dirty="0"/>
-          </a:p>
-        </p:txBody>
-      </p:sp>
-    </p:spTree>
-    <p:extLst>
-      <p:ext uri="{BB962C8B-B14F-4D97-AF65-F5344CB8AC3E}">
-        <p14:creationId xmlns:p14="http://schemas.microsoft.com/office/powerpoint/2010/main" val="1234567773"/>
       </p:ext>
     </p:extLst>
   </p:cSld>
@@ -14619,6 +14718,216 @@
       </p:grpSpPr>
       <p:sp>
         <p:nvSpPr>
+          <p:cNvPr id="2" name="Title 1">
+            <a:extLst>
+              <a:ext uri="{FF2B5EF4-FFF2-40B4-BE49-F238E27FC236}">
+                <a16:creationId xmlns:a16="http://schemas.microsoft.com/office/drawing/2014/main" id="{CE2DCDC5-A71F-445E-96E0-A6659B352463}"/>
+              </a:ext>
+            </a:extLst>
+          </p:cNvPr>
+          <p:cNvSpPr>
+            <a:spLocks noGrp="1"/>
+          </p:cNvSpPr>
+          <p:nvPr>
+            <p:ph type="title"/>
+          </p:nvPr>
+        </p:nvSpPr>
+        <p:spPr/>
+        <p:txBody>
+          <a:bodyPr/>
+          <a:lstStyle/>
+          <a:p>
+            <a:r>
+              <a:rPr lang="en-US" dirty="0"/>
+              <a:t>Model Performance</a:t>
+            </a:r>
+          </a:p>
+        </p:txBody>
+      </p:sp>
+      <p:sp>
+        <p:nvSpPr>
+          <p:cNvPr id="3" name="Content Placeholder 2">
+            <a:extLst>
+              <a:ext uri="{FF2B5EF4-FFF2-40B4-BE49-F238E27FC236}">
+                <a16:creationId xmlns:a16="http://schemas.microsoft.com/office/drawing/2014/main" id="{BFAA199F-C95B-4F11-92CA-C194D9D46A38}"/>
+              </a:ext>
+            </a:extLst>
+          </p:cNvPr>
+          <p:cNvSpPr>
+            <a:spLocks noGrp="1"/>
+          </p:cNvSpPr>
+          <p:nvPr>
+            <p:ph idx="1"/>
+          </p:nvPr>
+        </p:nvSpPr>
+        <p:spPr>
+          <a:xfrm>
+            <a:off x="5770216" y="1298448"/>
+            <a:ext cx="5195997" cy="4572000"/>
+          </a:xfrm>
+        </p:spPr>
+        <p:txBody>
+          <a:bodyPr/>
+          <a:lstStyle/>
+          <a:p>
+            <a:r>
+              <a:rPr lang="en-US" b="1" dirty="0"/>
+              <a:t>Precision: </a:t>
+            </a:r>
+            <a:r>
+              <a:rPr lang="en-US" dirty="0"/>
+              <a:t>Metric accounting for false positives. </a:t>
+            </a:r>
+          </a:p>
+          <a:p>
+            <a:r>
+              <a:rPr lang="en-US" b="1" dirty="0"/>
+              <a:t>Recall: </a:t>
+            </a:r>
+            <a:r>
+              <a:rPr lang="en-US" dirty="0"/>
+              <a:t>Metric accounting for false negatives. </a:t>
+            </a:r>
+          </a:p>
+          <a:p>
+            <a:r>
+              <a:rPr lang="en-US" b="1" dirty="0"/>
+              <a:t>Accuracy: </a:t>
+            </a:r>
+            <a:r>
+              <a:rPr lang="en-US" dirty="0"/>
+              <a:t>“How many times does the model get it right?” </a:t>
+            </a:r>
+          </a:p>
+          <a:p>
+            <a:endParaRPr lang="en-US" dirty="0"/>
+          </a:p>
+          <a:p>
+            <a:pPr marL="0" indent="0">
+              <a:buNone/>
+            </a:pPr>
+            <a:r>
+              <a:rPr lang="en-US" dirty="0"/>
+              <a:t>Note: This model is a prototype and is not a certain predictor of attrition. However, it may be used to identify contributing factors and target retention efforts to specific categories of employees or make policy modifications. </a:t>
+            </a:r>
+          </a:p>
+        </p:txBody>
+      </p:sp>
+      <p:sp>
+        <p:nvSpPr>
+          <p:cNvPr id="4" name="Text Placeholder 3">
+            <a:extLst>
+              <a:ext uri="{FF2B5EF4-FFF2-40B4-BE49-F238E27FC236}">
+                <a16:creationId xmlns:a16="http://schemas.microsoft.com/office/drawing/2014/main" id="{0954EF1D-7F79-4556-8E70-1D9D795296F6}"/>
+              </a:ext>
+            </a:extLst>
+          </p:cNvPr>
+          <p:cNvSpPr>
+            <a:spLocks noGrp="1"/>
+          </p:cNvSpPr>
+          <p:nvPr>
+            <p:ph type="body" sz="half" idx="2"/>
+          </p:nvPr>
+        </p:nvSpPr>
+        <p:spPr/>
+        <p:txBody>
+          <a:bodyPr/>
+          <a:lstStyle/>
+          <a:p>
+            <a:r>
+              <a:rPr lang="en-US" dirty="0"/>
+              <a:t>Precision: 0.91</a:t>
+            </a:r>
+          </a:p>
+          <a:p>
+            <a:endParaRPr lang="en-US" dirty="0"/>
+          </a:p>
+          <a:p>
+            <a:r>
+              <a:rPr lang="en-US" dirty="0"/>
+              <a:t>Recall: 0.95</a:t>
+            </a:r>
+          </a:p>
+          <a:p>
+            <a:endParaRPr lang="en-US" dirty="0"/>
+          </a:p>
+          <a:p>
+            <a:r>
+              <a:rPr lang="en-US" b="1" dirty="0"/>
+              <a:t>Accuracy: 0.87 </a:t>
+            </a:r>
+            <a:r>
+              <a:rPr lang="en-US" b="1" dirty="0">
+                <a:sym typeface="Wingdings" panose="05000000000000000000" pitchFamily="2" charset="2"/>
+              </a:rPr>
+              <a:t> 87%</a:t>
+            </a:r>
+            <a:endParaRPr lang="en-US" b="1" dirty="0"/>
+          </a:p>
+        </p:txBody>
+      </p:sp>
+      <p:sp>
+        <p:nvSpPr>
+          <p:cNvPr id="5" name="Slide Number Placeholder 4">
+            <a:extLst>
+              <a:ext uri="{FF2B5EF4-FFF2-40B4-BE49-F238E27FC236}">
+                <a16:creationId xmlns:a16="http://schemas.microsoft.com/office/drawing/2014/main" id="{BB6D025A-5F15-4F61-9F73-A20E0B39BDEE}"/>
+              </a:ext>
+            </a:extLst>
+          </p:cNvPr>
+          <p:cNvSpPr>
+            <a:spLocks noGrp="1"/>
+          </p:cNvSpPr>
+          <p:nvPr>
+            <p:ph type="sldNum" sz="quarter" idx="12"/>
+          </p:nvPr>
+        </p:nvSpPr>
+        <p:spPr/>
+        <p:txBody>
+          <a:bodyPr/>
+          <a:lstStyle/>
+          <a:p>
+            <a:fld id="{D57F1E4F-1CFF-5643-939E-217C01CDF565}" type="slidenum">
+              <a:rPr lang="en-US" smtClean="0"/>
+              <a:pPr/>
+              <a:t>16</a:t>
+            </a:fld>
+            <a:endParaRPr lang="en-US" dirty="0"/>
+          </a:p>
+        </p:txBody>
+      </p:sp>
+    </p:spTree>
+    <p:extLst>
+      <p:ext uri="{BB962C8B-B14F-4D97-AF65-F5344CB8AC3E}">
+        <p14:creationId xmlns:p14="http://schemas.microsoft.com/office/powerpoint/2010/main" val="1234567773"/>
+      </p:ext>
+    </p:extLst>
+  </p:cSld>
+  <p:clrMapOvr>
+    <a:masterClrMapping/>
+  </p:clrMapOvr>
+</p:sld>
+</file>
+
+<file path=ppt/slides/slide17.xml><?xml version="1.0" encoding="utf-8"?>
+<p:sld xmlns:a="http://schemas.openxmlformats.org/drawingml/2006/main" xmlns:r="http://schemas.openxmlformats.org/officeDocument/2006/relationships" xmlns:p="http://schemas.openxmlformats.org/presentationml/2006/main">
+  <p:cSld>
+    <p:spTree>
+      <p:nvGrpSpPr>
+        <p:cNvPr id="1" name=""/>
+        <p:cNvGrpSpPr/>
+        <p:nvPr/>
+      </p:nvGrpSpPr>
+      <p:grpSpPr>
+        <a:xfrm>
+          <a:off x="0" y="0"/>
+          <a:ext cx="0" cy="0"/>
+          <a:chOff x="0" y="0"/>
+          <a:chExt cx="0" cy="0"/>
+        </a:xfrm>
+      </p:grpSpPr>
+      <p:sp>
+        <p:nvSpPr>
           <p:cNvPr id="6" name="Title 5">
             <a:extLst>
               <a:ext uri="{FF2B5EF4-FFF2-40B4-BE49-F238E27FC236}">
@@ -14697,7 +15006,7 @@
             <a:fld id="{D57F1E4F-1CFF-5643-939E-217C01CDF565}" type="slidenum">
               <a:rPr lang="en-US" smtClean="0"/>
               <a:pPr/>
-              <a:t>16</a:t>
+              <a:t>17</a:t>
             </a:fld>
             <a:endParaRPr lang="en-US" dirty="0"/>
           </a:p>
@@ -16480,14 +16789,6 @@
 <file path=ppt/slides/slide9.xml><?xml version="1.0" encoding="utf-8"?>
 <p:sld xmlns:a="http://schemas.openxmlformats.org/drawingml/2006/main" xmlns:r="http://schemas.openxmlformats.org/officeDocument/2006/relationships" xmlns:p="http://schemas.openxmlformats.org/presentationml/2006/main">
   <p:cSld>
-    <p:bg>
-      <p:bgPr>
-        <a:solidFill>
-          <a:schemeClr val="bg1"/>
-        </a:solidFill>
-        <a:effectLst/>
-      </p:bgPr>
-    </p:bg>
     <p:spTree>
       <p:nvGrpSpPr>
         <p:cNvPr id="1" name=""/>
@@ -16504,747 +16805,6 @@
       </p:grpSpPr>
       <p:sp>
         <p:nvSpPr>
-          <p:cNvPr id="11" name="Rectangle 10">
-            <a:extLst>
-              <a:ext uri="{FF2B5EF4-FFF2-40B4-BE49-F238E27FC236}">
-                <a16:creationId xmlns:a16="http://schemas.microsoft.com/office/drawing/2014/main" id="{F605735B-B754-4988-AB85-DAAA79C28D4B}"/>
-              </a:ext>
-              <a:ext uri="{C183D7F6-B498-43B3-948B-1728B52AA6E4}">
-                <adec:decorative xmlns:adec="http://schemas.microsoft.com/office/drawing/2017/decorative" val="1"/>
-              </a:ext>
-            </a:extLst>
-          </p:cNvPr>
-          <p:cNvSpPr>
-            <a:spLocks noGrp="1" noRot="1" noChangeAspect="1" noMove="1" noResize="1" noEditPoints="1" noAdjustHandles="1" noChangeArrowheads="1" noChangeShapeType="1" noTextEdit="1"/>
-          </p:cNvSpPr>
-          <p:nvPr>
-            <p:extLst>
-              <p:ext uri="{386F3935-93C4-4BCD-93E2-E3B085C9AB24}">
-                <p16:designElem xmlns:p16="http://schemas.microsoft.com/office/powerpoint/2015/main" val="1"/>
-              </p:ext>
-            </p:extLst>
-          </p:nvPr>
-        </p:nvSpPr>
-        <p:spPr>
-          <a:xfrm>
-            <a:off x="0" y="0"/>
-            <a:ext cx="12192000" cy="6858000"/>
-          </a:xfrm>
-          <a:prstGeom prst="rect">
-            <a:avLst/>
-          </a:prstGeom>
-          <a:blipFill>
-            <a:blip r:embed="rId2">
-              <a:duotone>
-                <a:schemeClr val="dk2">
-                  <a:shade val="69000"/>
-                  <a:hueMod val="108000"/>
-                  <a:satMod val="164000"/>
-                  <a:lumMod val="74000"/>
-                </a:schemeClr>
-                <a:schemeClr val="dk2">
-                  <a:tint val="96000"/>
-                  <a:hueMod val="88000"/>
-                  <a:satMod val="140000"/>
-                  <a:lumMod val="132000"/>
-                </a:schemeClr>
-              </a:duotone>
-            </a:blip>
-            <a:stretch>
-              <a:fillRect/>
-            </a:stretch>
-          </a:blipFill>
-          <a:ln>
-            <a:noFill/>
-          </a:ln>
-        </p:spPr>
-        <p:style>
-          <a:lnRef idx="2">
-            <a:schemeClr val="accent1">
-              <a:shade val="50000"/>
-            </a:schemeClr>
-          </a:lnRef>
-          <a:fillRef idx="1">
-            <a:schemeClr val="accent1"/>
-          </a:fillRef>
-          <a:effectRef idx="0">
-            <a:schemeClr val="accent1"/>
-          </a:effectRef>
-          <a:fontRef idx="minor">
-            <a:schemeClr val="lt1"/>
-          </a:fontRef>
-        </p:style>
-      </p:sp>
-      <p:grpSp>
-        <p:nvGrpSpPr>
-          <p:cNvPr id="13" name="Group 12">
-            <a:extLst>
-              <a:ext uri="{FF2B5EF4-FFF2-40B4-BE49-F238E27FC236}">
-                <a16:creationId xmlns:a16="http://schemas.microsoft.com/office/drawing/2014/main" id="{33E4A70D-68CA-47CD-A397-390393D6C889}"/>
-              </a:ext>
-              <a:ext uri="{C183D7F6-B498-43B3-948B-1728B52AA6E4}">
-                <adec:decorative xmlns:adec="http://schemas.microsoft.com/office/drawing/2017/decorative" val="1"/>
-              </a:ext>
-            </a:extLst>
-          </p:cNvPr>
-          <p:cNvGrpSpPr>
-            <a:grpSpLocks noGrp="1" noUngrp="1" noRot="1" noChangeAspect="1" noMove="1" noResize="1"/>
-          </p:cNvGrpSpPr>
-          <p:nvPr>
-            <p:extLst>
-              <p:ext uri="{386F3935-93C4-4BCD-93E2-E3B085C9AB24}">
-                <p16:designElem xmlns:p16="http://schemas.microsoft.com/office/powerpoint/2015/main" val="1"/>
-              </p:ext>
-            </p:extLst>
-          </p:nvPr>
-        </p:nvGrpSpPr>
-        <p:grpSpPr>
-          <a:xfrm>
-            <a:off x="0" y="1587"/>
-            <a:ext cx="12192000" cy="6856413"/>
-            <a:chOff x="0" y="1587"/>
-            <a:chExt cx="12192000" cy="6856413"/>
-          </a:xfrm>
-        </p:grpSpPr>
-        <p:sp>
-          <p:nvSpPr>
-            <p:cNvPr id="14" name="Oval 13">
-              <a:extLst>
-                <a:ext uri="{FF2B5EF4-FFF2-40B4-BE49-F238E27FC236}">
-                  <a16:creationId xmlns:a16="http://schemas.microsoft.com/office/drawing/2014/main" id="{6E300448-2B1A-4CAF-9207-7750145183BE}"/>
-                </a:ext>
-                <a:ext uri="{C183D7F6-B498-43B3-948B-1728B52AA6E4}">
-                  <adec:decorative xmlns:adec="http://schemas.microsoft.com/office/drawing/2017/decorative" val="1"/>
-                </a:ext>
-              </a:extLst>
-            </p:cNvPr>
-            <p:cNvSpPr/>
-            <p:nvPr>
-              <p:extLst>
-                <p:ext uri="{386F3935-93C4-4BCD-93E2-E3B085C9AB24}">
-                  <p16:designElem xmlns:p16="http://schemas.microsoft.com/office/powerpoint/2015/main" val="1"/>
-                </p:ext>
-              </p:extLst>
-            </p:nvPr>
-          </p:nvSpPr>
-          <p:spPr>
-            <a:xfrm>
-              <a:off x="0" y="2667000"/>
-              <a:ext cx="4191000" cy="4191000"/>
-            </a:xfrm>
-            <a:prstGeom prst="ellipse">
-              <a:avLst/>
-            </a:prstGeom>
-            <a:gradFill flip="none" rotWithShape="1">
-              <a:gsLst>
-                <a:gs pos="0">
-                  <a:schemeClr val="accent5">
-                    <a:alpha val="11000"/>
-                  </a:schemeClr>
-                </a:gs>
-                <a:gs pos="75000">
-                  <a:schemeClr val="accent5">
-                    <a:alpha val="0"/>
-                  </a:schemeClr>
-                </a:gs>
-                <a:gs pos="36000">
-                  <a:schemeClr val="accent5">
-                    <a:alpha val="10000"/>
-                  </a:schemeClr>
-                </a:gs>
-              </a:gsLst>
-              <a:path path="circle">
-                <a:fillToRect l="50000" t="50000" r="50000" b="50000"/>
-              </a:path>
-              <a:tileRect/>
-            </a:gradFill>
-            <a:ln>
-              <a:noFill/>
-            </a:ln>
-            <a:effectLst/>
-          </p:spPr>
-          <p:style>
-            <a:lnRef idx="1">
-              <a:schemeClr val="accent1"/>
-            </a:lnRef>
-            <a:fillRef idx="3">
-              <a:schemeClr val="accent1"/>
-            </a:fillRef>
-            <a:effectRef idx="2">
-              <a:schemeClr val="accent1"/>
-            </a:effectRef>
-            <a:fontRef idx="minor">
-              <a:schemeClr val="lt1"/>
-            </a:fontRef>
-          </p:style>
-        </p:sp>
-        <p:sp>
-          <p:nvSpPr>
-            <p:cNvPr id="15" name="Oval 14">
-              <a:extLst>
-                <a:ext uri="{FF2B5EF4-FFF2-40B4-BE49-F238E27FC236}">
-                  <a16:creationId xmlns:a16="http://schemas.microsoft.com/office/drawing/2014/main" id="{28D1394B-6E38-4A72-BF6C-FD6DB64C6762}"/>
-                </a:ext>
-                <a:ext uri="{C183D7F6-B498-43B3-948B-1728B52AA6E4}">
-                  <adec:decorative xmlns:adec="http://schemas.microsoft.com/office/drawing/2017/decorative" val="1"/>
-                </a:ext>
-              </a:extLst>
-            </p:cNvPr>
-            <p:cNvSpPr/>
-            <p:nvPr>
-              <p:extLst>
-                <p:ext uri="{386F3935-93C4-4BCD-93E2-E3B085C9AB24}">
-                  <p16:designElem xmlns:p16="http://schemas.microsoft.com/office/powerpoint/2015/main" val="1"/>
-                </p:ext>
-              </p:extLst>
-            </p:nvPr>
-          </p:nvSpPr>
-          <p:spPr>
-            <a:xfrm>
-              <a:off x="0" y="2895600"/>
-              <a:ext cx="2362200" cy="2362200"/>
-            </a:xfrm>
-            <a:prstGeom prst="ellipse">
-              <a:avLst/>
-            </a:prstGeom>
-            <a:gradFill flip="none" rotWithShape="1">
-              <a:gsLst>
-                <a:gs pos="0">
-                  <a:schemeClr val="accent5">
-                    <a:alpha val="8000"/>
-                  </a:schemeClr>
-                </a:gs>
-                <a:gs pos="72000">
-                  <a:schemeClr val="accent5">
-                    <a:alpha val="0"/>
-                  </a:schemeClr>
-                </a:gs>
-                <a:gs pos="36000">
-                  <a:schemeClr val="accent5">
-                    <a:alpha val="8000"/>
-                  </a:schemeClr>
-                </a:gs>
-              </a:gsLst>
-              <a:path path="circle">
-                <a:fillToRect l="50000" t="50000" r="50000" b="50000"/>
-              </a:path>
-              <a:tileRect/>
-            </a:gradFill>
-            <a:ln>
-              <a:noFill/>
-            </a:ln>
-            <a:effectLst/>
-          </p:spPr>
-          <p:style>
-            <a:lnRef idx="1">
-              <a:schemeClr val="accent1"/>
-            </a:lnRef>
-            <a:fillRef idx="3">
-              <a:schemeClr val="accent1"/>
-            </a:fillRef>
-            <a:effectRef idx="2">
-              <a:schemeClr val="accent1"/>
-            </a:effectRef>
-            <a:fontRef idx="minor">
-              <a:schemeClr val="lt1"/>
-            </a:fontRef>
-          </p:style>
-        </p:sp>
-        <p:sp>
-          <p:nvSpPr>
-            <p:cNvPr id="16" name="Rectangle 15">
-              <a:extLst>
-                <a:ext uri="{FF2B5EF4-FFF2-40B4-BE49-F238E27FC236}">
-                  <a16:creationId xmlns:a16="http://schemas.microsoft.com/office/drawing/2014/main" id="{BB5BBBEF-5E27-4125-808B-53FD258B7CE6}"/>
-                </a:ext>
-                <a:ext uri="{C183D7F6-B498-43B3-948B-1728B52AA6E4}">
-                  <adec:decorative xmlns:adec="http://schemas.microsoft.com/office/drawing/2017/decorative" val="1"/>
-                </a:ext>
-              </a:extLst>
-            </p:cNvPr>
-            <p:cNvSpPr/>
-            <p:nvPr>
-              <p:extLst>
-                <p:ext uri="{386F3935-93C4-4BCD-93E2-E3B085C9AB24}">
-                  <p16:designElem xmlns:p16="http://schemas.microsoft.com/office/powerpoint/2015/main" val="1"/>
-                </p:ext>
-              </p:extLst>
-            </p:nvPr>
-          </p:nvSpPr>
-          <p:spPr bwMode="gray">
-            <a:xfrm>
-              <a:off x="7289800" y="402165"/>
-              <a:ext cx="4478865" cy="6053670"/>
-            </a:xfrm>
-            <a:prstGeom prst="rect">
-              <a:avLst/>
-            </a:prstGeom>
-            <a:solidFill>
-              <a:schemeClr val="bg1"/>
-            </a:solidFill>
-            <a:ln>
-              <a:noFill/>
-            </a:ln>
-            <a:effectLst/>
-          </p:spPr>
-          <p:style>
-            <a:lnRef idx="1">
-              <a:schemeClr val="accent1"/>
-            </a:lnRef>
-            <a:fillRef idx="3">
-              <a:schemeClr val="accent1"/>
-            </a:fillRef>
-            <a:effectRef idx="2">
-              <a:schemeClr val="accent1"/>
-            </a:effectRef>
-            <a:fontRef idx="minor">
-              <a:schemeClr val="lt1"/>
-            </a:fontRef>
-          </p:style>
-        </p:sp>
-        <p:sp>
-          <p:nvSpPr>
-            <p:cNvPr id="17" name="Freeform 5">
-              <a:extLst>
-                <a:ext uri="{FF2B5EF4-FFF2-40B4-BE49-F238E27FC236}">
-                  <a16:creationId xmlns:a16="http://schemas.microsoft.com/office/drawing/2014/main" id="{6A8E2910-FBBD-47B6-A6D5-1FA30388D544}"/>
-                </a:ext>
-                <a:ext uri="{C183D7F6-B498-43B3-948B-1728B52AA6E4}">
-                  <adec:decorative xmlns:adec="http://schemas.microsoft.com/office/drawing/2017/decorative" val="1"/>
-                </a:ext>
-              </a:extLst>
-            </p:cNvPr>
-            <p:cNvSpPr/>
-            <p:nvPr>
-              <p:extLst>
-                <p:ext uri="{386F3935-93C4-4BCD-93E2-E3B085C9AB24}">
-                  <p16:designElem xmlns:p16="http://schemas.microsoft.com/office/powerpoint/2015/main" val="1"/>
-                </p:ext>
-              </p:extLst>
-            </p:nvPr>
-          </p:nvSpPr>
-          <p:spPr bwMode="gray">
-            <a:xfrm rot="16200000">
-              <a:off x="4465654" y="2801721"/>
-              <a:ext cx="6053670" cy="1254558"/>
-            </a:xfrm>
-            <a:custGeom>
-              <a:avLst/>
-              <a:gdLst/>
-              <a:ahLst/>
-              <a:cxnLst/>
-              <a:rect l="l" t="t" r="r" b="b"/>
-              <a:pathLst>
-                <a:path w="10000" h="8000">
-                  <a:moveTo>
-                    <a:pt x="0" y="0"/>
-                  </a:moveTo>
-                  <a:lnTo>
-                    <a:pt x="0" y="7970"/>
-                  </a:lnTo>
-                  <a:lnTo>
-                    <a:pt x="10000" y="8000"/>
-                  </a:lnTo>
-                  <a:lnTo>
-                    <a:pt x="10000" y="7"/>
-                  </a:lnTo>
-                  <a:lnTo>
-                    <a:pt x="10000" y="7"/>
-                  </a:lnTo>
-                  <a:lnTo>
-                    <a:pt x="9773" y="156"/>
-                  </a:lnTo>
-                  <a:lnTo>
-                    <a:pt x="9547" y="298"/>
-                  </a:lnTo>
-                  <a:lnTo>
-                    <a:pt x="9320" y="437"/>
-                  </a:lnTo>
-                  <a:lnTo>
-                    <a:pt x="9092" y="556"/>
-                  </a:lnTo>
-                  <a:lnTo>
-                    <a:pt x="8865" y="676"/>
-                  </a:lnTo>
-                  <a:lnTo>
-                    <a:pt x="8637" y="788"/>
-                  </a:lnTo>
-                  <a:lnTo>
-                    <a:pt x="8412" y="884"/>
-                  </a:lnTo>
-                  <a:lnTo>
-                    <a:pt x="8184" y="975"/>
-                  </a:lnTo>
-                  <a:lnTo>
-                    <a:pt x="7957" y="1058"/>
-                  </a:lnTo>
-                  <a:lnTo>
-                    <a:pt x="7734" y="1130"/>
-                  </a:lnTo>
-                  <a:lnTo>
-                    <a:pt x="7508" y="1202"/>
-                  </a:lnTo>
-                  <a:lnTo>
-                    <a:pt x="7285" y="1262"/>
-                  </a:lnTo>
-                  <a:lnTo>
-                    <a:pt x="7062" y="1309"/>
-                  </a:lnTo>
-                  <a:lnTo>
-                    <a:pt x="6840" y="1358"/>
-                  </a:lnTo>
-                  <a:lnTo>
-                    <a:pt x="6620" y="1399"/>
-                  </a:lnTo>
-                  <a:lnTo>
-                    <a:pt x="6402" y="1428"/>
-                  </a:lnTo>
-                  <a:lnTo>
-                    <a:pt x="6184" y="1453"/>
-                  </a:lnTo>
-                  <a:lnTo>
-                    <a:pt x="5968" y="1477"/>
-                  </a:lnTo>
-                  <a:lnTo>
-                    <a:pt x="5755" y="1488"/>
-                  </a:lnTo>
-                  <a:lnTo>
-                    <a:pt x="5542" y="1500"/>
-                  </a:lnTo>
-                  <a:lnTo>
-                    <a:pt x="5332" y="1506"/>
-                  </a:lnTo>
-                  <a:lnTo>
-                    <a:pt x="5124" y="1500"/>
-                  </a:lnTo>
-                  <a:lnTo>
-                    <a:pt x="4918" y="1500"/>
-                  </a:lnTo>
-                  <a:lnTo>
-                    <a:pt x="4714" y="1488"/>
-                  </a:lnTo>
-                  <a:lnTo>
-                    <a:pt x="4514" y="1470"/>
-                  </a:lnTo>
-                  <a:lnTo>
-                    <a:pt x="4316" y="1453"/>
-                  </a:lnTo>
-                  <a:lnTo>
-                    <a:pt x="4122" y="1434"/>
-                  </a:lnTo>
-                  <a:lnTo>
-                    <a:pt x="3929" y="1405"/>
-                  </a:lnTo>
-                  <a:lnTo>
-                    <a:pt x="3739" y="1374"/>
-                  </a:lnTo>
-                  <a:lnTo>
-                    <a:pt x="3553" y="1346"/>
-                  </a:lnTo>
-                  <a:lnTo>
-                    <a:pt x="3190" y="1267"/>
-                  </a:lnTo>
-                  <a:lnTo>
-                    <a:pt x="2842" y="1183"/>
-                  </a:lnTo>
-                  <a:lnTo>
-                    <a:pt x="2508" y="1095"/>
-                  </a:lnTo>
-                  <a:lnTo>
-                    <a:pt x="2192" y="998"/>
-                  </a:lnTo>
-                  <a:lnTo>
-                    <a:pt x="1890" y="897"/>
-                  </a:lnTo>
-                  <a:lnTo>
-                    <a:pt x="1610" y="788"/>
-                  </a:lnTo>
-                  <a:lnTo>
-                    <a:pt x="1347" y="681"/>
-                  </a:lnTo>
-                  <a:lnTo>
-                    <a:pt x="1105" y="574"/>
-                  </a:lnTo>
-                  <a:lnTo>
-                    <a:pt x="883" y="473"/>
-                  </a:lnTo>
-                  <a:lnTo>
-                    <a:pt x="686" y="377"/>
-                  </a:lnTo>
-                  <a:lnTo>
-                    <a:pt x="508" y="286"/>
-                  </a:lnTo>
-                  <a:lnTo>
-                    <a:pt x="358" y="210"/>
-                  </a:lnTo>
-                  <a:lnTo>
-                    <a:pt x="232" y="138"/>
-                  </a:lnTo>
-                  <a:lnTo>
-                    <a:pt x="59" y="35"/>
-                  </a:lnTo>
-                  <a:lnTo>
-                    <a:pt x="0" y="0"/>
-                  </a:lnTo>
-                  <a:lnTo>
-                    <a:pt x="0" y="0"/>
-                  </a:lnTo>
-                  <a:close/>
-                </a:path>
-              </a:pathLst>
-            </a:custGeom>
-            <a:solidFill>
-              <a:schemeClr val="bg1"/>
-            </a:solidFill>
-            <a:ln>
-              <a:noFill/>
-            </a:ln>
-          </p:spPr>
-        </p:sp>
-        <p:sp>
-          <p:nvSpPr>
-            <p:cNvPr id="18" name="Freeform 5">
-              <a:extLst>
-                <a:ext uri="{FF2B5EF4-FFF2-40B4-BE49-F238E27FC236}">
-                  <a16:creationId xmlns:a16="http://schemas.microsoft.com/office/drawing/2014/main" id="{02CE8B07-E3AE-41C6-9378-543D478C7A8F}"/>
-                </a:ext>
-                <a:ext uri="{C183D7F6-B498-43B3-948B-1728B52AA6E4}">
-                  <adec:decorative xmlns:adec="http://schemas.microsoft.com/office/drawing/2017/decorative" val="1"/>
-                </a:ext>
-              </a:extLst>
-            </p:cNvPr>
-            <p:cNvSpPr/>
-            <p:nvPr>
-              <p:extLst>
-                <p:ext uri="{386F3935-93C4-4BCD-93E2-E3B085C9AB24}">
-                  <p16:designElem xmlns:p16="http://schemas.microsoft.com/office/powerpoint/2015/main" val="1"/>
-                </p:ext>
-              </p:extLst>
-            </p:nvPr>
-          </p:nvSpPr>
-          <p:spPr bwMode="gray">
-            <a:xfrm rot="15922489">
-              <a:off x="5376762" y="1826078"/>
-              <a:ext cx="3299407" cy="440924"/>
-            </a:xfrm>
-            <a:custGeom>
-              <a:avLst/>
-              <a:gdLst/>
-              <a:ahLst/>
-              <a:cxnLst/>
-              <a:rect l="l" t="t" r="r" b="b"/>
-              <a:pathLst>
-                <a:path w="10000" h="5291">
-                  <a:moveTo>
-                    <a:pt x="85" y="2532"/>
-                  </a:moveTo>
-                  <a:cubicBezTo>
-                    <a:pt x="1736" y="3911"/>
-                    <a:pt x="7524" y="5298"/>
-                    <a:pt x="9958" y="5291"/>
-                  </a:cubicBezTo>
-                  <a:cubicBezTo>
-                    <a:pt x="9989" y="1958"/>
-                    <a:pt x="9969" y="3333"/>
-                    <a:pt x="10000" y="0"/>
-                  </a:cubicBezTo>
-                  <a:lnTo>
-                    <a:pt x="10000" y="0"/>
-                  </a:lnTo>
-                  <a:lnTo>
-                    <a:pt x="9667" y="204"/>
-                  </a:lnTo>
-                  <a:lnTo>
-                    <a:pt x="9334" y="400"/>
-                  </a:lnTo>
-                  <a:lnTo>
-                    <a:pt x="9001" y="590"/>
-                  </a:lnTo>
-                  <a:lnTo>
-                    <a:pt x="8667" y="753"/>
-                  </a:lnTo>
-                  <a:lnTo>
-                    <a:pt x="8333" y="917"/>
-                  </a:lnTo>
-                  <a:lnTo>
-                    <a:pt x="7999" y="1071"/>
-                  </a:lnTo>
-                  <a:lnTo>
-                    <a:pt x="7669" y="1202"/>
-                  </a:lnTo>
-                  <a:lnTo>
-                    <a:pt x="7333" y="1325"/>
-                  </a:lnTo>
-                  <a:lnTo>
-                    <a:pt x="7000" y="1440"/>
-                  </a:lnTo>
-                  <a:lnTo>
-                    <a:pt x="6673" y="1538"/>
-                  </a:lnTo>
-                  <a:lnTo>
-                    <a:pt x="6340" y="1636"/>
-                  </a:lnTo>
-                  <a:lnTo>
-                    <a:pt x="6013" y="1719"/>
-                  </a:lnTo>
-                  <a:lnTo>
-                    <a:pt x="5686" y="1784"/>
-                  </a:lnTo>
-                  <a:lnTo>
-                    <a:pt x="5359" y="1850"/>
-                  </a:lnTo>
-                  <a:lnTo>
-                    <a:pt x="5036" y="1906"/>
-                  </a:lnTo>
-                  <a:lnTo>
-                    <a:pt x="4717" y="1948"/>
-                  </a:lnTo>
-                  <a:lnTo>
-                    <a:pt x="4396" y="1980"/>
-                  </a:lnTo>
-                  <a:lnTo>
-                    <a:pt x="4079" y="2013"/>
-                  </a:lnTo>
-                  <a:lnTo>
-                    <a:pt x="3766" y="2029"/>
-                  </a:lnTo>
-                  <a:lnTo>
-                    <a:pt x="3454" y="2046"/>
-                  </a:lnTo>
-                  <a:lnTo>
-                    <a:pt x="3145" y="2053"/>
-                  </a:lnTo>
-                  <a:lnTo>
-                    <a:pt x="2839" y="2046"/>
-                  </a:lnTo>
-                  <a:lnTo>
-                    <a:pt x="2537" y="2046"/>
-                  </a:lnTo>
-                  <a:lnTo>
-                    <a:pt x="2238" y="2029"/>
-                  </a:lnTo>
-                  <a:lnTo>
-                    <a:pt x="1943" y="2004"/>
-                  </a:lnTo>
-                  <a:lnTo>
-                    <a:pt x="1653" y="1980"/>
-                  </a:lnTo>
-                  <a:lnTo>
-                    <a:pt x="1368" y="1955"/>
-                  </a:lnTo>
-                  <a:lnTo>
-                    <a:pt x="1085" y="1915"/>
-                  </a:lnTo>
-                  <a:lnTo>
-                    <a:pt x="806" y="1873"/>
-                  </a:lnTo>
-                  <a:lnTo>
-                    <a:pt x="533" y="1833"/>
-                  </a:lnTo>
-                  <a:lnTo>
-                    <a:pt x="0" y="1726"/>
-                  </a:lnTo>
-                  <a:cubicBezTo>
-                    <a:pt x="28" y="1995"/>
-                    <a:pt x="57" y="2263"/>
-                    <a:pt x="85" y="2532"/>
-                  </a:cubicBezTo>
-                  <a:close/>
-                </a:path>
-              </a:pathLst>
-            </a:custGeom>
-            <a:solidFill>
-              <a:schemeClr val="bg1">
-                <a:alpha val="20000"/>
-              </a:schemeClr>
-            </a:solidFill>
-            <a:ln>
-              <a:noFill/>
-            </a:ln>
-          </p:spPr>
-        </p:sp>
-        <p:sp>
-          <p:nvSpPr>
-            <p:cNvPr id="19" name="Freeform 5">
-              <a:extLst>
-                <a:ext uri="{FF2B5EF4-FFF2-40B4-BE49-F238E27FC236}">
-                  <a16:creationId xmlns:a16="http://schemas.microsoft.com/office/drawing/2014/main" id="{BDF4725C-2B01-4AF0-8AE9-18A242E17126}"/>
-                </a:ext>
-                <a:ext uri="{C183D7F6-B498-43B3-948B-1728B52AA6E4}">
-                  <adec:decorative xmlns:adec="http://schemas.microsoft.com/office/drawing/2017/decorative" val="1"/>
-                </a:ext>
-              </a:extLst>
-            </p:cNvPr>
-            <p:cNvSpPr>
-              <a:spLocks noEditPoints="1"/>
-            </p:cNvSpPr>
-            <p:nvPr>
-              <p:extLst>
-                <p:ext uri="{386F3935-93C4-4BCD-93E2-E3B085C9AB24}">
-                  <p16:designElem xmlns:p16="http://schemas.microsoft.com/office/powerpoint/2015/main" val="1"/>
-                </p:ext>
-              </p:extLst>
-            </p:nvPr>
-          </p:nvSpPr>
-          <p:spPr bwMode="gray">
-            <a:xfrm>
-              <a:off x="0" y="1587"/>
-              <a:ext cx="12192000" cy="6856413"/>
-            </a:xfrm>
-            <a:custGeom>
-              <a:avLst/>
-              <a:gdLst/>
-              <a:ahLst/>
-              <a:cxnLst/>
-              <a:rect l="0" t="0" r="r" b="b"/>
-              <a:pathLst>
-                <a:path w="15356" h="8638">
-                  <a:moveTo>
-                    <a:pt x="0" y="0"/>
-                  </a:moveTo>
-                  <a:lnTo>
-                    <a:pt x="0" y="8638"/>
-                  </a:lnTo>
-                  <a:lnTo>
-                    <a:pt x="15356" y="8638"/>
-                  </a:lnTo>
-                  <a:lnTo>
-                    <a:pt x="15356" y="0"/>
-                  </a:lnTo>
-                  <a:lnTo>
-                    <a:pt x="0" y="0"/>
-                  </a:lnTo>
-                  <a:close/>
-                  <a:moveTo>
-                    <a:pt x="14748" y="8038"/>
-                  </a:moveTo>
-                  <a:lnTo>
-                    <a:pt x="600" y="8038"/>
-                  </a:lnTo>
-                  <a:lnTo>
-                    <a:pt x="600" y="592"/>
-                  </a:lnTo>
-                  <a:lnTo>
-                    <a:pt x="14748" y="592"/>
-                  </a:lnTo>
-                  <a:lnTo>
-                    <a:pt x="14748" y="8038"/>
-                  </a:lnTo>
-                  <a:close/>
-                </a:path>
-              </a:pathLst>
-            </a:custGeom>
-            <a:solidFill>
-              <a:schemeClr val="bg1"/>
-            </a:solidFill>
-            <a:ln>
-              <a:noFill/>
-            </a:ln>
-          </p:spPr>
-        </p:sp>
-      </p:grpSp>
-      <p:sp>
-        <p:nvSpPr>
           <p:cNvPr id="2" name="Title 1">
             <a:extLst>
               <a:ext uri="{FF2B5EF4-FFF2-40B4-BE49-F238E27FC236}">
@@ -17259,15 +16819,10 @@
             <p:ph type="title"/>
           </p:nvPr>
         </p:nvSpPr>
-        <p:spPr>
-          <a:xfrm>
-            <a:off x="639098" y="629265"/>
-            <a:ext cx="6072776" cy="1622322"/>
-          </a:xfrm>
-        </p:spPr>
+        <p:spPr/>
         <p:txBody>
           <a:bodyPr>
-            <a:normAutofit/>
+            <a:normAutofit fontScale="90000"/>
           </a:bodyPr>
           <a:lstStyle/>
           <a:p>
@@ -17277,6 +16832,24 @@
             </a:r>
           </a:p>
         </p:txBody>
+      </p:sp>
+      <p:sp>
+        <p:nvSpPr>
+          <p:cNvPr id="7" name="Picture Placeholder 6">
+            <a:extLst>
+              <a:ext uri="{FF2B5EF4-FFF2-40B4-BE49-F238E27FC236}">
+                <a16:creationId xmlns:a16="http://schemas.microsoft.com/office/drawing/2014/main" id="{77EDEBC4-7B9E-4BC0-BB60-1BF45912A382}"/>
+              </a:ext>
+            </a:extLst>
+          </p:cNvPr>
+          <p:cNvSpPr>
+            <a:spLocks noGrp="1"/>
+          </p:cNvSpPr>
+          <p:nvPr>
+            <p:ph type="pic" idx="1"/>
+          </p:nvPr>
+        </p:nvSpPr>
+        <p:spPr/>
       </p:sp>
       <p:sp>
         <p:nvSpPr>
@@ -17291,29 +16864,68 @@
             <a:spLocks noGrp="1"/>
           </p:cNvSpPr>
           <p:nvPr>
-            <p:ph idx="1"/>
+            <p:ph type="body" sz="half" idx="2"/>
           </p:nvPr>
         </p:nvSpPr>
-        <p:spPr>
-          <a:xfrm>
-            <a:off x="639098" y="2418735"/>
-            <a:ext cx="6072776" cy="3811740"/>
-          </a:xfrm>
-        </p:spPr>
+        <p:spPr/>
         <p:txBody>
           <a:bodyPr anchor="ctr">
             <a:normAutofit/>
           </a:bodyPr>
           <a:lstStyle/>
           <a:p>
+            <a:pPr marL="0" indent="0">
+              <a:buNone/>
+            </a:pPr>
             <a:r>
               <a:rPr lang="en-US" dirty="0">
                 <a:solidFill>
                   <a:schemeClr val="bg1"/>
                 </a:solidFill>
               </a:rPr>
-              <a:t>We need to insert a strongly worded statement here that says  </a:t>
-            </a:r>
+              <a:t>Employees who worked overtime tend to leave the organization in greater numbers indicating issues with overall quality of life. </a:t>
+            </a:r>
+          </a:p>
+        </p:txBody>
+      </p:sp>
+      <p:sp>
+        <p:nvSpPr>
+          <p:cNvPr id="4" name="Slide Number Placeholder 3">
+            <a:extLst>
+              <a:ext uri="{FF2B5EF4-FFF2-40B4-BE49-F238E27FC236}">
+                <a16:creationId xmlns:a16="http://schemas.microsoft.com/office/drawing/2014/main" id="{31C40EF3-C8A7-40EE-B3CD-DF40F25492D1}"/>
+              </a:ext>
+            </a:extLst>
+          </p:cNvPr>
+          <p:cNvSpPr>
+            <a:spLocks noGrp="1"/>
+          </p:cNvSpPr>
+          <p:nvPr>
+            <p:ph type="sldNum" sz="quarter" idx="12"/>
+          </p:nvPr>
+        </p:nvSpPr>
+        <p:spPr/>
+        <p:txBody>
+          <a:bodyPr>
+            <a:normAutofit/>
+          </a:bodyPr>
+          <a:lstStyle/>
+          <a:p>
+            <a:pPr>
+              <a:spcAft>
+                <a:spcPts val="600"/>
+              </a:spcAft>
+            </a:pPr>
+            <a:fld id="{D57F1E4F-1CFF-5643-939E-217C01CDF565}" type="slidenum">
+              <a:rPr lang="en-US" smtClean="0"/>
+              <a:pPr>
+                <a:spcAft>
+                  <a:spcPts val="600"/>
+                </a:spcAft>
+              </a:pPr>
+              <a:t>9</a:t>
+            </a:fld>
+            <a:endParaRPr lang="en-US"/>
           </a:p>
         </p:txBody>
       </p:sp>
@@ -17332,7 +16944,7 @@
           <p:nvPr/>
         </p:nvPicPr>
         <p:blipFill>
-          <a:blip r:embed="rId3"/>
+          <a:blip r:embed="rId2"/>
           <a:stretch>
             <a:fillRect/>
           </a:stretch>
@@ -17347,105 +16959,6 @@
           </a:prstGeom>
         </p:spPr>
       </p:pic>
-      <p:sp>
-        <p:nvSpPr>
-          <p:cNvPr id="21" name="Rectangle 20">
-            <a:extLst>
-              <a:ext uri="{FF2B5EF4-FFF2-40B4-BE49-F238E27FC236}">
-                <a16:creationId xmlns:a16="http://schemas.microsoft.com/office/drawing/2014/main" id="{D8E14221-6F70-4546-812E-6EA2ADA99344}"/>
-              </a:ext>
-              <a:ext uri="{C183D7F6-B498-43B3-948B-1728B52AA6E4}">
-                <adec:decorative xmlns:adec="http://schemas.microsoft.com/office/drawing/2017/decorative" val="1"/>
-              </a:ext>
-            </a:extLst>
-          </p:cNvPr>
-          <p:cNvSpPr>
-            <a:spLocks noGrp="1" noRot="1" noChangeAspect="1" noMove="1" noResize="1" noEditPoints="1" noAdjustHandles="1" noChangeArrowheads="1" noChangeShapeType="1" noTextEdit="1"/>
-          </p:cNvSpPr>
-          <p:nvPr>
-            <p:extLst>
-              <p:ext uri="{386F3935-93C4-4BCD-93E2-E3B085C9AB24}">
-                <p16:designElem xmlns:p16="http://schemas.microsoft.com/office/powerpoint/2015/main" val="1"/>
-              </p:ext>
-            </p:extLst>
-          </p:nvPr>
-        </p:nvSpPr>
-        <p:spPr>
-          <a:xfrm>
-            <a:off x="10437812" y="0"/>
-            <a:ext cx="685800" cy="1143000"/>
-          </a:xfrm>
-          <a:prstGeom prst="rect">
-            <a:avLst/>
-          </a:prstGeom>
-          <a:solidFill>
-            <a:schemeClr val="accent1"/>
-          </a:solidFill>
-          <a:ln>
-            <a:noFill/>
-          </a:ln>
-        </p:spPr>
-        <p:style>
-          <a:lnRef idx="1">
-            <a:schemeClr val="accent1"/>
-          </a:lnRef>
-          <a:fillRef idx="3">
-            <a:schemeClr val="accent1"/>
-          </a:fillRef>
-          <a:effectRef idx="2">
-            <a:schemeClr val="accent1"/>
-          </a:effectRef>
-          <a:fontRef idx="minor">
-            <a:schemeClr val="lt1"/>
-          </a:fontRef>
-        </p:style>
-      </p:sp>
-      <p:sp>
-        <p:nvSpPr>
-          <p:cNvPr id="4" name="Slide Number Placeholder 3">
-            <a:extLst>
-              <a:ext uri="{FF2B5EF4-FFF2-40B4-BE49-F238E27FC236}">
-                <a16:creationId xmlns:a16="http://schemas.microsoft.com/office/drawing/2014/main" id="{31C40EF3-C8A7-40EE-B3CD-DF40F25492D1}"/>
-              </a:ext>
-            </a:extLst>
-          </p:cNvPr>
-          <p:cNvSpPr>
-            <a:spLocks noGrp="1"/>
-          </p:cNvSpPr>
-          <p:nvPr>
-            <p:ph type="sldNum" sz="quarter" idx="12"/>
-          </p:nvPr>
-        </p:nvSpPr>
-        <p:spPr>
-          <a:xfrm>
-            <a:off x="10352540" y="295729"/>
-            <a:ext cx="838199" cy="767687"/>
-          </a:xfrm>
-        </p:spPr>
-        <p:txBody>
-          <a:bodyPr>
-            <a:normAutofit/>
-          </a:bodyPr>
-          <a:lstStyle/>
-          <a:p>
-            <a:pPr>
-              <a:spcAft>
-                <a:spcPts val="600"/>
-              </a:spcAft>
-            </a:pPr>
-            <a:fld id="{D57F1E4F-1CFF-5643-939E-217C01CDF565}" type="slidenum">
-              <a:rPr lang="en-US" smtClean="0"/>
-              <a:pPr>
-                <a:spcAft>
-                  <a:spcPts val="600"/>
-                </a:spcAft>
-              </a:pPr>
-              <a:t>9</a:t>
-            </a:fld>
-            <a:endParaRPr lang="en-US"/>
-          </a:p>
-        </p:txBody>
-      </p:sp>
       <p:pic>
         <p:nvPicPr>
           <p:cNvPr id="5" name="Picture 4">
@@ -17461,7 +16974,7 @@
           <p:nvPr/>
         </p:nvPicPr>
         <p:blipFill>
-          <a:blip r:embed="rId4"/>
+          <a:blip r:embed="rId3"/>
           <a:stretch>
             <a:fillRect/>
           </a:stretch>

</xml_diff>

<commit_message>
Graphic Change to Job Stats a
</commit_message>
<xml_diff>
--- a/DraftPresentation.pptx
+++ b/DraftPresentation.pptx
@@ -15403,15 +15403,15 @@
           <a:p>
             <a:r>
               <a:rPr lang="en-US" dirty="0"/>
-              <a:t>Attrition is caused in </a:t>
-            </a:r>
-            <a:r>
-              <a:rPr lang="en-US" dirty="0" err="1"/>
-              <a:t>youger</a:t>
+              <a:t>Attrition is caused in you</a:t>
+            </a:r>
+            <a:r>
+              <a:rPr lang="pl-PL" dirty="0"/>
+              <a:t>n</a:t>
             </a:r>
             <a:r>
               <a:rPr lang="en-US" dirty="0"/>
-              <a:t> work force who tend to work overtime (essentially low quality of life) and who have low monthly income</a:t>
+              <a:t>ger work force who tend to work overtime (essentially low quality of life) and who have low monthly income</a:t>
             </a:r>
           </a:p>
           <a:p>
@@ -16403,10 +16403,10 @@
       </p:grpSpPr>
       <p:pic>
         <p:nvPicPr>
-          <p:cNvPr id="4" name="Picture 3">
+          <p:cNvPr id="11" name="Picture 10" descr="A picture containing indoor, computer, cup, sky&#10;&#10;Description automatically generated">
             <a:extLst>
               <a:ext uri="{FF2B5EF4-FFF2-40B4-BE49-F238E27FC236}">
-                <a16:creationId xmlns:a16="http://schemas.microsoft.com/office/drawing/2014/main" id="{CE13D011-2A53-4FF0-8C5B-05EEC03F1112}"/>
+                <a16:creationId xmlns:a16="http://schemas.microsoft.com/office/drawing/2014/main" id="{EFD94B60-C04A-43EE-9351-7093B08E4679}"/>
               </a:ext>
             </a:extLst>
           </p:cNvPr>
@@ -16415,15 +16415,16 @@
           </p:cNvPicPr>
           <p:nvPr/>
         </p:nvPicPr>
-        <p:blipFill rotWithShape="1">
+        <p:blipFill>
           <a:blip r:embed="rId2"/>
-          <a:srcRect t="534" b="1"/>
-          <a:stretch/>
+          <a:stretch>
+            <a:fillRect/>
+          </a:stretch>
         </p:blipFill>
         <p:spPr>
           <a:xfrm>
-            <a:off x="530404" y="2361983"/>
-            <a:ext cx="11131188" cy="3884829"/>
+            <a:off x="259231" y="2382496"/>
+            <a:ext cx="11554482" cy="3973615"/>
           </a:xfrm>
           <a:prstGeom prst="rect">
             <a:avLst/>
@@ -16472,7 +16473,7 @@
         </p:nvSpPr>
         <p:spPr>
           <a:xfrm>
-            <a:off x="7272906" y="2750600"/>
+            <a:off x="7272906" y="2729580"/>
             <a:ext cx="431800" cy="228600"/>
           </a:xfrm>
           <a:prstGeom prst="rect">
@@ -16526,7 +16527,7 @@
         </p:nvSpPr>
         <p:spPr>
           <a:xfrm>
-            <a:off x="7272906" y="3746167"/>
+            <a:off x="7262396" y="3714637"/>
             <a:ext cx="431800" cy="228600"/>
           </a:xfrm>
           <a:prstGeom prst="rect">

</xml_diff>